<commit_message>
responded to Jon's comments
</commit_message>
<xml_diff>
--- a/Slides/Lecture 05 Concurrency Patterns in Typescript.pptx
+++ b/Slides/Lecture 05 Concurrency Patterns in Typescript.pptx
@@ -2825,7 +2825,7 @@
                 <a:tabLst/>
                 <a:defRPr/>
               </a:pPr>
-              <a:t>8/16/2022</a:t>
+              <a:t>8/22/2022</a:t>
             </a:fld>
             <a:endParaRPr kumimoji="0" lang="en-US" sz="1200" b="0" i="0" u="none" strike="noStrike" kern="1200" cap="none" spc="0" normalizeH="0" baseline="0" noProof="0">
               <a:ln>
@@ -3309,7 +3309,7 @@
                 <a:tabLst/>
                 <a:defRPr/>
               </a:pPr>
-              <a:t>8/16/2022</a:t>
+              <a:t>8/22/2022</a:t>
             </a:fld>
             <a:endParaRPr kumimoji="0" lang="en-US" sz="1200" b="0" i="0" u="none" strike="noStrike" kern="1200" cap="none" spc="0" normalizeH="0" baseline="0" noProof="0">
               <a:ln>
@@ -3667,7 +3667,7 @@
                 <a:tabLst/>
                 <a:defRPr/>
               </a:pPr>
-              <a:t>8/16/2022</a:t>
+              <a:t>8/22/2022</a:t>
             </a:fld>
             <a:endParaRPr kumimoji="0" lang="en-US" sz="1200" b="0" i="0" u="none" strike="noStrike" kern="1200" cap="none" spc="0" normalizeH="0" baseline="0" noProof="0">
               <a:ln>
@@ -4035,7 +4035,7 @@
                 <a:tabLst/>
                 <a:defRPr/>
               </a:pPr>
-              <a:t>8/16/2022</a:t>
+              <a:t>8/22/2022</a:t>
             </a:fld>
             <a:endParaRPr kumimoji="0" lang="en-US" sz="1200" b="0" i="0" u="none" strike="noStrike" kern="1200" cap="none" spc="0" normalizeH="0" baseline="0" noProof="0">
               <a:ln>
@@ -5001,7 +5001,7 @@
                 <a:tabLst/>
                 <a:defRPr/>
               </a:pPr>
-              <a:t>8/16/2022</a:t>
+              <a:t>8/22/2022</a:t>
             </a:fld>
             <a:endParaRPr kumimoji="0" lang="en-US" sz="1200" b="0" i="0" u="none" strike="noStrike" kern="1200" cap="none" spc="0" normalizeH="0" baseline="0" noProof="0">
               <a:ln>
@@ -5411,7 +5411,7 @@
                 <a:tabLst/>
                 <a:defRPr/>
               </a:pPr>
-              <a:t>8/16/2022</a:t>
+              <a:t>8/22/2022</a:t>
             </a:fld>
             <a:endParaRPr kumimoji="0" lang="en-US" sz="1200" b="0" i="0" u="none" strike="noStrike" kern="1200" cap="none" spc="0" normalizeH="0" baseline="0" noProof="0">
               <a:ln>
@@ -5753,7 +5753,7 @@
                 <a:tabLst/>
                 <a:defRPr/>
               </a:pPr>
-              <a:t>8/16/2022</a:t>
+              <a:t>8/22/2022</a:t>
             </a:fld>
             <a:endParaRPr kumimoji="0" lang="en-US" sz="1200" b="0" i="0" u="none" strike="noStrike" kern="1200" cap="none" spc="0" normalizeH="0" baseline="0" noProof="0">
               <a:ln>
@@ -6226,7 +6226,7 @@
                 <a:tabLst/>
                 <a:defRPr/>
               </a:pPr>
-              <a:t>8/16/2022</a:t>
+              <a:t>8/22/2022</a:t>
             </a:fld>
             <a:endParaRPr kumimoji="0" lang="en-US" sz="1200" b="0" i="0" u="none" strike="noStrike" kern="1200" cap="none" spc="0" normalizeH="0" baseline="0" noProof="0">
               <a:ln>
@@ -6687,7 +6687,7 @@
                 <a:tabLst/>
                 <a:defRPr/>
               </a:pPr>
-              <a:t>8/16/2022</a:t>
+              <a:t>8/22/2022</a:t>
             </a:fld>
             <a:endParaRPr kumimoji="0" lang="en-US" sz="1200" b="0" i="0" u="none" strike="noStrike" kern="1200" cap="none" spc="0" normalizeH="0" baseline="0" noProof="0">
               <a:ln>
@@ -7295,7 +7295,7 @@
                 <a:tabLst/>
                 <a:defRPr/>
               </a:pPr>
-              <a:t>8/16/2022</a:t>
+              <a:t>8/22/2022</a:t>
             </a:fld>
             <a:endParaRPr kumimoji="0" lang="en-US" sz="1200" b="0" i="0" u="none" strike="noStrike" kern="1200" cap="none" spc="0" normalizeH="0" baseline="0" noProof="0">
               <a:ln>
@@ -7568,7 +7568,7 @@
                 <a:tabLst/>
                 <a:defRPr/>
               </a:pPr>
-              <a:t>8/16/2022</a:t>
+              <a:t>8/22/2022</a:t>
             </a:fld>
             <a:endParaRPr kumimoji="0" lang="en-US" sz="1200" b="0" i="0" u="none" strike="noStrike" kern="1200" cap="none" spc="0" normalizeH="0" baseline="0" noProof="0">
               <a:ln>
@@ -8039,7 +8039,7 @@
                 <a:tabLst/>
                 <a:defRPr/>
               </a:pPr>
-              <a:t>8/16/2022</a:t>
+              <a:t>8/22/2022</a:t>
             </a:fld>
             <a:endParaRPr kumimoji="0" lang="en-US" sz="1200" b="0" i="0" u="none" strike="noStrike" kern="1200" cap="none" spc="0" normalizeH="0" baseline="0" noProof="0">
               <a:ln>
@@ -8440,7 +8440,7 @@
                 <a:tabLst/>
                 <a:defRPr/>
               </a:pPr>
-              <a:t>8/16/2022</a:t>
+              <a:t>8/22/2022</a:t>
             </a:fld>
             <a:endParaRPr kumimoji="0" lang="en-US" sz="1200" b="0" i="0" u="none" strike="noStrike" kern="1200" cap="none" spc="0" normalizeH="0" baseline="0" noProof="0">
               <a:ln>
@@ -12826,7 +12826,7 @@
           </a:ln>
           <a:extLst>
             <a:ext uri="{C572A759-6A51-4108-AA02-DFA0A04FC94B}">
-              <ma14:wrappingTextBoxFlag xmlns:ma14="http://schemas.microsoft.com/office/mac/drawingml/2011/main" xmlns:a14="http://schemas.microsoft.com/office/drawing/2010/main" xmlns:m="http://schemas.openxmlformats.org/officeDocument/2006/math" xmlns="" val="1"/>
+              <ma14:wrappingTextBoxFlag xmlns="" xmlns:m="http://schemas.openxmlformats.org/officeDocument/2006/math" xmlns:a14="http://schemas.microsoft.com/office/drawing/2010/main" xmlns:ma14="http://schemas.microsoft.com/office/mac/drawingml/2011/main" val="1"/>
             </a:ext>
           </a:extLst>
         </p:spPr>
@@ -13415,7 +13415,7 @@
           </a:ln>
           <a:extLst>
             <a:ext uri="{C572A759-6A51-4108-AA02-DFA0A04FC94B}">
-              <ma14:wrappingTextBoxFlag xmlns:ma14="http://schemas.microsoft.com/office/mac/drawingml/2011/main" xmlns:a14="http://schemas.microsoft.com/office/drawing/2010/main" xmlns:m="http://schemas.openxmlformats.org/officeDocument/2006/math" xmlns="" val="1"/>
+              <ma14:wrappingTextBoxFlag xmlns="" xmlns:m="http://schemas.openxmlformats.org/officeDocument/2006/math" xmlns:a14="http://schemas.microsoft.com/office/drawing/2010/main" xmlns:ma14="http://schemas.microsoft.com/office/mac/drawingml/2011/main" val="1"/>
             </a:ext>
           </a:extLst>
         </p:spPr>
@@ -14616,7 +14616,7 @@
             <a:effectLst/>
             <a:extLst>
               <a:ext uri="{C572A759-6A51-4108-AA02-DFA0A04FC94B}">
-                <ma14:wrappingTextBoxFlag xmlns:ma14="http://schemas.microsoft.com/office/mac/drawingml/2011/main" xmlns:a14="http://schemas.microsoft.com/office/drawing/2010/main" xmlns:m="http://schemas.openxmlformats.org/officeDocument/2006/math" xmlns="" val="1"/>
+                <ma14:wrappingTextBoxFlag xmlns="" xmlns:m="http://schemas.openxmlformats.org/officeDocument/2006/math" xmlns:a14="http://schemas.microsoft.com/office/drawing/2010/main" xmlns:ma14="http://schemas.microsoft.com/office/mac/drawingml/2011/main" val="1"/>
               </a:ext>
             </a:extLst>
           </p:spPr>
@@ -14685,7 +14685,7 @@
             <a:effectLst/>
             <a:extLst>
               <a:ext uri="{C572A759-6A51-4108-AA02-DFA0A04FC94B}">
-                <ma14:wrappingTextBoxFlag xmlns:ma14="http://schemas.microsoft.com/office/mac/drawingml/2011/main" xmlns:a14="http://schemas.microsoft.com/office/drawing/2010/main" xmlns:m="http://schemas.openxmlformats.org/officeDocument/2006/math" xmlns="" val="1"/>
+                <ma14:wrappingTextBoxFlag xmlns="" xmlns:m="http://schemas.openxmlformats.org/officeDocument/2006/math" xmlns:a14="http://schemas.microsoft.com/office/drawing/2010/main" xmlns:ma14="http://schemas.microsoft.com/office/mac/drawingml/2011/main" val="1"/>
               </a:ext>
             </a:extLst>
           </p:spPr>
@@ -14751,7 +14751,7 @@
             </a:ln>
             <a:extLst>
               <a:ext uri="{C572A759-6A51-4108-AA02-DFA0A04FC94B}">
-                <ma14:wrappingTextBoxFlag xmlns:ma14="http://schemas.microsoft.com/office/mac/drawingml/2011/main" xmlns:a14="http://schemas.microsoft.com/office/drawing/2010/main" xmlns:m="http://schemas.openxmlformats.org/officeDocument/2006/math" xmlns="" val="1"/>
+                <ma14:wrappingTextBoxFlag xmlns="" xmlns:m="http://schemas.openxmlformats.org/officeDocument/2006/math" xmlns:a14="http://schemas.microsoft.com/office/drawing/2010/main" xmlns:ma14="http://schemas.microsoft.com/office/mac/drawingml/2011/main" val="1"/>
               </a:ext>
             </a:extLst>
           </p:spPr>
@@ -14809,7 +14809,7 @@
             </a:ln>
             <a:extLst>
               <a:ext uri="{C572A759-6A51-4108-AA02-DFA0A04FC94B}">
-                <ma14:wrappingTextBoxFlag xmlns:ma14="http://schemas.microsoft.com/office/mac/drawingml/2011/main" xmlns:a14="http://schemas.microsoft.com/office/drawing/2010/main" xmlns:m="http://schemas.openxmlformats.org/officeDocument/2006/math" xmlns="" val="1"/>
+                <ma14:wrappingTextBoxFlag xmlns="" xmlns:m="http://schemas.openxmlformats.org/officeDocument/2006/math" xmlns:a14="http://schemas.microsoft.com/office/drawing/2010/main" xmlns:ma14="http://schemas.microsoft.com/office/mac/drawingml/2011/main" val="1"/>
               </a:ext>
             </a:extLst>
           </p:spPr>
@@ -14890,7 +14890,7 @@
             <a:effectLst/>
             <a:extLst>
               <a:ext uri="{C572A759-6A51-4108-AA02-DFA0A04FC94B}">
-                <ma14:wrappingTextBoxFlag xmlns:ma14="http://schemas.microsoft.com/office/mac/drawingml/2011/main" xmlns:a14="http://schemas.microsoft.com/office/drawing/2010/main" xmlns:m="http://schemas.openxmlformats.org/officeDocument/2006/math" xmlns="" val="1"/>
+                <ma14:wrappingTextBoxFlag xmlns="" xmlns:m="http://schemas.openxmlformats.org/officeDocument/2006/math" xmlns:a14="http://schemas.microsoft.com/office/drawing/2010/main" xmlns:ma14="http://schemas.microsoft.com/office/mac/drawingml/2011/main" val="1"/>
               </a:ext>
             </a:extLst>
           </p:spPr>
@@ -14963,7 +14963,7 @@
             <a:effectLst/>
             <a:extLst>
               <a:ext uri="{C572A759-6A51-4108-AA02-DFA0A04FC94B}">
-                <ma14:wrappingTextBoxFlag xmlns:ma14="http://schemas.microsoft.com/office/mac/drawingml/2011/main" xmlns:a14="http://schemas.microsoft.com/office/drawing/2010/main" xmlns:m="http://schemas.openxmlformats.org/officeDocument/2006/math" xmlns="" val="1"/>
+                <ma14:wrappingTextBoxFlag xmlns="" xmlns:m="http://schemas.openxmlformats.org/officeDocument/2006/math" xmlns:a14="http://schemas.microsoft.com/office/drawing/2010/main" xmlns:ma14="http://schemas.microsoft.com/office/mac/drawingml/2011/main" val="1"/>
               </a:ext>
             </a:extLst>
           </p:spPr>
@@ -15029,7 +15029,7 @@
             </a:ln>
             <a:extLst>
               <a:ext uri="{C572A759-6A51-4108-AA02-DFA0A04FC94B}">
-                <ma14:wrappingTextBoxFlag xmlns:ma14="http://schemas.microsoft.com/office/mac/drawingml/2011/main" xmlns:a14="http://schemas.microsoft.com/office/drawing/2010/main" xmlns:m="http://schemas.openxmlformats.org/officeDocument/2006/math" xmlns="" val="1"/>
+                <ma14:wrappingTextBoxFlag xmlns="" xmlns:m="http://schemas.openxmlformats.org/officeDocument/2006/math" xmlns:a14="http://schemas.microsoft.com/office/drawing/2010/main" xmlns:ma14="http://schemas.microsoft.com/office/mac/drawingml/2011/main" val="1"/>
               </a:ext>
             </a:extLst>
           </p:spPr>
@@ -15087,7 +15087,7 @@
             </a:ln>
             <a:extLst>
               <a:ext uri="{C572A759-6A51-4108-AA02-DFA0A04FC94B}">
-                <ma14:wrappingTextBoxFlag xmlns:ma14="http://schemas.microsoft.com/office/mac/drawingml/2011/main" xmlns:a14="http://schemas.microsoft.com/office/drawing/2010/main" xmlns:m="http://schemas.openxmlformats.org/officeDocument/2006/math" xmlns="" val="1"/>
+                <ma14:wrappingTextBoxFlag xmlns="" xmlns:m="http://schemas.openxmlformats.org/officeDocument/2006/math" xmlns:a14="http://schemas.microsoft.com/office/drawing/2010/main" xmlns:ma14="http://schemas.microsoft.com/office/mac/drawingml/2011/main" val="1"/>
               </a:ext>
             </a:extLst>
           </p:spPr>
@@ -15168,7 +15168,7 @@
             <a:effectLst/>
             <a:extLst>
               <a:ext uri="{C572A759-6A51-4108-AA02-DFA0A04FC94B}">
-                <ma14:wrappingTextBoxFlag xmlns:ma14="http://schemas.microsoft.com/office/mac/drawingml/2011/main" xmlns:a14="http://schemas.microsoft.com/office/drawing/2010/main" xmlns:m="http://schemas.openxmlformats.org/officeDocument/2006/math" xmlns="" val="1"/>
+                <ma14:wrappingTextBoxFlag xmlns="" xmlns:m="http://schemas.openxmlformats.org/officeDocument/2006/math" xmlns:a14="http://schemas.microsoft.com/office/drawing/2010/main" xmlns:ma14="http://schemas.microsoft.com/office/mac/drawingml/2011/main" val="1"/>
               </a:ext>
             </a:extLst>
           </p:spPr>
@@ -15241,7 +15241,7 @@
             <a:effectLst/>
             <a:extLst>
               <a:ext uri="{C572A759-6A51-4108-AA02-DFA0A04FC94B}">
-                <ma14:wrappingTextBoxFlag xmlns:ma14="http://schemas.microsoft.com/office/mac/drawingml/2011/main" xmlns:a14="http://schemas.microsoft.com/office/drawing/2010/main" xmlns:m="http://schemas.openxmlformats.org/officeDocument/2006/math" xmlns="" val="1"/>
+                <ma14:wrappingTextBoxFlag xmlns="" xmlns:m="http://schemas.openxmlformats.org/officeDocument/2006/math" xmlns:a14="http://schemas.microsoft.com/office/drawing/2010/main" xmlns:ma14="http://schemas.microsoft.com/office/mac/drawingml/2011/main" val="1"/>
               </a:ext>
             </a:extLst>
           </p:spPr>
@@ -15307,7 +15307,7 @@
             </a:ln>
             <a:extLst>
               <a:ext uri="{C572A759-6A51-4108-AA02-DFA0A04FC94B}">
-                <ma14:wrappingTextBoxFlag xmlns:ma14="http://schemas.microsoft.com/office/mac/drawingml/2011/main" xmlns:a14="http://schemas.microsoft.com/office/drawing/2010/main" xmlns:m="http://schemas.openxmlformats.org/officeDocument/2006/math" xmlns="" val="1"/>
+                <ma14:wrappingTextBoxFlag xmlns="" xmlns:m="http://schemas.openxmlformats.org/officeDocument/2006/math" xmlns:a14="http://schemas.microsoft.com/office/drawing/2010/main" xmlns:ma14="http://schemas.microsoft.com/office/mac/drawingml/2011/main" val="1"/>
               </a:ext>
             </a:extLst>
           </p:spPr>
@@ -15365,7 +15365,7 @@
             </a:ln>
             <a:extLst>
               <a:ext uri="{C572A759-6A51-4108-AA02-DFA0A04FC94B}">
-                <ma14:wrappingTextBoxFlag xmlns:ma14="http://schemas.microsoft.com/office/mac/drawingml/2011/main" xmlns:a14="http://schemas.microsoft.com/office/drawing/2010/main" xmlns:m="http://schemas.openxmlformats.org/officeDocument/2006/math" xmlns="" val="1"/>
+                <ma14:wrappingTextBoxFlag xmlns="" xmlns:m="http://schemas.openxmlformats.org/officeDocument/2006/math" xmlns:a14="http://schemas.microsoft.com/office/drawing/2010/main" xmlns:ma14="http://schemas.microsoft.com/office/mac/drawingml/2011/main" val="1"/>
               </a:ext>
             </a:extLst>
           </p:spPr>
@@ -15446,7 +15446,7 @@
             <a:effectLst/>
             <a:extLst>
               <a:ext uri="{C572A759-6A51-4108-AA02-DFA0A04FC94B}">
-                <ma14:wrappingTextBoxFlag xmlns:ma14="http://schemas.microsoft.com/office/mac/drawingml/2011/main" xmlns:a14="http://schemas.microsoft.com/office/drawing/2010/main" xmlns:m="http://schemas.openxmlformats.org/officeDocument/2006/math" xmlns="" val="1"/>
+                <ma14:wrappingTextBoxFlag xmlns="" xmlns:m="http://schemas.openxmlformats.org/officeDocument/2006/math" xmlns:a14="http://schemas.microsoft.com/office/drawing/2010/main" xmlns:ma14="http://schemas.microsoft.com/office/mac/drawingml/2011/main" val="1"/>
               </a:ext>
             </a:extLst>
           </p:spPr>
@@ -15515,7 +15515,7 @@
             <a:effectLst/>
             <a:extLst>
               <a:ext uri="{C572A759-6A51-4108-AA02-DFA0A04FC94B}">
-                <ma14:wrappingTextBoxFlag xmlns:ma14="http://schemas.microsoft.com/office/mac/drawingml/2011/main" xmlns:a14="http://schemas.microsoft.com/office/drawing/2010/main" xmlns:m="http://schemas.openxmlformats.org/officeDocument/2006/math" xmlns="" val="1"/>
+                <ma14:wrappingTextBoxFlag xmlns="" xmlns:m="http://schemas.openxmlformats.org/officeDocument/2006/math" xmlns:a14="http://schemas.microsoft.com/office/drawing/2010/main" xmlns:ma14="http://schemas.microsoft.com/office/mac/drawingml/2011/main" val="1"/>
               </a:ext>
             </a:extLst>
           </p:spPr>
@@ -15581,7 +15581,7 @@
             </a:ln>
             <a:extLst>
               <a:ext uri="{C572A759-6A51-4108-AA02-DFA0A04FC94B}">
-                <ma14:wrappingTextBoxFlag xmlns:ma14="http://schemas.microsoft.com/office/mac/drawingml/2011/main" xmlns:a14="http://schemas.microsoft.com/office/drawing/2010/main" xmlns:m="http://schemas.openxmlformats.org/officeDocument/2006/math" xmlns="" val="1"/>
+                <ma14:wrappingTextBoxFlag xmlns="" xmlns:m="http://schemas.openxmlformats.org/officeDocument/2006/math" xmlns:a14="http://schemas.microsoft.com/office/drawing/2010/main" xmlns:ma14="http://schemas.microsoft.com/office/mac/drawingml/2011/main" val="1"/>
               </a:ext>
             </a:extLst>
           </p:spPr>
@@ -15639,7 +15639,7 @@
             </a:ln>
             <a:extLst>
               <a:ext uri="{C572A759-6A51-4108-AA02-DFA0A04FC94B}">
-                <ma14:wrappingTextBoxFlag xmlns:ma14="http://schemas.microsoft.com/office/mac/drawingml/2011/main" xmlns:a14="http://schemas.microsoft.com/office/drawing/2010/main" xmlns:m="http://schemas.openxmlformats.org/officeDocument/2006/math" xmlns="" val="1"/>
+                <ma14:wrappingTextBoxFlag xmlns="" xmlns:m="http://schemas.openxmlformats.org/officeDocument/2006/math" xmlns:a14="http://schemas.microsoft.com/office/drawing/2010/main" xmlns:ma14="http://schemas.microsoft.com/office/mac/drawingml/2011/main" val="1"/>
               </a:ext>
             </a:extLst>
           </p:spPr>
@@ -15720,7 +15720,7 @@
             <a:effectLst/>
             <a:extLst>
               <a:ext uri="{C572A759-6A51-4108-AA02-DFA0A04FC94B}">
-                <ma14:wrappingTextBoxFlag xmlns:ma14="http://schemas.microsoft.com/office/mac/drawingml/2011/main" xmlns:a14="http://schemas.microsoft.com/office/drawing/2010/main" xmlns:m="http://schemas.openxmlformats.org/officeDocument/2006/math" xmlns="" val="1"/>
+                <ma14:wrappingTextBoxFlag xmlns="" xmlns:m="http://schemas.openxmlformats.org/officeDocument/2006/math" xmlns:a14="http://schemas.microsoft.com/office/drawing/2010/main" xmlns:ma14="http://schemas.microsoft.com/office/mac/drawingml/2011/main" val="1"/>
               </a:ext>
             </a:extLst>
           </p:spPr>
@@ -15793,7 +15793,7 @@
             <a:effectLst/>
             <a:extLst>
               <a:ext uri="{C572A759-6A51-4108-AA02-DFA0A04FC94B}">
-                <ma14:wrappingTextBoxFlag xmlns:ma14="http://schemas.microsoft.com/office/mac/drawingml/2011/main" xmlns:a14="http://schemas.microsoft.com/office/drawing/2010/main" xmlns:m="http://schemas.openxmlformats.org/officeDocument/2006/math" xmlns="" val="1"/>
+                <ma14:wrappingTextBoxFlag xmlns="" xmlns:m="http://schemas.openxmlformats.org/officeDocument/2006/math" xmlns:a14="http://schemas.microsoft.com/office/drawing/2010/main" xmlns:ma14="http://schemas.microsoft.com/office/mac/drawingml/2011/main" val="1"/>
               </a:ext>
             </a:extLst>
           </p:spPr>
@@ -15859,7 +15859,7 @@
             </a:ln>
             <a:extLst>
               <a:ext uri="{C572A759-6A51-4108-AA02-DFA0A04FC94B}">
-                <ma14:wrappingTextBoxFlag xmlns:ma14="http://schemas.microsoft.com/office/mac/drawingml/2011/main" xmlns:a14="http://schemas.microsoft.com/office/drawing/2010/main" xmlns:m="http://schemas.openxmlformats.org/officeDocument/2006/math" xmlns="" val="1"/>
+                <ma14:wrappingTextBoxFlag xmlns="" xmlns:m="http://schemas.openxmlformats.org/officeDocument/2006/math" xmlns:a14="http://schemas.microsoft.com/office/drawing/2010/main" xmlns:ma14="http://schemas.microsoft.com/office/mac/drawingml/2011/main" val="1"/>
               </a:ext>
             </a:extLst>
           </p:spPr>
@@ -15917,7 +15917,7 @@
             </a:ln>
             <a:extLst>
               <a:ext uri="{C572A759-6A51-4108-AA02-DFA0A04FC94B}">
-                <ma14:wrappingTextBoxFlag xmlns:ma14="http://schemas.microsoft.com/office/mac/drawingml/2011/main" xmlns:a14="http://schemas.microsoft.com/office/drawing/2010/main" xmlns:m="http://schemas.openxmlformats.org/officeDocument/2006/math" xmlns="" val="1"/>
+                <ma14:wrappingTextBoxFlag xmlns="" xmlns:m="http://schemas.openxmlformats.org/officeDocument/2006/math" xmlns:a14="http://schemas.microsoft.com/office/drawing/2010/main" xmlns:ma14="http://schemas.microsoft.com/office/mac/drawingml/2011/main" val="1"/>
               </a:ext>
             </a:extLst>
           </p:spPr>
@@ -15998,7 +15998,7 @@
             <a:effectLst/>
             <a:extLst>
               <a:ext uri="{C572A759-6A51-4108-AA02-DFA0A04FC94B}">
-                <ma14:wrappingTextBoxFlag xmlns:ma14="http://schemas.microsoft.com/office/mac/drawingml/2011/main" xmlns:a14="http://schemas.microsoft.com/office/drawing/2010/main" xmlns:m="http://schemas.openxmlformats.org/officeDocument/2006/math" xmlns="" val="1"/>
+                <ma14:wrappingTextBoxFlag xmlns="" xmlns:m="http://schemas.openxmlformats.org/officeDocument/2006/math" xmlns:a14="http://schemas.microsoft.com/office/drawing/2010/main" xmlns:ma14="http://schemas.microsoft.com/office/mac/drawingml/2011/main" val="1"/>
               </a:ext>
             </a:extLst>
           </p:spPr>
@@ -16071,7 +16071,7 @@
             <a:effectLst/>
             <a:extLst>
               <a:ext uri="{C572A759-6A51-4108-AA02-DFA0A04FC94B}">
-                <ma14:wrappingTextBoxFlag xmlns:ma14="http://schemas.microsoft.com/office/mac/drawingml/2011/main" xmlns:a14="http://schemas.microsoft.com/office/drawing/2010/main" xmlns:m="http://schemas.openxmlformats.org/officeDocument/2006/math" xmlns="" val="1"/>
+                <ma14:wrappingTextBoxFlag xmlns="" xmlns:m="http://schemas.openxmlformats.org/officeDocument/2006/math" xmlns:a14="http://schemas.microsoft.com/office/drawing/2010/main" xmlns:ma14="http://schemas.microsoft.com/office/mac/drawingml/2011/main" val="1"/>
               </a:ext>
             </a:extLst>
           </p:spPr>
@@ -16137,7 +16137,7 @@
             </a:ln>
             <a:extLst>
               <a:ext uri="{C572A759-6A51-4108-AA02-DFA0A04FC94B}">
-                <ma14:wrappingTextBoxFlag xmlns:ma14="http://schemas.microsoft.com/office/mac/drawingml/2011/main" xmlns:a14="http://schemas.microsoft.com/office/drawing/2010/main" xmlns:m="http://schemas.openxmlformats.org/officeDocument/2006/math" xmlns="" val="1"/>
+                <ma14:wrappingTextBoxFlag xmlns="" xmlns:m="http://schemas.openxmlformats.org/officeDocument/2006/math" xmlns:a14="http://schemas.microsoft.com/office/drawing/2010/main" xmlns:ma14="http://schemas.microsoft.com/office/mac/drawingml/2011/main" val="1"/>
               </a:ext>
             </a:extLst>
           </p:spPr>
@@ -16195,7 +16195,7 @@
             </a:ln>
             <a:extLst>
               <a:ext uri="{C572A759-6A51-4108-AA02-DFA0A04FC94B}">
-                <ma14:wrappingTextBoxFlag xmlns:ma14="http://schemas.microsoft.com/office/mac/drawingml/2011/main" xmlns:a14="http://schemas.microsoft.com/office/drawing/2010/main" xmlns:m="http://schemas.openxmlformats.org/officeDocument/2006/math" xmlns="" val="1"/>
+                <ma14:wrappingTextBoxFlag xmlns="" xmlns:m="http://schemas.openxmlformats.org/officeDocument/2006/math" xmlns:a14="http://schemas.microsoft.com/office/drawing/2010/main" xmlns:ma14="http://schemas.microsoft.com/office/mac/drawingml/2011/main" val="1"/>
               </a:ext>
             </a:extLst>
           </p:spPr>
@@ -16254,7 +16254,7 @@
           </a:ln>
           <a:extLst>
             <a:ext uri="{C572A759-6A51-4108-AA02-DFA0A04FC94B}">
-              <ma14:wrappingTextBoxFlag xmlns:ma14="http://schemas.microsoft.com/office/mac/drawingml/2011/main" xmlns:a14="http://schemas.microsoft.com/office/drawing/2010/main" xmlns:m="http://schemas.openxmlformats.org/officeDocument/2006/math" xmlns="" val="1"/>
+              <ma14:wrappingTextBoxFlag xmlns="" xmlns:m="http://schemas.openxmlformats.org/officeDocument/2006/math" xmlns:a14="http://schemas.microsoft.com/office/drawing/2010/main" xmlns:ma14="http://schemas.microsoft.com/office/mac/drawingml/2011/main" val="1"/>
             </a:ext>
           </a:extLst>
         </p:spPr>
@@ -16312,7 +16312,7 @@
           </a:ln>
           <a:extLst>
             <a:ext uri="{C572A759-6A51-4108-AA02-DFA0A04FC94B}">
-              <ma14:wrappingTextBoxFlag xmlns:ma14="http://schemas.microsoft.com/office/mac/drawingml/2011/main" xmlns:a14="http://schemas.microsoft.com/office/drawing/2010/main" xmlns:m="http://schemas.openxmlformats.org/officeDocument/2006/math" xmlns="" val="1"/>
+              <ma14:wrappingTextBoxFlag xmlns="" xmlns:m="http://schemas.openxmlformats.org/officeDocument/2006/math" xmlns:a14="http://schemas.microsoft.com/office/drawing/2010/main" xmlns:ma14="http://schemas.microsoft.com/office/mac/drawingml/2011/main" val="1"/>
             </a:ext>
           </a:extLst>
         </p:spPr>
@@ -16556,7 +16556,7 @@
             </a:ln>
             <a:extLst>
               <a:ext uri="{C572A759-6A51-4108-AA02-DFA0A04FC94B}">
-                <ma14:wrappingTextBoxFlag xmlns:ma14="http://schemas.microsoft.com/office/mac/drawingml/2011/main" xmlns:a14="http://schemas.microsoft.com/office/drawing/2010/main" xmlns:m="http://schemas.openxmlformats.org/officeDocument/2006/math" xmlns="" val="1"/>
+                <ma14:wrappingTextBoxFlag xmlns="" xmlns:m="http://schemas.openxmlformats.org/officeDocument/2006/math" xmlns:a14="http://schemas.microsoft.com/office/drawing/2010/main" xmlns:ma14="http://schemas.microsoft.com/office/mac/drawingml/2011/main" val="1"/>
               </a:ext>
             </a:extLst>
           </p:spPr>
@@ -17108,7 +17108,7 @@
             </a:ln>
             <a:extLst>
               <a:ext uri="{C572A759-6A51-4108-AA02-DFA0A04FC94B}">
-                <ma14:wrappingTextBoxFlag xmlns:ma14="http://schemas.microsoft.com/office/mac/drawingml/2011/main" xmlns:a14="http://schemas.microsoft.com/office/drawing/2010/main" xmlns:m="http://schemas.openxmlformats.org/officeDocument/2006/math" xmlns="" val="1"/>
+                <ma14:wrappingTextBoxFlag xmlns="" xmlns:m="http://schemas.openxmlformats.org/officeDocument/2006/math" xmlns:a14="http://schemas.microsoft.com/office/drawing/2010/main" xmlns:ma14="http://schemas.microsoft.com/office/mac/drawingml/2011/main" val="1"/>
               </a:ext>
             </a:extLst>
           </p:spPr>
@@ -18331,7 +18331,7 @@
           </a:prstGeom>
           <a:extLst>
             <a:ext uri="{C572A759-6A51-4108-AA02-DFA0A04FC94B}">
-              <ma14:wrappingTextBoxFlag xmlns:ma14="http://schemas.microsoft.com/office/mac/drawingml/2011/main" xmlns:a14="http://schemas.microsoft.com/office/drawing/2010/main" xmlns:m="http://schemas.openxmlformats.org/officeDocument/2006/math" xmlns="" val="1"/>
+              <ma14:wrappingTextBoxFlag xmlns="" xmlns:m="http://schemas.openxmlformats.org/officeDocument/2006/math" xmlns:a14="http://schemas.microsoft.com/office/drawing/2010/main" xmlns:ma14="http://schemas.microsoft.com/office/mac/drawingml/2011/main" val="1"/>
             </a:ext>
           </a:extLst>
         </p:spPr>
@@ -19078,7 +19078,7 @@
             <a:effectLst/>
             <a:extLst>
               <a:ext uri="{C572A759-6A51-4108-AA02-DFA0A04FC94B}">
-                <ma14:wrappingTextBoxFlag xmlns="" xmlns:m="http://schemas.openxmlformats.org/officeDocument/2006/math" xmlns:a14="http://schemas.microsoft.com/office/drawing/2010/main" xmlns:ma14="http://schemas.microsoft.com/office/mac/drawingml/2011/main" val="1"/>
+                <ma14:wrappingTextBoxFlag xmlns:ma14="http://schemas.microsoft.com/office/mac/drawingml/2011/main" xmlns:a14="http://schemas.microsoft.com/office/drawing/2010/main" xmlns:m="http://schemas.openxmlformats.org/officeDocument/2006/math" xmlns="" val="1"/>
               </a:ext>
             </a:extLst>
           </p:spPr>
@@ -19361,7 +19361,7 @@
             <a:effectLst/>
             <a:extLst>
               <a:ext uri="{C572A759-6A51-4108-AA02-DFA0A04FC94B}">
-                <ma14:wrappingTextBoxFlag xmlns="" xmlns:m="http://schemas.openxmlformats.org/officeDocument/2006/math" xmlns:a14="http://schemas.microsoft.com/office/drawing/2010/main" xmlns:ma14="http://schemas.microsoft.com/office/mac/drawingml/2011/main" val="1"/>
+                <ma14:wrappingTextBoxFlag xmlns:ma14="http://schemas.microsoft.com/office/mac/drawingml/2011/main" xmlns:a14="http://schemas.microsoft.com/office/drawing/2010/main" xmlns:m="http://schemas.openxmlformats.org/officeDocument/2006/math" xmlns="" val="1"/>
               </a:ext>
             </a:extLst>
           </p:spPr>
@@ -20495,7 +20495,7 @@
             <a:effectLst/>
             <a:extLst>
               <a:ext uri="{C572A759-6A51-4108-AA02-DFA0A04FC94B}">
-                <ma14:wrappingTextBoxFlag xmlns:ma14="http://schemas.microsoft.com/office/mac/drawingml/2011/main" xmlns:a14="http://schemas.microsoft.com/office/drawing/2010/main" xmlns:m="http://schemas.openxmlformats.org/officeDocument/2006/math" xmlns="" val="1"/>
+                <ma14:wrappingTextBoxFlag xmlns="" xmlns:m="http://schemas.openxmlformats.org/officeDocument/2006/math" xmlns:a14="http://schemas.microsoft.com/office/drawing/2010/main" xmlns:ma14="http://schemas.microsoft.com/office/mac/drawingml/2011/main" val="1"/>
               </a:ext>
             </a:extLst>
           </p:spPr>
@@ -20760,7 +20760,7 @@
             <a:effectLst/>
             <a:extLst>
               <a:ext uri="{C572A759-6A51-4108-AA02-DFA0A04FC94B}">
-                <ma14:wrappingTextBoxFlag xmlns:ma14="http://schemas.microsoft.com/office/mac/drawingml/2011/main" xmlns:a14="http://schemas.microsoft.com/office/drawing/2010/main" xmlns:m="http://schemas.openxmlformats.org/officeDocument/2006/math" xmlns="" val="1"/>
+                <ma14:wrappingTextBoxFlag xmlns="" xmlns:m="http://schemas.openxmlformats.org/officeDocument/2006/math" xmlns:a14="http://schemas.microsoft.com/office/drawing/2010/main" xmlns:ma14="http://schemas.microsoft.com/office/mac/drawingml/2011/main" val="1"/>
               </a:ext>
             </a:extLst>
           </p:spPr>
@@ -22334,7 +22334,7 @@
             <a:effectLst/>
             <a:extLst>
               <a:ext uri="{C572A759-6A51-4108-AA02-DFA0A04FC94B}">
-                <ma14:wrappingTextBoxFlag xmlns="" xmlns:m="http://schemas.openxmlformats.org/officeDocument/2006/math" xmlns:a14="http://schemas.microsoft.com/office/drawing/2010/main" xmlns:ma14="http://schemas.microsoft.com/office/mac/drawingml/2011/main" val="1"/>
+                <ma14:wrappingTextBoxFlag xmlns:ma14="http://schemas.microsoft.com/office/mac/drawingml/2011/main" xmlns:a14="http://schemas.microsoft.com/office/drawing/2010/main" xmlns:m="http://schemas.openxmlformats.org/officeDocument/2006/math" xmlns="" val="1"/>
               </a:ext>
             </a:extLst>
           </p:spPr>
@@ -26650,7 +26650,7 @@
             <a:effectLst/>
             <a:extLst>
               <a:ext uri="{C572A759-6A51-4108-AA02-DFA0A04FC94B}">
-                <ma14:wrappingTextBoxFlag xmlns="" xmlns:m="http://schemas.openxmlformats.org/officeDocument/2006/math" xmlns:a14="http://schemas.microsoft.com/office/drawing/2010/main" xmlns:ma14="http://schemas.microsoft.com/office/mac/drawingml/2011/main" val="1"/>
+                <ma14:wrappingTextBoxFlag xmlns:ma14="http://schemas.microsoft.com/office/mac/drawingml/2011/main" xmlns:a14="http://schemas.microsoft.com/office/drawing/2010/main" xmlns:m="http://schemas.openxmlformats.org/officeDocument/2006/math" xmlns="" val="1"/>
               </a:ext>
             </a:extLst>
           </p:spPr>
@@ -26953,7 +26953,7 @@
           </a:prstGeom>
           <a:extLst>
             <a:ext uri="{C572A759-6A51-4108-AA02-DFA0A04FC94B}">
-              <ma14:wrappingTextBoxFlag xmlns="" xmlns:m="http://schemas.openxmlformats.org/officeDocument/2006/math" xmlns:a14="http://schemas.microsoft.com/office/drawing/2010/main" xmlns:ma14="http://schemas.microsoft.com/office/mac/drawingml/2011/main" val="1"/>
+              <ma14:wrappingTextBoxFlag xmlns:ma14="http://schemas.microsoft.com/office/mac/drawingml/2011/main" xmlns:a14="http://schemas.microsoft.com/office/drawing/2010/main" xmlns:m="http://schemas.openxmlformats.org/officeDocument/2006/math" xmlns="" val="1"/>
             </a:ext>
           </a:extLst>
         </p:spPr>
@@ -26991,7 +26991,7 @@
           </a:ln>
           <a:extLst>
             <a:ext uri="{C572A759-6A51-4108-AA02-DFA0A04FC94B}">
-              <ma14:wrappingTextBoxFlag xmlns="" xmlns:m="http://schemas.openxmlformats.org/officeDocument/2006/math" xmlns:a14="http://schemas.microsoft.com/office/drawing/2010/main" xmlns:ma14="http://schemas.microsoft.com/office/mac/drawingml/2011/main" val="1"/>
+              <ma14:wrappingTextBoxFlag xmlns:ma14="http://schemas.microsoft.com/office/mac/drawingml/2011/main" xmlns:a14="http://schemas.microsoft.com/office/drawing/2010/main" xmlns:m="http://schemas.openxmlformats.org/officeDocument/2006/math" xmlns="" val="1"/>
             </a:ext>
           </a:extLst>
         </p:spPr>
@@ -28058,7 +28058,7 @@
           </a:ln>
           <a:extLst>
             <a:ext uri="{C572A759-6A51-4108-AA02-DFA0A04FC94B}">
-              <ma14:wrappingTextBoxFlag xmlns="" xmlns:m="http://schemas.openxmlformats.org/officeDocument/2006/math" xmlns:a14="http://schemas.microsoft.com/office/drawing/2010/main" xmlns:ma14="http://schemas.microsoft.com/office/mac/drawingml/2011/main" val="1"/>
+              <ma14:wrappingTextBoxFlag xmlns:ma14="http://schemas.microsoft.com/office/mac/drawingml/2011/main" xmlns:a14="http://schemas.microsoft.com/office/drawing/2010/main" xmlns:m="http://schemas.openxmlformats.org/officeDocument/2006/math" xmlns="" val="1"/>
             </a:ext>
           </a:extLst>
         </p:spPr>
@@ -29090,7 +29090,7 @@
           </a:ln>
           <a:extLst>
             <a:ext uri="{C572A759-6A51-4108-AA02-DFA0A04FC94B}">
-              <ma14:wrappingTextBoxFlag xmlns="" xmlns:m="http://schemas.openxmlformats.org/officeDocument/2006/math" xmlns:a14="http://schemas.microsoft.com/office/drawing/2010/main" xmlns:ma14="http://schemas.microsoft.com/office/mac/drawingml/2011/main" val="1"/>
+              <ma14:wrappingTextBoxFlag xmlns:ma14="http://schemas.microsoft.com/office/mac/drawingml/2011/main" xmlns:a14="http://schemas.microsoft.com/office/drawing/2010/main" xmlns:m="http://schemas.openxmlformats.org/officeDocument/2006/math" xmlns="" val="1"/>
             </a:ext>
           </a:extLst>
         </p:spPr>
@@ -29148,7 +29148,7 @@
           </a:ln>
           <a:extLst>
             <a:ext uri="{C572A759-6A51-4108-AA02-DFA0A04FC94B}">
-              <ma14:wrappingTextBoxFlag xmlns="" xmlns:m="http://schemas.openxmlformats.org/officeDocument/2006/math" xmlns:a14="http://schemas.microsoft.com/office/drawing/2010/main" xmlns:ma14="http://schemas.microsoft.com/office/mac/drawingml/2011/main" val="1"/>
+              <ma14:wrappingTextBoxFlag xmlns:ma14="http://schemas.microsoft.com/office/mac/drawingml/2011/main" xmlns:a14="http://schemas.microsoft.com/office/drawing/2010/main" xmlns:m="http://schemas.openxmlformats.org/officeDocument/2006/math" xmlns="" val="1"/>
             </a:ext>
           </a:extLst>
         </p:spPr>
@@ -29192,7 +29192,7 @@
           </a:ln>
           <a:extLst>
             <a:ext uri="{C572A759-6A51-4108-AA02-DFA0A04FC94B}">
-              <ma14:wrappingTextBoxFlag xmlns="" xmlns:m="http://schemas.openxmlformats.org/officeDocument/2006/math" xmlns:a14="http://schemas.microsoft.com/office/drawing/2010/main" xmlns:ma14="http://schemas.microsoft.com/office/mac/drawingml/2011/main" val="1"/>
+              <ma14:wrappingTextBoxFlag xmlns:ma14="http://schemas.microsoft.com/office/mac/drawingml/2011/main" xmlns:a14="http://schemas.microsoft.com/office/drawing/2010/main" xmlns:m="http://schemas.openxmlformats.org/officeDocument/2006/math" xmlns="" val="1"/>
             </a:ext>
           </a:extLst>
         </p:spPr>
@@ -29228,7 +29228,7 @@
           </a:ln>
           <a:extLst>
             <a:ext uri="{C572A759-6A51-4108-AA02-DFA0A04FC94B}">
-              <ma14:wrappingTextBoxFlag xmlns="" xmlns:m="http://schemas.openxmlformats.org/officeDocument/2006/math" xmlns:a14="http://schemas.microsoft.com/office/drawing/2010/main" xmlns:ma14="http://schemas.microsoft.com/office/mac/drawingml/2011/main" val="1"/>
+              <ma14:wrappingTextBoxFlag xmlns:ma14="http://schemas.microsoft.com/office/mac/drawingml/2011/main" xmlns:a14="http://schemas.microsoft.com/office/drawing/2010/main" xmlns:m="http://schemas.openxmlformats.org/officeDocument/2006/math" xmlns="" val="1"/>
             </a:ext>
           </a:extLst>
         </p:spPr>
@@ -29316,7 +29316,7 @@
             <a:effectLst/>
             <a:extLst>
               <a:ext uri="{C572A759-6A51-4108-AA02-DFA0A04FC94B}">
-                <ma14:wrappingTextBoxFlag xmlns="" xmlns:m="http://schemas.openxmlformats.org/officeDocument/2006/math" xmlns:a14="http://schemas.microsoft.com/office/drawing/2010/main" xmlns:ma14="http://schemas.microsoft.com/office/mac/drawingml/2011/main" val="1"/>
+                <ma14:wrappingTextBoxFlag xmlns:ma14="http://schemas.microsoft.com/office/mac/drawingml/2011/main" xmlns:a14="http://schemas.microsoft.com/office/drawing/2010/main" xmlns:m="http://schemas.openxmlformats.org/officeDocument/2006/math" xmlns="" val="1"/>
               </a:ext>
             </a:extLst>
           </p:spPr>
@@ -29578,7 +29578,7 @@
             <a:effectLst/>
             <a:extLst>
               <a:ext uri="{C572A759-6A51-4108-AA02-DFA0A04FC94B}">
-                <ma14:wrappingTextBoxFlag xmlns="" xmlns:m="http://schemas.openxmlformats.org/officeDocument/2006/math" xmlns:a14="http://schemas.microsoft.com/office/drawing/2010/main" xmlns:ma14="http://schemas.microsoft.com/office/mac/drawingml/2011/main" val="1"/>
+                <ma14:wrappingTextBoxFlag xmlns:ma14="http://schemas.microsoft.com/office/mac/drawingml/2011/main" xmlns:a14="http://schemas.microsoft.com/office/drawing/2010/main" xmlns:m="http://schemas.openxmlformats.org/officeDocument/2006/math" xmlns="" val="1"/>
               </a:ext>
             </a:extLst>
           </p:spPr>
@@ -31524,100 +31524,26 @@
         </p:nvSpPr>
         <p:spPr>
           <a:xfrm>
-            <a:off x="0" y="2124075"/>
-            <a:ext cx="5597525" cy="4127500"/>
+            <a:off x="378738" y="1722165"/>
+            <a:ext cx="5597525" cy="1325563"/>
           </a:xfrm>
         </p:spPr>
         <p:txBody>
-          <a:bodyPr/>
+          <a:bodyPr>
+            <a:normAutofit fontScale="85000" lnSpcReduction="20000"/>
+          </a:bodyPr>
           <a:lstStyle/>
           <a:p>
             <a:r>
               <a:rPr lang="en-US" dirty="0"/>
-              <a:t>Utilize</a:t>
-            </a:r>
-            <a:r>
-              <a:rPr lang="en-US" baseline="0" dirty="0"/>
-              <a:t> this “wasted” time by doing something else</a:t>
-            </a:r>
-          </a:p>
-          <a:p>
-            <a:pPr lvl="1" rtl="0" latinLnBrk="0"/>
-            <a:r>
-              <a:rPr lang="en-US" sz="2400" b="0" i="0" u="none" strike="noStrike" cap="none" spc="0" baseline="0" dirty="0">
-                <a:solidFill>
-                  <a:srgbClr val="000000"/>
-                </a:solidFill>
-                <a:effectLst/>
-                <a:uFillTx/>
-                <a:latin typeface="+mn-lt"/>
-                <a:ea typeface="+mn-ea"/>
-                <a:cs typeface="+mn-cs"/>
-                <a:sym typeface="Helvetica Neue"/>
-              </a:rPr>
-              <a:t>Processing data</a:t>
-            </a:r>
-            <a:endParaRPr lang="en-US" sz="2400" dirty="0">
-              <a:effectLst/>
-            </a:endParaRPr>
-          </a:p>
-          <a:p>
-            <a:pPr lvl="1" rtl="0" latinLnBrk="0"/>
-            <a:r>
-              <a:rPr lang="en-US" sz="2400" b="0" i="0" u="none" strike="noStrike" cap="none" spc="0" baseline="0" dirty="0">
-                <a:solidFill>
-                  <a:srgbClr val="000000"/>
-                </a:solidFill>
-                <a:effectLst/>
-                <a:uFillTx/>
-                <a:latin typeface="+mn-lt"/>
-                <a:ea typeface="+mn-ea"/>
-                <a:cs typeface="+mn-cs"/>
-                <a:sym typeface="Helvetica Neue"/>
-              </a:rPr>
-              <a:t>Communicating with remote hosts</a:t>
-            </a:r>
-            <a:endParaRPr lang="en-US" dirty="0">
-              <a:effectLst/>
-            </a:endParaRPr>
-          </a:p>
-          <a:p>
-            <a:pPr lvl="1" rtl="0" latinLnBrk="0"/>
-            <a:r>
-              <a:rPr lang="en-US" sz="2400" b="0" i="0" u="none" strike="noStrike" cap="none" spc="0" baseline="0" dirty="0">
-                <a:solidFill>
-                  <a:srgbClr val="000000"/>
-                </a:solidFill>
-                <a:effectLst/>
-                <a:uFillTx/>
-                <a:latin typeface="+mn-lt"/>
-                <a:ea typeface="+mn-ea"/>
-                <a:cs typeface="+mn-cs"/>
-                <a:sym typeface="Helvetica Neue"/>
-              </a:rPr>
-              <a:t>Timers that countdown while our app is running</a:t>
-            </a:r>
-            <a:endParaRPr lang="en-US" dirty="0">
-              <a:effectLst/>
-            </a:endParaRPr>
-          </a:p>
-          <a:p>
-            <a:pPr lvl="1" rtl="0" latinLnBrk="0"/>
-            <a:r>
-              <a:rPr lang="en-US" sz="2400" b="0" i="0" u="none" strike="noStrike" cap="none" spc="0" baseline="0" dirty="0">
-                <a:solidFill>
-                  <a:srgbClr val="000000"/>
-                </a:solidFill>
-                <a:effectLst/>
-                <a:uFillTx/>
-                <a:latin typeface="+mn-lt"/>
-                <a:ea typeface="+mn-ea"/>
-                <a:cs typeface="+mn-cs"/>
-                <a:sym typeface="Helvetica Neue"/>
-              </a:rPr>
-              <a:t>Waiting for users to provide input</a:t>
-            </a:r>
-            <a:endParaRPr lang="en-US" dirty="0"/>
+              <a:t>Consider: a 1Ghz CPU executes an instruction every 1 ns</a:t>
+            </a:r>
+          </a:p>
+          <a:p>
+            <a:r>
+              <a:rPr lang="en-US" dirty="0"/>
+              <a:t>Almost anything else takes forever (approximately)</a:t>
+            </a:r>
           </a:p>
         </p:txBody>
       </p:sp>
@@ -31645,7 +31571,7 @@
           </a:prstGeom>
           <a:extLst>
             <a:ext uri="{C572A759-6A51-4108-AA02-DFA0A04FC94B}">
-              <ma14:wrappingTextBoxFlag xmlns="" xmlns:m="http://schemas.openxmlformats.org/officeDocument/2006/math" xmlns:a14="http://schemas.microsoft.com/office/drawing/2010/main" xmlns:ma14="http://schemas.microsoft.com/office/mac/drawingml/2011/main" val="1"/>
+              <ma14:wrappingTextBoxFlag xmlns:ma14="http://schemas.microsoft.com/office/mac/drawingml/2011/main" xmlns:a14="http://schemas.microsoft.com/office/drawing/2010/main" xmlns:m="http://schemas.openxmlformats.org/officeDocument/2006/math" xmlns="" val="1"/>
             </a:ext>
           </a:extLst>
         </p:spPr>
@@ -31961,10 +31887,10 @@
       </p:sp>
       <p:grpSp>
         <p:nvGrpSpPr>
-          <p:cNvPr id="44" name="Group">
+          <p:cNvPr id="4" name="Group 3">
             <a:extLst>
               <a:ext uri="{FF2B5EF4-FFF2-40B4-BE49-F238E27FC236}">
-                <a16:creationId xmlns:a16="http://schemas.microsoft.com/office/drawing/2014/main" id="{D28951AE-72F0-AA4F-8BBE-A01B57F777CE}"/>
+                <a16:creationId xmlns:a16="http://schemas.microsoft.com/office/drawing/2014/main" id="{9CA97BE8-1ED2-DFB2-890D-11E8391B7FC1}"/>
               </a:ext>
             </a:extLst>
           </p:cNvPr>
@@ -31973,224 +31899,18 @@
         </p:nvGrpSpPr>
         <p:grpSpPr>
           <a:xfrm>
-            <a:off x="1601248" y="2680334"/>
-            <a:ext cx="8005516" cy="1561773"/>
-            <a:chOff x="0" y="326479"/>
-            <a:chExt cx="16011027" cy="3123543"/>
+            <a:off x="1859107" y="3193546"/>
+            <a:ext cx="9432664" cy="3138199"/>
+            <a:chOff x="1601248" y="2680334"/>
+            <a:chExt cx="8850152" cy="3138199"/>
           </a:xfrm>
         </p:grpSpPr>
-        <p:sp>
-          <p:nvSpPr>
-            <p:cNvPr id="45" name="CPU 1">
+        <p:grpSp>
+          <p:nvGrpSpPr>
+            <p:cNvPr id="44" name="Group">
               <a:extLst>
                 <a:ext uri="{FF2B5EF4-FFF2-40B4-BE49-F238E27FC236}">
-                  <a16:creationId xmlns:a16="http://schemas.microsoft.com/office/drawing/2014/main" id="{C44283A3-14B9-4F48-B140-E2F448F47176}"/>
-                </a:ext>
-              </a:extLst>
-            </p:cNvPr>
-            <p:cNvSpPr/>
-            <p:nvPr/>
-          </p:nvSpPr>
-          <p:spPr>
-            <a:xfrm>
-              <a:off x="0" y="430659"/>
-              <a:ext cx="6996899" cy="2227679"/>
-            </a:xfrm>
-            <a:prstGeom prst="rect">
-              <a:avLst/>
-            </a:prstGeom>
-            <a:solidFill>
-              <a:srgbClr val="516D7C"/>
-            </a:solidFill>
-            <a:ln w="12700" cap="flat">
-              <a:noFill/>
-              <a:miter lim="400000"/>
-            </a:ln>
-            <a:effectLst>
-              <a:outerShdw blurRad="50800" dist="25400" dir="5400000" rotWithShape="0">
-                <a:srgbClr val="000000">
-                  <a:alpha val="50000"/>
-                </a:srgbClr>
-              </a:outerShdw>
-            </a:effectLst>
-            <a:extLst>
-              <a:ext uri="{C572A759-6A51-4108-AA02-DFA0A04FC94B}">
-                <ma14:wrappingTextBoxFlag xmlns="" xmlns:m="http://schemas.openxmlformats.org/officeDocument/2006/math" xmlns:a14="http://schemas.microsoft.com/office/drawing/2010/main" xmlns:ma14="http://schemas.microsoft.com/office/mac/drawingml/2011/main" val="1"/>
-              </a:ext>
-            </a:extLst>
-          </p:spPr>
-          <p:txBody>
-            <a:bodyPr wrap="square" lIns="35719" tIns="35719" rIns="35719" bIns="35719" numCol="1" anchor="t">
-              <a:noAutofit/>
-            </a:bodyPr>
-            <a:lstStyle>
-              <a:lvl1pPr algn="l">
-                <a:defRPr b="0">
-                  <a:solidFill>
-                    <a:srgbClr val="FFFFFF"/>
-                  </a:solidFill>
-                  <a:latin typeface="Helvetica Light"/>
-                  <a:ea typeface="Helvetica Light"/>
-                  <a:cs typeface="Helvetica Light"/>
-                  <a:sym typeface="Helvetica Light"/>
-                </a:defRPr>
-              </a:lvl1pPr>
-            </a:lstStyle>
-            <a:p>
-              <a:r>
-                <a:rPr sz="1400" dirty="0"/>
-                <a:t>CPU</a:t>
-              </a:r>
-              <a:r>
-                <a:rPr lang="en-US" sz="1400" dirty="0"/>
-                <a:t> 1</a:t>
-              </a:r>
-              <a:endParaRPr sz="1400" dirty="0"/>
-            </a:p>
-          </p:txBody>
-        </p:sp>
-        <p:sp>
-          <p:nvSpPr>
-            <p:cNvPr id="47" name="thread0()">
-              <a:extLst>
-                <a:ext uri="{FF2B5EF4-FFF2-40B4-BE49-F238E27FC236}">
-                  <a16:creationId xmlns:a16="http://schemas.microsoft.com/office/drawing/2014/main" id="{2D163110-8804-4C4F-AC94-2983B0DB297E}"/>
-                </a:ext>
-              </a:extLst>
-            </p:cNvPr>
-            <p:cNvSpPr/>
-            <p:nvPr/>
-          </p:nvSpPr>
-          <p:spPr>
-            <a:xfrm>
-              <a:off x="363536" y="1253934"/>
-              <a:ext cx="2332254" cy="960919"/>
-            </a:xfrm>
-            <a:prstGeom prst="rect">
-              <a:avLst/>
-            </a:prstGeom>
-            <a:solidFill>
-              <a:srgbClr val="B4FCFD"/>
-            </a:solidFill>
-            <a:ln w="12700" cap="flat">
-              <a:noFill/>
-              <a:miter lim="400000"/>
-            </a:ln>
-            <a:effectLst>
-              <a:outerShdw blurRad="50800" dist="25400" dir="5400000" rotWithShape="0">
-                <a:srgbClr val="000000">
-                  <a:alpha val="50000"/>
-                </a:srgbClr>
-              </a:outerShdw>
-            </a:effectLst>
-            <a:extLst>
-              <a:ext uri="{C572A759-6A51-4108-AA02-DFA0A04FC94B}">
-                <ma14:wrappingTextBoxFlag xmlns="" xmlns:m="http://schemas.openxmlformats.org/officeDocument/2006/math" xmlns:a14="http://schemas.microsoft.com/office/drawing/2010/main" xmlns:ma14="http://schemas.microsoft.com/office/mac/drawingml/2011/main" val="1"/>
-              </a:ext>
-            </a:extLst>
-          </p:spPr>
-          <p:txBody>
-            <a:bodyPr wrap="square" lIns="35719" tIns="35719" rIns="35719" bIns="35719" numCol="1" anchor="t">
-              <a:noAutofit/>
-            </a:bodyPr>
-            <a:lstStyle>
-              <a:lvl1pPr>
-                <a:defRPr b="0">
-                  <a:latin typeface="Helvetica Light"/>
-                  <a:ea typeface="Helvetica Light"/>
-                  <a:cs typeface="Helvetica Light"/>
-                  <a:sym typeface="Helvetica Light"/>
-                </a:defRPr>
-              </a:lvl1pPr>
-            </a:lstStyle>
-            <a:p>
-              <a:r>
-                <a:rPr sz="1600" dirty="0">
-                  <a:solidFill>
-                    <a:schemeClr val="bg2">
-                      <a:lumMod val="10000"/>
-                    </a:schemeClr>
-                  </a:solidFill>
-                </a:rPr>
-                <a:t>thread0()</a:t>
-              </a:r>
-            </a:p>
-          </p:txBody>
-        </p:sp>
-        <p:sp>
-          <p:nvSpPr>
-            <p:cNvPr id="49" name="Main Memory">
-              <a:extLst>
-                <a:ext uri="{FF2B5EF4-FFF2-40B4-BE49-F238E27FC236}">
-                  <a16:creationId xmlns:a16="http://schemas.microsoft.com/office/drawing/2014/main" id="{15F491F7-3A90-6448-A43A-1CC3A010670C}"/>
-                </a:ext>
-              </a:extLst>
-            </p:cNvPr>
-            <p:cNvSpPr/>
-            <p:nvPr/>
-          </p:nvSpPr>
-          <p:spPr>
-            <a:xfrm>
-              <a:off x="8876107" y="359223"/>
-              <a:ext cx="1785939" cy="2915696"/>
-            </a:xfrm>
-            <a:prstGeom prst="rect">
-              <a:avLst/>
-            </a:prstGeom>
-            <a:solidFill>
-              <a:srgbClr val="EE7D69"/>
-            </a:solidFill>
-            <a:ln w="12700" cap="flat">
-              <a:noFill/>
-              <a:miter lim="400000"/>
-            </a:ln>
-            <a:effectLst>
-              <a:outerShdw blurRad="50800" dist="25400" dir="5400000" rotWithShape="0">
-                <a:srgbClr val="000000">
-                  <a:alpha val="50000"/>
-                </a:srgbClr>
-              </a:outerShdw>
-            </a:effectLst>
-            <a:extLst>
-              <a:ext uri="{C572A759-6A51-4108-AA02-DFA0A04FC94B}">
-                <ma14:wrappingTextBoxFlag xmlns="" xmlns:m="http://schemas.openxmlformats.org/officeDocument/2006/math" xmlns:a14="http://schemas.microsoft.com/office/drawing/2010/main" xmlns:ma14="http://schemas.microsoft.com/office/mac/drawingml/2011/main" val="1"/>
-              </a:ext>
-            </a:extLst>
-          </p:spPr>
-          <p:txBody>
-            <a:bodyPr wrap="square" lIns="35719" tIns="35719" rIns="35719" bIns="35719" numCol="1" anchor="ctr">
-              <a:noAutofit/>
-            </a:bodyPr>
-            <a:lstStyle>
-              <a:lvl1pPr>
-                <a:defRPr b="0">
-                  <a:latin typeface="Helvetica Light"/>
-                  <a:ea typeface="Helvetica Light"/>
-                  <a:cs typeface="Helvetica Light"/>
-                  <a:sym typeface="Helvetica Light"/>
-                </a:defRPr>
-              </a:lvl1pPr>
-            </a:lstStyle>
-            <a:p>
-              <a:r>
-                <a:rPr sz="1600" dirty="0">
-                  <a:solidFill>
-                    <a:schemeClr val="bg2">
-                      <a:lumMod val="10000"/>
-                    </a:schemeClr>
-                  </a:solidFill>
-                </a:rPr>
-                <a:t>Main Memory</a:t>
-              </a:r>
-            </a:p>
-          </p:txBody>
-        </p:sp>
-        <p:grpSp>
-          <p:nvGrpSpPr>
-            <p:cNvPr id="50" name="Group">
-              <a:extLst>
-                <a:ext uri="{FF2B5EF4-FFF2-40B4-BE49-F238E27FC236}">
-                  <a16:creationId xmlns:a16="http://schemas.microsoft.com/office/drawing/2014/main" id="{7DA54FA5-BD81-7B4E-BB1F-79830504C261}"/>
+                  <a16:creationId xmlns:a16="http://schemas.microsoft.com/office/drawing/2014/main" id="{D28951AE-72F0-AA4F-8BBE-A01B57F777CE}"/>
                 </a:ext>
               </a:extLst>
             </p:cNvPr>
@@ -32199,18 +31919,18 @@
           </p:nvGrpSpPr>
           <p:grpSpPr>
             <a:xfrm>
-              <a:off x="2466902" y="1253935"/>
-              <a:ext cx="6739604" cy="1315499"/>
-              <a:chOff x="0" y="280981"/>
-              <a:chExt cx="6739603" cy="1315499"/>
+              <a:off x="1601248" y="2680334"/>
+              <a:ext cx="8005516" cy="1561773"/>
+              <a:chOff x="0" y="326479"/>
+              <a:chExt cx="16011027" cy="3123543"/>
             </a:xfrm>
           </p:grpSpPr>
           <p:sp>
             <p:nvSpPr>
-              <p:cNvPr id="63" name="CPU 1 Cache">
+              <p:cNvPr id="45" name="CPU 1">
                 <a:extLst>
                   <a:ext uri="{FF2B5EF4-FFF2-40B4-BE49-F238E27FC236}">
-                    <a16:creationId xmlns:a16="http://schemas.microsoft.com/office/drawing/2014/main" id="{5E9D27E1-5910-D14C-81C3-DDE2A5309E65}"/>
+                    <a16:creationId xmlns:a16="http://schemas.microsoft.com/office/drawing/2014/main" id="{C44283A3-14B9-4F48-B140-E2F448F47176}"/>
                   </a:ext>
                 </a:extLst>
               </p:cNvPr>
@@ -32219,14 +31939,14 @@
             </p:nvSpPr>
             <p:spPr>
               <a:xfrm>
-                <a:off x="1343492" y="280981"/>
-                <a:ext cx="2951821" cy="960919"/>
+                <a:off x="0" y="430659"/>
+                <a:ext cx="6996899" cy="2227679"/>
               </a:xfrm>
               <a:prstGeom prst="rect">
                 <a:avLst/>
               </a:prstGeom>
               <a:solidFill>
-                <a:srgbClr val="96CBB9"/>
+                <a:srgbClr val="516D7C"/>
               </a:solidFill>
               <a:ln w="12700" cap="flat">
                 <a:noFill/>
@@ -32241,7 +31961,77 @@
               </a:effectLst>
               <a:extLst>
                 <a:ext uri="{C572A759-6A51-4108-AA02-DFA0A04FC94B}">
-                  <ma14:wrappingTextBoxFlag xmlns="" xmlns:m="http://schemas.openxmlformats.org/officeDocument/2006/math" xmlns:a14="http://schemas.microsoft.com/office/drawing/2010/main" xmlns:ma14="http://schemas.microsoft.com/office/mac/drawingml/2011/main" val="1"/>
+                  <ma14:wrappingTextBoxFlag xmlns:ma14="http://schemas.microsoft.com/office/mac/drawingml/2011/main" xmlns:a14="http://schemas.microsoft.com/office/drawing/2010/main" xmlns:m="http://schemas.openxmlformats.org/officeDocument/2006/math" xmlns="" val="1"/>
+                </a:ext>
+              </a:extLst>
+            </p:spPr>
+            <p:txBody>
+              <a:bodyPr wrap="square" lIns="35719" tIns="35719" rIns="35719" bIns="35719" numCol="1" anchor="t">
+                <a:noAutofit/>
+              </a:bodyPr>
+              <a:lstStyle>
+                <a:lvl1pPr algn="l">
+                  <a:defRPr b="0">
+                    <a:solidFill>
+                      <a:srgbClr val="FFFFFF"/>
+                    </a:solidFill>
+                    <a:latin typeface="Helvetica Light"/>
+                    <a:ea typeface="Helvetica Light"/>
+                    <a:cs typeface="Helvetica Light"/>
+                    <a:sym typeface="Helvetica Light"/>
+                  </a:defRPr>
+                </a:lvl1pPr>
+              </a:lstStyle>
+              <a:p>
+                <a:r>
+                  <a:rPr sz="1400" dirty="0"/>
+                  <a:t>CPU</a:t>
+                </a:r>
+                <a:r>
+                  <a:rPr lang="en-US" sz="1400" dirty="0"/>
+                  <a:t> 1</a:t>
+                </a:r>
+                <a:endParaRPr sz="1400" dirty="0"/>
+              </a:p>
+            </p:txBody>
+          </p:sp>
+          <p:sp>
+            <p:nvSpPr>
+              <p:cNvPr id="47" name="thread0()">
+                <a:extLst>
+                  <a:ext uri="{FF2B5EF4-FFF2-40B4-BE49-F238E27FC236}">
+                    <a16:creationId xmlns:a16="http://schemas.microsoft.com/office/drawing/2014/main" id="{2D163110-8804-4C4F-AC94-2983B0DB297E}"/>
+                  </a:ext>
+                </a:extLst>
+              </p:cNvPr>
+              <p:cNvSpPr/>
+              <p:nvPr/>
+            </p:nvSpPr>
+            <p:spPr>
+              <a:xfrm>
+                <a:off x="363536" y="1253934"/>
+                <a:ext cx="2332254" cy="960919"/>
+              </a:xfrm>
+              <a:prstGeom prst="rect">
+                <a:avLst/>
+              </a:prstGeom>
+              <a:solidFill>
+                <a:srgbClr val="B4FCFD"/>
+              </a:solidFill>
+              <a:ln w="12700" cap="flat">
+                <a:noFill/>
+                <a:miter lim="400000"/>
+              </a:ln>
+              <a:effectLst>
+                <a:outerShdw blurRad="50800" dist="25400" dir="5400000" rotWithShape="0">
+                  <a:srgbClr val="000000">
+                    <a:alpha val="50000"/>
+                  </a:srgbClr>
+                </a:outerShdw>
+              </a:effectLst>
+              <a:extLst>
+                <a:ext uri="{C572A759-6A51-4108-AA02-DFA0A04FC94B}">
+                  <ma14:wrappingTextBoxFlag xmlns:ma14="http://schemas.microsoft.com/office/mac/drawingml/2011/main" xmlns:a14="http://schemas.microsoft.com/office/drawing/2010/main" xmlns:m="http://schemas.openxmlformats.org/officeDocument/2006/math" xmlns="" val="1"/>
                 </a:ext>
               </a:extLst>
             </p:spPr>
@@ -32261,24 +32051,92 @@
               </a:lstStyle>
               <a:p>
                 <a:r>
-                  <a:rPr sz="1600">
+                  <a:rPr sz="1600" dirty="0">
                     <a:solidFill>
                       <a:schemeClr val="bg2">
                         <a:lumMod val="10000"/>
                       </a:schemeClr>
                     </a:solidFill>
                   </a:rPr>
-                  <a:t>CPU 1 Cache</a:t>
+                  <a:t>thread0()</a:t>
+                </a:r>
+              </a:p>
+            </p:txBody>
+          </p:sp>
+          <p:sp>
+            <p:nvSpPr>
+              <p:cNvPr id="49" name="Main Memory">
+                <a:extLst>
+                  <a:ext uri="{FF2B5EF4-FFF2-40B4-BE49-F238E27FC236}">
+                    <a16:creationId xmlns:a16="http://schemas.microsoft.com/office/drawing/2014/main" id="{15F491F7-3A90-6448-A43A-1CC3A010670C}"/>
+                  </a:ext>
+                </a:extLst>
+              </p:cNvPr>
+              <p:cNvSpPr/>
+              <p:nvPr/>
+            </p:nvSpPr>
+            <p:spPr>
+              <a:xfrm>
+                <a:off x="8876107" y="359223"/>
+                <a:ext cx="1785939" cy="2915696"/>
+              </a:xfrm>
+              <a:prstGeom prst="rect">
+                <a:avLst/>
+              </a:prstGeom>
+              <a:solidFill>
+                <a:srgbClr val="EE7D69"/>
+              </a:solidFill>
+              <a:ln w="12700" cap="flat">
+                <a:noFill/>
+                <a:miter lim="400000"/>
+              </a:ln>
+              <a:effectLst>
+                <a:outerShdw blurRad="50800" dist="25400" dir="5400000" rotWithShape="0">
+                  <a:srgbClr val="000000">
+                    <a:alpha val="50000"/>
+                  </a:srgbClr>
+                </a:outerShdw>
+              </a:effectLst>
+              <a:extLst>
+                <a:ext uri="{C572A759-6A51-4108-AA02-DFA0A04FC94B}">
+                  <ma14:wrappingTextBoxFlag xmlns:ma14="http://schemas.microsoft.com/office/mac/drawingml/2011/main" xmlns:a14="http://schemas.microsoft.com/office/drawing/2010/main" xmlns:m="http://schemas.openxmlformats.org/officeDocument/2006/math" xmlns="" val="1"/>
+                </a:ext>
+              </a:extLst>
+            </p:spPr>
+            <p:txBody>
+              <a:bodyPr wrap="square" lIns="35719" tIns="35719" rIns="35719" bIns="35719" numCol="1" anchor="ctr">
+                <a:noAutofit/>
+              </a:bodyPr>
+              <a:lstStyle>
+                <a:lvl1pPr>
+                  <a:defRPr b="0">
+                    <a:latin typeface="Helvetica Light"/>
+                    <a:ea typeface="Helvetica Light"/>
+                    <a:cs typeface="Helvetica Light"/>
+                    <a:sym typeface="Helvetica Light"/>
+                  </a:defRPr>
+                </a:lvl1pPr>
+              </a:lstStyle>
+              <a:p>
+                <a:r>
+                  <a:rPr sz="1600" dirty="0">
+                    <a:solidFill>
+                      <a:schemeClr val="bg2">
+                        <a:lumMod val="10000"/>
+                      </a:schemeClr>
+                    </a:solidFill>
+                  </a:rPr>
+                  <a:t>Main Memory</a:t>
                 </a:r>
               </a:p>
             </p:txBody>
           </p:sp>
           <p:grpSp>
             <p:nvGrpSpPr>
-              <p:cNvPr id="76" name="Group">
+              <p:cNvPr id="50" name="Group">
                 <a:extLst>
                   <a:ext uri="{FF2B5EF4-FFF2-40B4-BE49-F238E27FC236}">
-                    <a16:creationId xmlns:a16="http://schemas.microsoft.com/office/drawing/2014/main" id="{CA01C9CD-5B39-B044-816C-90DEC1E00A6C}"/>
+                    <a16:creationId xmlns:a16="http://schemas.microsoft.com/office/drawing/2014/main" id="{7DA54FA5-BD81-7B4E-BB1F-79830504C261}"/>
                   </a:ext>
                 </a:extLst>
               </p:cNvPr>
@@ -32287,18 +32145,18 @@
             </p:nvGrpSpPr>
             <p:grpSpPr>
               <a:xfrm>
-                <a:off x="4230362" y="326479"/>
-                <a:ext cx="2509241" cy="1270001"/>
-                <a:chOff x="0" y="326479"/>
-                <a:chExt cx="2509238" cy="1270000"/>
+                <a:off x="2466902" y="1253935"/>
+                <a:ext cx="6739604" cy="1315499"/>
+                <a:chOff x="0" y="280981"/>
+                <a:chExt cx="6739603" cy="1315499"/>
               </a:xfrm>
             </p:grpSpPr>
             <p:sp>
               <p:nvSpPr>
-                <p:cNvPr id="77" name="Line">
+                <p:cNvPr id="63" name="CPU 1 Cache">
                   <a:extLst>
                     <a:ext uri="{FF2B5EF4-FFF2-40B4-BE49-F238E27FC236}">
-                      <a16:creationId xmlns:a16="http://schemas.microsoft.com/office/drawing/2014/main" id="{1D42CE66-FA2C-2A4B-B01F-3AA114EC0D09}"/>
+                      <a16:creationId xmlns:a16="http://schemas.microsoft.com/office/drawing/2014/main" id="{5E9D27E1-5910-D14C-81C3-DDE2A5309E65}"/>
                     </a:ext>
                   </a:extLst>
                 </p:cNvPr>
@@ -32307,177 +32165,66 @@
               </p:nvSpPr>
               <p:spPr>
                 <a:xfrm>
-                  <a:off x="0" y="571545"/>
-                  <a:ext cx="2205969" cy="1"/>
+                  <a:off x="1343492" y="280981"/>
+                  <a:ext cx="2951821" cy="960919"/>
                 </a:xfrm>
-                <a:prstGeom prst="line">
+                <a:prstGeom prst="rect">
                   <a:avLst/>
                 </a:prstGeom>
-                <a:noFill/>
-                <a:ln w="25400" cap="flat">
-                  <a:solidFill>
-                    <a:srgbClr val="000000"/>
-                  </a:solidFill>
-                  <a:prstDash val="solid"/>
+                <a:solidFill>
+                  <a:srgbClr val="96CBB9"/>
+                </a:solidFill>
+                <a:ln w="12700" cap="flat">
+                  <a:noFill/>
                   <a:miter lim="400000"/>
-                  <a:tailEnd type="triangle" w="med" len="med"/>
                 </a:ln>
-                <a:effectLst/>
+                <a:effectLst>
+                  <a:outerShdw blurRad="50800" dist="25400" dir="5400000" rotWithShape="0">
+                    <a:srgbClr val="000000">
+                      <a:alpha val="50000"/>
+                    </a:srgbClr>
+                  </a:outerShdw>
+                </a:effectLst>
+                <a:extLst>
+                  <a:ext uri="{C572A759-6A51-4108-AA02-DFA0A04FC94B}">
+                    <ma14:wrappingTextBoxFlag xmlns:ma14="http://schemas.microsoft.com/office/mac/drawingml/2011/main" xmlns:a14="http://schemas.microsoft.com/office/drawing/2010/main" xmlns:m="http://schemas.openxmlformats.org/officeDocument/2006/math" xmlns="" val="1"/>
+                  </a:ext>
+                </a:extLst>
               </p:spPr>
               <p:txBody>
-                <a:bodyPr wrap="square" lIns="35719" tIns="35719" rIns="35719" bIns="35719" numCol="1" anchor="ctr">
+                <a:bodyPr wrap="square" lIns="35719" tIns="35719" rIns="35719" bIns="35719" numCol="1" anchor="t">
                   <a:noAutofit/>
                 </a:bodyPr>
-                <a:lstStyle/>
-                <a:p>
-                  <a:pPr>
+                <a:lstStyle>
+                  <a:lvl1pPr>
                     <a:defRPr b="0">
                       <a:latin typeface="Helvetica Light"/>
                       <a:ea typeface="Helvetica Light"/>
                       <a:cs typeface="Helvetica Light"/>
                       <a:sym typeface="Helvetica Light"/>
                     </a:defRPr>
-                  </a:pPr>
-                  <a:endParaRPr sz="800"/>
-                </a:p>
-              </p:txBody>
-            </p:sp>
-            <p:sp>
-              <p:nvSpPr>
-                <p:cNvPr id="78" name="Line">
-                  <a:extLst>
-                    <a:ext uri="{FF2B5EF4-FFF2-40B4-BE49-F238E27FC236}">
-                      <a16:creationId xmlns:a16="http://schemas.microsoft.com/office/drawing/2014/main" id="{09BE313C-67E4-FC43-9BA1-54C7F6358EB9}"/>
-                    </a:ext>
-                  </a:extLst>
-                </p:cNvPr>
-                <p:cNvSpPr/>
-                <p:nvPr/>
-              </p:nvSpPr>
-              <p:spPr>
-                <a:xfrm>
-                  <a:off x="0" y="1000170"/>
-                  <a:ext cx="2205969" cy="1"/>
-                </a:xfrm>
-                <a:prstGeom prst="line">
-                  <a:avLst/>
-                </a:prstGeom>
-                <a:noFill/>
-                <a:ln w="25400" cap="flat">
-                  <a:solidFill>
-                    <a:srgbClr val="000000"/>
-                  </a:solidFill>
-                  <a:prstDash val="solid"/>
-                  <a:miter lim="400000"/>
-                  <a:headEnd type="triangle" w="med" len="med"/>
-                </a:ln>
-                <a:effectLst/>
-              </p:spPr>
-              <p:txBody>
-                <a:bodyPr wrap="square" lIns="35719" tIns="35719" rIns="35719" bIns="35719" numCol="1" anchor="ctr">
-                  <a:noAutofit/>
-                </a:bodyPr>
-                <a:lstStyle/>
-                <a:p>
-                  <a:pPr>
-                    <a:defRPr b="0">
-                      <a:latin typeface="Helvetica Light"/>
-                      <a:ea typeface="Helvetica Light"/>
-                      <a:cs typeface="Helvetica Light"/>
-                      <a:sym typeface="Helvetica Light"/>
-                    </a:defRPr>
-                  </a:pPr>
-                  <a:endParaRPr sz="800"/>
-                </a:p>
-              </p:txBody>
-            </p:sp>
-            <p:sp>
-              <p:nvSpPr>
-                <p:cNvPr id="79" name="100ns">
-                  <a:extLst>
-                    <a:ext uri="{FF2B5EF4-FFF2-40B4-BE49-F238E27FC236}">
-                      <a16:creationId xmlns:a16="http://schemas.microsoft.com/office/drawing/2014/main" id="{504F086F-92DB-374E-8ED7-0740686AA3B6}"/>
-                    </a:ext>
-                  </a:extLst>
-                </p:cNvPr>
-                <p:cNvSpPr/>
-                <p:nvPr/>
-              </p:nvSpPr>
-              <p:spPr>
-                <a:xfrm>
-                  <a:off x="1239238" y="326479"/>
-                  <a:ext cx="1270001" cy="1270001"/>
-                </a:xfrm>
-                <a:prstGeom prst="line">
-                  <a:avLst/>
-                </a:prstGeom>
-                <a:noFill/>
-                <a:ln w="12700" cap="flat">
-                  <a:noFill/>
-                  <a:miter lim="400000"/>
-                </a:ln>
-                <a:effectLst/>
-                <a:extLst>
-                  <a:ext uri="{C572A759-6A51-4108-AA02-DFA0A04FC94B}">
-                    <ma14:wrappingTextBoxFlag xmlns="" xmlns:m="http://schemas.openxmlformats.org/officeDocument/2006/math" xmlns:a14="http://schemas.microsoft.com/office/drawing/2010/main" xmlns:ma14="http://schemas.microsoft.com/office/mac/drawingml/2011/main" val="1"/>
-                  </a:ext>
-                </a:extLst>
-              </p:spPr>
-              <p:txBody>
-                <a:bodyPr wrap="none" lIns="35719" tIns="35719" rIns="35719" bIns="35719" numCol="1" anchor="ctr">
-                  <a:spAutoFit/>
-                </a:bodyPr>
-                <a:lstStyle>
-                  <a:lvl1pPr>
-                    <a:defRPr sz="4000" b="0">
-                      <a:latin typeface="Consolas"/>
-                      <a:ea typeface="Consolas"/>
-                      <a:cs typeface="Consolas"/>
-                      <a:sym typeface="Consolas"/>
-                    </a:defRPr>
                   </a:lvl1pPr>
                 </a:lstStyle>
                 <a:p>
                   <a:r>
-                    <a:rPr sz="2000">
+                    <a:rPr sz="1600" dirty="0">
                       <a:solidFill>
                         <a:schemeClr val="bg2">
                           <a:lumMod val="10000"/>
                         </a:schemeClr>
                       </a:solidFill>
                     </a:rPr>
-                    <a:t>100ns</a:t>
+                    <a:t>CPU 1 Cache</a:t>
                   </a:r>
                 </a:p>
               </p:txBody>
             </p:sp>
-          </p:grpSp>
-          <p:grpSp>
-            <p:nvGrpSpPr>
-              <p:cNvPr id="68" name="Group">
-                <a:extLst>
-                  <a:ext uri="{FF2B5EF4-FFF2-40B4-BE49-F238E27FC236}">
-                    <a16:creationId xmlns:a16="http://schemas.microsoft.com/office/drawing/2014/main" id="{EAE5A875-AD9C-E943-B2BD-71091FE9EDAE}"/>
-                  </a:ext>
-                </a:extLst>
-              </p:cNvPr>
-              <p:cNvGrpSpPr/>
-              <p:nvPr/>
-            </p:nvGrpSpPr>
-            <p:grpSpPr>
-              <a:xfrm>
-                <a:off x="0" y="326479"/>
-                <a:ext cx="2008787" cy="1270001"/>
-                <a:chOff x="0" y="326479"/>
-                <a:chExt cx="2008785" cy="1270000"/>
-              </a:xfrm>
-            </p:grpSpPr>
             <p:grpSp>
               <p:nvGrpSpPr>
-                <p:cNvPr id="69" name="Group">
+                <p:cNvPr id="76" name="Group">
                   <a:extLst>
                     <a:ext uri="{FF2B5EF4-FFF2-40B4-BE49-F238E27FC236}">
-                      <a16:creationId xmlns:a16="http://schemas.microsoft.com/office/drawing/2014/main" id="{68646CCA-F4F9-5148-830B-99284A02BD69}"/>
+                      <a16:creationId xmlns:a16="http://schemas.microsoft.com/office/drawing/2014/main" id="{CA01C9CD-5B39-B044-816C-90DEC1E00A6C}"/>
                     </a:ext>
                   </a:extLst>
                 </p:cNvPr>
@@ -32486,18 +32233,18 @@
               </p:nvGrpSpPr>
               <p:grpSpPr>
                 <a:xfrm>
-                  <a:off x="0" y="546455"/>
-                  <a:ext cx="1477572" cy="287097"/>
-                  <a:chOff x="0" y="0"/>
-                  <a:chExt cx="1477571" cy="287095"/>
+                  <a:off x="4230362" y="326479"/>
+                  <a:ext cx="2509241" cy="1270001"/>
+                  <a:chOff x="0" y="326479"/>
+                  <a:chExt cx="2509238" cy="1270000"/>
                 </a:xfrm>
               </p:grpSpPr>
               <p:sp>
                 <p:nvSpPr>
-                  <p:cNvPr id="71" name="Line">
+                  <p:cNvPr id="77" name="Line">
                     <a:extLst>
                       <a:ext uri="{FF2B5EF4-FFF2-40B4-BE49-F238E27FC236}">
-                        <a16:creationId xmlns:a16="http://schemas.microsoft.com/office/drawing/2014/main" id="{89E3B08B-4B8C-8F4A-91E3-7002C7C1896B}"/>
+                        <a16:creationId xmlns:a16="http://schemas.microsoft.com/office/drawing/2014/main" id="{1D42CE66-FA2C-2A4B-B01F-3AA114EC0D09}"/>
                       </a:ext>
                     </a:extLst>
                   </p:cNvPr>
@@ -32506,8 +32253,8 @@
                 </p:nvSpPr>
                 <p:spPr>
                   <a:xfrm>
-                    <a:off x="0" y="0"/>
-                    <a:ext cx="1477572" cy="0"/>
+                    <a:off x="0" y="571545"/>
+                    <a:ext cx="2205969" cy="1"/>
                   </a:xfrm>
                   <a:prstGeom prst="line">
                     <a:avLst/>
@@ -32543,10 +32290,10 @@
               </p:sp>
               <p:sp>
                 <p:nvSpPr>
-                  <p:cNvPr id="72" name="Line">
+                  <p:cNvPr id="78" name="Line">
                     <a:extLst>
                       <a:ext uri="{FF2B5EF4-FFF2-40B4-BE49-F238E27FC236}">
-                        <a16:creationId xmlns:a16="http://schemas.microsoft.com/office/drawing/2014/main" id="{7AF63D1B-E67E-F644-86B1-53D750A442BC}"/>
+                        <a16:creationId xmlns:a16="http://schemas.microsoft.com/office/drawing/2014/main" id="{09BE313C-67E4-FC43-9BA1-54C7F6358EB9}"/>
                       </a:ext>
                     </a:extLst>
                   </p:cNvPr>
@@ -32555,8 +32302,8 @@
                 </p:nvSpPr>
                 <p:spPr>
                   <a:xfrm>
-                    <a:off x="0" y="287095"/>
-                    <a:ext cx="1477572" cy="1"/>
+                    <a:off x="0" y="1000170"/>
+                    <a:ext cx="2205969" cy="1"/>
                   </a:xfrm>
                   <a:prstGeom prst="line">
                     <a:avLst/>
@@ -32590,13 +32337,294 @@
                   </a:p>
                 </p:txBody>
               </p:sp>
+              <p:sp>
+                <p:nvSpPr>
+                  <p:cNvPr id="79" name="100ns">
+                    <a:extLst>
+                      <a:ext uri="{FF2B5EF4-FFF2-40B4-BE49-F238E27FC236}">
+                        <a16:creationId xmlns:a16="http://schemas.microsoft.com/office/drawing/2014/main" id="{504F086F-92DB-374E-8ED7-0740686AA3B6}"/>
+                      </a:ext>
+                    </a:extLst>
+                  </p:cNvPr>
+                  <p:cNvSpPr/>
+                  <p:nvPr/>
+                </p:nvSpPr>
+                <p:spPr>
+                  <a:xfrm>
+                    <a:off x="1239238" y="326479"/>
+                    <a:ext cx="1270001" cy="1270001"/>
+                  </a:xfrm>
+                  <a:prstGeom prst="line">
+                    <a:avLst/>
+                  </a:prstGeom>
+                  <a:noFill/>
+                  <a:ln w="12700" cap="flat">
+                    <a:noFill/>
+                    <a:miter lim="400000"/>
+                  </a:ln>
+                  <a:effectLst/>
+                  <a:extLst>
+                    <a:ext uri="{C572A759-6A51-4108-AA02-DFA0A04FC94B}">
+                      <ma14:wrappingTextBoxFlag xmlns:ma14="http://schemas.microsoft.com/office/mac/drawingml/2011/main" xmlns:a14="http://schemas.microsoft.com/office/drawing/2010/main" xmlns:m="http://schemas.openxmlformats.org/officeDocument/2006/math" xmlns="" val="1"/>
+                    </a:ext>
+                  </a:extLst>
+                </p:spPr>
+                <p:txBody>
+                  <a:bodyPr wrap="none" lIns="35719" tIns="35719" rIns="35719" bIns="35719" numCol="1" anchor="ctr">
+                    <a:spAutoFit/>
+                  </a:bodyPr>
+                  <a:lstStyle>
+                    <a:lvl1pPr>
+                      <a:defRPr sz="4000" b="0">
+                        <a:latin typeface="Consolas"/>
+                        <a:ea typeface="Consolas"/>
+                        <a:cs typeface="Consolas"/>
+                        <a:sym typeface="Consolas"/>
+                      </a:defRPr>
+                    </a:lvl1pPr>
+                  </a:lstStyle>
+                  <a:p>
+                    <a:r>
+                      <a:rPr sz="2000">
+                        <a:solidFill>
+                          <a:schemeClr val="bg2">
+                            <a:lumMod val="10000"/>
+                          </a:schemeClr>
+                        </a:solidFill>
+                      </a:rPr>
+                      <a:t>100ns</a:t>
+                    </a:r>
+                  </a:p>
+                </p:txBody>
+              </p:sp>
             </p:grpSp>
+            <p:grpSp>
+              <p:nvGrpSpPr>
+                <p:cNvPr id="68" name="Group">
+                  <a:extLst>
+                    <a:ext uri="{FF2B5EF4-FFF2-40B4-BE49-F238E27FC236}">
+                      <a16:creationId xmlns:a16="http://schemas.microsoft.com/office/drawing/2014/main" id="{EAE5A875-AD9C-E943-B2BD-71091FE9EDAE}"/>
+                    </a:ext>
+                  </a:extLst>
+                </p:cNvPr>
+                <p:cNvGrpSpPr/>
+                <p:nvPr/>
+              </p:nvGrpSpPr>
+              <p:grpSpPr>
+                <a:xfrm>
+                  <a:off x="0" y="326479"/>
+                  <a:ext cx="2008787" cy="1270001"/>
+                  <a:chOff x="0" y="326479"/>
+                  <a:chExt cx="2008785" cy="1270000"/>
+                </a:xfrm>
+              </p:grpSpPr>
+              <p:grpSp>
+                <p:nvGrpSpPr>
+                  <p:cNvPr id="69" name="Group">
+                    <a:extLst>
+                      <a:ext uri="{FF2B5EF4-FFF2-40B4-BE49-F238E27FC236}">
+                        <a16:creationId xmlns:a16="http://schemas.microsoft.com/office/drawing/2014/main" id="{68646CCA-F4F9-5148-830B-99284A02BD69}"/>
+                      </a:ext>
+                    </a:extLst>
+                  </p:cNvPr>
+                  <p:cNvGrpSpPr/>
+                  <p:nvPr/>
+                </p:nvGrpSpPr>
+                <p:grpSpPr>
+                  <a:xfrm>
+                    <a:off x="0" y="546455"/>
+                    <a:ext cx="1477572" cy="287097"/>
+                    <a:chOff x="0" y="0"/>
+                    <a:chExt cx="1477571" cy="287095"/>
+                  </a:xfrm>
+                </p:grpSpPr>
+                <p:sp>
+                  <p:nvSpPr>
+                    <p:cNvPr id="71" name="Line">
+                      <a:extLst>
+                        <a:ext uri="{FF2B5EF4-FFF2-40B4-BE49-F238E27FC236}">
+                          <a16:creationId xmlns:a16="http://schemas.microsoft.com/office/drawing/2014/main" id="{89E3B08B-4B8C-8F4A-91E3-7002C7C1896B}"/>
+                        </a:ext>
+                      </a:extLst>
+                    </p:cNvPr>
+                    <p:cNvSpPr/>
+                    <p:nvPr/>
+                  </p:nvSpPr>
+                  <p:spPr>
+                    <a:xfrm>
+                      <a:off x="0" y="0"/>
+                      <a:ext cx="1477572" cy="0"/>
+                    </a:xfrm>
+                    <a:prstGeom prst="line">
+                      <a:avLst/>
+                    </a:prstGeom>
+                    <a:noFill/>
+                    <a:ln w="25400" cap="flat">
+                      <a:solidFill>
+                        <a:srgbClr val="000000"/>
+                      </a:solidFill>
+                      <a:prstDash val="solid"/>
+                      <a:miter lim="400000"/>
+                      <a:tailEnd type="triangle" w="med" len="med"/>
+                    </a:ln>
+                    <a:effectLst/>
+                  </p:spPr>
+                  <p:txBody>
+                    <a:bodyPr wrap="square" lIns="35719" tIns="35719" rIns="35719" bIns="35719" numCol="1" anchor="ctr">
+                      <a:noAutofit/>
+                    </a:bodyPr>
+                    <a:lstStyle/>
+                    <a:p>
+                      <a:pPr>
+                        <a:defRPr b="0">
+                          <a:latin typeface="Helvetica Light"/>
+                          <a:ea typeface="Helvetica Light"/>
+                          <a:cs typeface="Helvetica Light"/>
+                          <a:sym typeface="Helvetica Light"/>
+                        </a:defRPr>
+                      </a:pPr>
+                      <a:endParaRPr sz="800"/>
+                    </a:p>
+                  </p:txBody>
+                </p:sp>
+                <p:sp>
+                  <p:nvSpPr>
+                    <p:cNvPr id="72" name="Line">
+                      <a:extLst>
+                        <a:ext uri="{FF2B5EF4-FFF2-40B4-BE49-F238E27FC236}">
+                          <a16:creationId xmlns:a16="http://schemas.microsoft.com/office/drawing/2014/main" id="{7AF63D1B-E67E-F644-86B1-53D750A442BC}"/>
+                        </a:ext>
+                      </a:extLst>
+                    </p:cNvPr>
+                    <p:cNvSpPr/>
+                    <p:nvPr/>
+                  </p:nvSpPr>
+                  <p:spPr>
+                    <a:xfrm>
+                      <a:off x="0" y="287095"/>
+                      <a:ext cx="1477572" cy="1"/>
+                    </a:xfrm>
+                    <a:prstGeom prst="line">
+                      <a:avLst/>
+                    </a:prstGeom>
+                    <a:noFill/>
+                    <a:ln w="25400" cap="flat">
+                      <a:solidFill>
+                        <a:srgbClr val="000000"/>
+                      </a:solidFill>
+                      <a:prstDash val="solid"/>
+                      <a:miter lim="400000"/>
+                      <a:headEnd type="triangle" w="med" len="med"/>
+                    </a:ln>
+                    <a:effectLst/>
+                  </p:spPr>
+                  <p:txBody>
+                    <a:bodyPr wrap="square" lIns="35719" tIns="35719" rIns="35719" bIns="35719" numCol="1" anchor="ctr">
+                      <a:noAutofit/>
+                    </a:bodyPr>
+                    <a:lstStyle/>
+                    <a:p>
+                      <a:pPr>
+                        <a:defRPr b="0">
+                          <a:latin typeface="Helvetica Light"/>
+                          <a:ea typeface="Helvetica Light"/>
+                          <a:cs typeface="Helvetica Light"/>
+                          <a:sym typeface="Helvetica Light"/>
+                        </a:defRPr>
+                      </a:pPr>
+                      <a:endParaRPr sz="800"/>
+                    </a:p>
+                  </p:txBody>
+                </p:sp>
+              </p:grpSp>
+              <p:sp>
+                <p:nvSpPr>
+                  <p:cNvPr id="70" name="7ns">
+                    <a:extLst>
+                      <a:ext uri="{FF2B5EF4-FFF2-40B4-BE49-F238E27FC236}">
+                        <a16:creationId xmlns:a16="http://schemas.microsoft.com/office/drawing/2014/main" id="{A712BDBD-46F8-6148-8ECD-F7EDB780F7EA}"/>
+                      </a:ext>
+                    </a:extLst>
+                  </p:cNvPr>
+                  <p:cNvSpPr/>
+                  <p:nvPr/>
+                </p:nvSpPr>
+                <p:spPr>
+                  <a:xfrm>
+                    <a:off x="738785" y="326479"/>
+                    <a:ext cx="1270001" cy="1270001"/>
+                  </a:xfrm>
+                  <a:prstGeom prst="line">
+                    <a:avLst/>
+                  </a:prstGeom>
+                  <a:noFill/>
+                  <a:ln w="12700" cap="flat">
+                    <a:noFill/>
+                    <a:miter lim="400000"/>
+                  </a:ln>
+                  <a:effectLst/>
+                  <a:extLst>
+                    <a:ext uri="{C572A759-6A51-4108-AA02-DFA0A04FC94B}">
+                      <ma14:wrappingTextBoxFlag xmlns:ma14="http://schemas.microsoft.com/office/mac/drawingml/2011/main" xmlns:a14="http://schemas.microsoft.com/office/drawing/2010/main" xmlns:m="http://schemas.openxmlformats.org/officeDocument/2006/math" xmlns="" val="1"/>
+                    </a:ext>
+                  </a:extLst>
+                </p:spPr>
+                <p:txBody>
+                  <a:bodyPr wrap="none" lIns="35719" tIns="35719" rIns="35719" bIns="35719" numCol="1" anchor="ctr">
+                    <a:spAutoFit/>
+                  </a:bodyPr>
+                  <a:lstStyle>
+                    <a:lvl1pPr>
+                      <a:defRPr sz="4000" b="0">
+                        <a:latin typeface="Consolas"/>
+                        <a:ea typeface="Consolas"/>
+                        <a:cs typeface="Consolas"/>
+                        <a:sym typeface="Consolas"/>
+                      </a:defRPr>
+                    </a:lvl1pPr>
+                  </a:lstStyle>
+                  <a:p>
+                    <a:r>
+                      <a:rPr sz="2000">
+                        <a:solidFill>
+                          <a:schemeClr val="bg2">
+                            <a:lumMod val="10000"/>
+                          </a:schemeClr>
+                        </a:solidFill>
+                      </a:rPr>
+                      <a:t>7ns</a:t>
+                    </a:r>
+                  </a:p>
+                </p:txBody>
+              </p:sp>
+            </p:grpSp>
+          </p:grpSp>
+          <p:grpSp>
+            <p:nvGrpSpPr>
+              <p:cNvPr id="51" name="Group">
+                <a:extLst>
+                  <a:ext uri="{FF2B5EF4-FFF2-40B4-BE49-F238E27FC236}">
+                    <a16:creationId xmlns:a16="http://schemas.microsoft.com/office/drawing/2014/main" id="{0FC89C71-14F4-FB4E-803E-B42F61FF5EA9}"/>
+                  </a:ext>
+                </a:extLst>
+              </p:cNvPr>
+              <p:cNvGrpSpPr/>
+              <p:nvPr/>
+            </p:nvGrpSpPr>
+            <p:grpSpPr>
+              <a:xfrm>
+                <a:off x="10763250" y="326479"/>
+                <a:ext cx="5229913" cy="1387010"/>
+                <a:chOff x="38774" y="326479"/>
+                <a:chExt cx="5229912" cy="1387008"/>
+              </a:xfrm>
+            </p:grpSpPr>
             <p:sp>
               <p:nvSpPr>
-                <p:cNvPr id="70" name="7ns">
+                <p:cNvPr id="58" name="SSD">
                   <a:extLst>
                     <a:ext uri="{FF2B5EF4-FFF2-40B4-BE49-F238E27FC236}">
-                      <a16:creationId xmlns:a16="http://schemas.microsoft.com/office/drawing/2014/main" id="{A712BDBD-46F8-6148-8ECD-F7EDB780F7EA}"/>
+                      <a16:creationId xmlns:a16="http://schemas.microsoft.com/office/drawing/2014/main" id="{0EAF6096-CDDC-DF47-A423-1FFA17308BE2}"/>
                     </a:ext>
                   </a:extLst>
                 </p:cNvPr>
@@ -32605,148 +32633,246 @@
               </p:nvSpPr>
               <p:spPr>
                 <a:xfrm>
-                  <a:off x="738785" y="326479"/>
-                  <a:ext cx="1270001" cy="1270001"/>
+                  <a:off x="2402164" y="752570"/>
+                  <a:ext cx="2866524" cy="960919"/>
                 </a:xfrm>
-                <a:prstGeom prst="line">
+                <a:prstGeom prst="rect">
                   <a:avLst/>
                 </a:prstGeom>
-                <a:noFill/>
+                <a:solidFill>
+                  <a:srgbClr val="EE7D69"/>
+                </a:solidFill>
                 <a:ln w="12700" cap="flat">
                   <a:noFill/>
                   <a:miter lim="400000"/>
                 </a:ln>
-                <a:effectLst/>
+                <a:effectLst>
+                  <a:outerShdw blurRad="50800" dist="25400" dir="5400000" rotWithShape="0">
+                    <a:srgbClr val="000000">
+                      <a:alpha val="50000"/>
+                    </a:srgbClr>
+                  </a:outerShdw>
+                </a:effectLst>
                 <a:extLst>
                   <a:ext uri="{C572A759-6A51-4108-AA02-DFA0A04FC94B}">
-                    <ma14:wrappingTextBoxFlag xmlns="" xmlns:m="http://schemas.openxmlformats.org/officeDocument/2006/math" xmlns:a14="http://schemas.microsoft.com/office/drawing/2010/main" xmlns:ma14="http://schemas.microsoft.com/office/mac/drawingml/2011/main" val="1"/>
+                    <ma14:wrappingTextBoxFlag xmlns:ma14="http://schemas.microsoft.com/office/mac/drawingml/2011/main" xmlns:a14="http://schemas.microsoft.com/office/drawing/2010/main" xmlns:m="http://schemas.openxmlformats.org/officeDocument/2006/math" xmlns="" val="1"/>
                   </a:ext>
                 </a:extLst>
               </p:spPr>
               <p:txBody>
-                <a:bodyPr wrap="none" lIns="35719" tIns="35719" rIns="35719" bIns="35719" numCol="1" anchor="ctr">
-                  <a:spAutoFit/>
+                <a:bodyPr wrap="square" lIns="35719" tIns="35719" rIns="35719" bIns="35719" numCol="1" anchor="ctr">
+                  <a:noAutofit/>
                 </a:bodyPr>
                 <a:lstStyle>
                   <a:lvl1pPr>
-                    <a:defRPr sz="4000" b="0">
-                      <a:latin typeface="Consolas"/>
-                      <a:ea typeface="Consolas"/>
-                      <a:cs typeface="Consolas"/>
-                      <a:sym typeface="Consolas"/>
+                    <a:defRPr b="0">
+                      <a:latin typeface="Helvetica Light"/>
+                      <a:ea typeface="Helvetica Light"/>
+                      <a:cs typeface="Helvetica Light"/>
+                      <a:sym typeface="Helvetica Light"/>
                     </a:defRPr>
                   </a:lvl1pPr>
                 </a:lstStyle>
                 <a:p>
                   <a:r>
-                    <a:rPr sz="2000">
+                    <a:rPr sz="1600">
                       <a:solidFill>
                         <a:schemeClr val="bg2">
                           <a:lumMod val="10000"/>
                         </a:schemeClr>
                       </a:solidFill>
                     </a:rPr>
-                    <a:t>7ns</a:t>
+                    <a:t>SSD</a:t>
                   </a:r>
                 </a:p>
               </p:txBody>
             </p:sp>
+            <p:grpSp>
+              <p:nvGrpSpPr>
+                <p:cNvPr id="59" name="Group">
+                  <a:extLst>
+                    <a:ext uri="{FF2B5EF4-FFF2-40B4-BE49-F238E27FC236}">
+                      <a16:creationId xmlns:a16="http://schemas.microsoft.com/office/drawing/2014/main" id="{79FCB333-BB5A-5E40-AEE0-D340C8E61E36}"/>
+                    </a:ext>
+                  </a:extLst>
+                </p:cNvPr>
+                <p:cNvGrpSpPr/>
+                <p:nvPr/>
+              </p:nvGrpSpPr>
+              <p:grpSpPr>
+                <a:xfrm>
+                  <a:off x="38774" y="326479"/>
+                  <a:ext cx="5219225" cy="1270001"/>
+                  <a:chOff x="38774" y="326479"/>
+                  <a:chExt cx="5219223" cy="1270000"/>
+                </a:xfrm>
+              </p:grpSpPr>
+              <p:sp>
+                <p:nvSpPr>
+                  <p:cNvPr id="60" name="Line">
+                    <a:extLst>
+                      <a:ext uri="{FF2B5EF4-FFF2-40B4-BE49-F238E27FC236}">
+                        <a16:creationId xmlns:a16="http://schemas.microsoft.com/office/drawing/2014/main" id="{B4B50764-CA0F-7346-8A5C-93DBF96F6617}"/>
+                      </a:ext>
+                    </a:extLst>
+                  </p:cNvPr>
+                  <p:cNvSpPr/>
+                  <p:nvPr/>
+                </p:nvSpPr>
+                <p:spPr>
+                  <a:xfrm>
+                    <a:off x="38774" y="1020623"/>
+                    <a:ext cx="2205970" cy="1"/>
+                  </a:xfrm>
+                  <a:prstGeom prst="line">
+                    <a:avLst/>
+                  </a:prstGeom>
+                  <a:noFill/>
+                  <a:ln w="25400" cap="flat">
+                    <a:solidFill>
+                      <a:srgbClr val="000000"/>
+                    </a:solidFill>
+                    <a:prstDash val="solid"/>
+                    <a:miter lim="400000"/>
+                    <a:tailEnd type="triangle" w="med" len="med"/>
+                  </a:ln>
+                  <a:effectLst/>
+                </p:spPr>
+                <p:txBody>
+                  <a:bodyPr wrap="square" lIns="35719" tIns="35719" rIns="35719" bIns="35719" numCol="1" anchor="ctr">
+                    <a:noAutofit/>
+                  </a:bodyPr>
+                  <a:lstStyle/>
+                  <a:p>
+                    <a:pPr>
+                      <a:defRPr b="0">
+                        <a:latin typeface="Helvetica Light"/>
+                        <a:ea typeface="Helvetica Light"/>
+                        <a:cs typeface="Helvetica Light"/>
+                        <a:sym typeface="Helvetica Light"/>
+                      </a:defRPr>
+                    </a:pPr>
+                    <a:endParaRPr sz="800"/>
+                  </a:p>
+                </p:txBody>
+              </p:sp>
+              <p:sp>
+                <p:nvSpPr>
+                  <p:cNvPr id="61" name="Line">
+                    <a:extLst>
+                      <a:ext uri="{FF2B5EF4-FFF2-40B4-BE49-F238E27FC236}">
+                        <a16:creationId xmlns:a16="http://schemas.microsoft.com/office/drawing/2014/main" id="{030C2544-089C-0F47-8C36-C71C58B0C2AB}"/>
+                      </a:ext>
+                    </a:extLst>
+                  </p:cNvPr>
+                  <p:cNvSpPr/>
+                  <p:nvPr/>
+                </p:nvSpPr>
+                <p:spPr>
+                  <a:xfrm>
+                    <a:off x="38774" y="1449248"/>
+                    <a:ext cx="2205970" cy="1"/>
+                  </a:xfrm>
+                  <a:prstGeom prst="line">
+                    <a:avLst/>
+                  </a:prstGeom>
+                  <a:noFill/>
+                  <a:ln w="25400" cap="flat">
+                    <a:solidFill>
+                      <a:srgbClr val="000000"/>
+                    </a:solidFill>
+                    <a:prstDash val="solid"/>
+                    <a:miter lim="400000"/>
+                    <a:headEnd type="triangle" w="med" len="med"/>
+                  </a:ln>
+                  <a:effectLst/>
+                </p:spPr>
+                <p:txBody>
+                  <a:bodyPr wrap="square" lIns="35719" tIns="35719" rIns="35719" bIns="35719" numCol="1" anchor="ctr">
+                    <a:noAutofit/>
+                  </a:bodyPr>
+                  <a:lstStyle/>
+                  <a:p>
+                    <a:pPr>
+                      <a:defRPr b="0">
+                        <a:latin typeface="Helvetica Light"/>
+                        <a:ea typeface="Helvetica Light"/>
+                        <a:cs typeface="Helvetica Light"/>
+                        <a:sym typeface="Helvetica Light"/>
+                      </a:defRPr>
+                    </a:pPr>
+                    <a:endParaRPr sz="800"/>
+                  </a:p>
+                </p:txBody>
+              </p:sp>
+              <p:sp>
+                <p:nvSpPr>
+                  <p:cNvPr id="62" name="150,000ns (just to read 4KB)">
+                    <a:extLst>
+                      <a:ext uri="{FF2B5EF4-FFF2-40B4-BE49-F238E27FC236}">
+                        <a16:creationId xmlns:a16="http://schemas.microsoft.com/office/drawing/2014/main" id="{9325D6D0-9B33-A049-BD49-8B265CC162CA}"/>
+                      </a:ext>
+                    </a:extLst>
+                  </p:cNvPr>
+                  <p:cNvSpPr/>
+                  <p:nvPr/>
+                </p:nvSpPr>
+                <p:spPr>
+                  <a:xfrm>
+                    <a:off x="3987998" y="326479"/>
+                    <a:ext cx="1270001" cy="1270001"/>
+                  </a:xfrm>
+                  <a:prstGeom prst="line">
+                    <a:avLst/>
+                  </a:prstGeom>
+                  <a:noFill/>
+                  <a:ln w="12700" cap="flat">
+                    <a:noFill/>
+                    <a:miter lim="400000"/>
+                  </a:ln>
+                  <a:effectLst/>
+                  <a:extLst>
+                    <a:ext uri="{C572A759-6A51-4108-AA02-DFA0A04FC94B}">
+                      <ma14:wrappingTextBoxFlag xmlns:ma14="http://schemas.microsoft.com/office/mac/drawingml/2011/main" xmlns:a14="http://schemas.microsoft.com/office/drawing/2010/main" xmlns:m="http://schemas.openxmlformats.org/officeDocument/2006/math" xmlns="" val="1"/>
+                    </a:ext>
+                  </a:extLst>
+                </p:spPr>
+                <p:txBody>
+                  <a:bodyPr wrap="none" lIns="35719" tIns="35719" rIns="35719" bIns="35719" numCol="1" anchor="ctr">
+                    <a:spAutoFit/>
+                  </a:bodyPr>
+                  <a:lstStyle>
+                    <a:lvl1pPr>
+                      <a:defRPr sz="4000" b="0">
+                        <a:latin typeface="Consolas"/>
+                        <a:ea typeface="Consolas"/>
+                        <a:cs typeface="Consolas"/>
+                        <a:sym typeface="Consolas"/>
+                      </a:defRPr>
+                    </a:lvl1pPr>
+                  </a:lstStyle>
+                  <a:p>
+                    <a:r>
+                      <a:rPr sz="2000">
+                        <a:solidFill>
+                          <a:schemeClr val="bg2">
+                            <a:lumMod val="10000"/>
+                          </a:schemeClr>
+                        </a:solidFill>
+                      </a:rPr>
+                      <a:t>150,000ns (just to read 4KB)</a:t>
+                    </a:r>
+                  </a:p>
+                </p:txBody>
+              </p:sp>
+            </p:grpSp>
           </p:grpSp>
-        </p:grpSp>
-        <p:grpSp>
-          <p:nvGrpSpPr>
-            <p:cNvPr id="51" name="Group">
-              <a:extLst>
-                <a:ext uri="{FF2B5EF4-FFF2-40B4-BE49-F238E27FC236}">
-                  <a16:creationId xmlns:a16="http://schemas.microsoft.com/office/drawing/2014/main" id="{0FC89C71-14F4-FB4E-803E-B42F61FF5EA9}"/>
-                </a:ext>
-              </a:extLst>
-            </p:cNvPr>
-            <p:cNvGrpSpPr/>
-            <p:nvPr/>
-          </p:nvGrpSpPr>
-          <p:grpSpPr>
-            <a:xfrm>
-              <a:off x="10763250" y="326479"/>
-              <a:ext cx="5229913" cy="1387010"/>
-              <a:chOff x="38774" y="326479"/>
-              <a:chExt cx="5229912" cy="1387008"/>
-            </a:xfrm>
-          </p:grpSpPr>
-          <p:sp>
-            <p:nvSpPr>
-              <p:cNvPr id="58" name="SSD">
+          <p:grpSp>
+            <p:nvGrpSpPr>
+              <p:cNvPr id="52" name="Group">
                 <a:extLst>
                   <a:ext uri="{FF2B5EF4-FFF2-40B4-BE49-F238E27FC236}">
-                    <a16:creationId xmlns:a16="http://schemas.microsoft.com/office/drawing/2014/main" id="{0EAF6096-CDDC-DF47-A423-1FFA17308BE2}"/>
-                  </a:ext>
-                </a:extLst>
-              </p:cNvPr>
-              <p:cNvSpPr/>
-              <p:nvPr/>
-            </p:nvSpPr>
-            <p:spPr>
-              <a:xfrm>
-                <a:off x="2402164" y="752570"/>
-                <a:ext cx="2866524" cy="960919"/>
-              </a:xfrm>
-              <a:prstGeom prst="rect">
-                <a:avLst/>
-              </a:prstGeom>
-              <a:solidFill>
-                <a:srgbClr val="EE7D69"/>
-              </a:solidFill>
-              <a:ln w="12700" cap="flat">
-                <a:noFill/>
-                <a:miter lim="400000"/>
-              </a:ln>
-              <a:effectLst>
-                <a:outerShdw blurRad="50800" dist="25400" dir="5400000" rotWithShape="0">
-                  <a:srgbClr val="000000">
-                    <a:alpha val="50000"/>
-                  </a:srgbClr>
-                </a:outerShdw>
-              </a:effectLst>
-              <a:extLst>
-                <a:ext uri="{C572A759-6A51-4108-AA02-DFA0A04FC94B}">
-                  <ma14:wrappingTextBoxFlag xmlns="" xmlns:m="http://schemas.openxmlformats.org/officeDocument/2006/math" xmlns:a14="http://schemas.microsoft.com/office/drawing/2010/main" xmlns:ma14="http://schemas.microsoft.com/office/mac/drawingml/2011/main" val="1"/>
-                </a:ext>
-              </a:extLst>
-            </p:spPr>
-            <p:txBody>
-              <a:bodyPr wrap="square" lIns="35719" tIns="35719" rIns="35719" bIns="35719" numCol="1" anchor="ctr">
-                <a:noAutofit/>
-              </a:bodyPr>
-              <a:lstStyle>
-                <a:lvl1pPr>
-                  <a:defRPr b="0">
-                    <a:latin typeface="Helvetica Light"/>
-                    <a:ea typeface="Helvetica Light"/>
-                    <a:cs typeface="Helvetica Light"/>
-                    <a:sym typeface="Helvetica Light"/>
-                  </a:defRPr>
-                </a:lvl1pPr>
-              </a:lstStyle>
-              <a:p>
-                <a:r>
-                  <a:rPr sz="1600">
-                    <a:solidFill>
-                      <a:schemeClr val="bg2">
-                        <a:lumMod val="10000"/>
-                      </a:schemeClr>
-                    </a:solidFill>
-                  </a:rPr>
-                  <a:t>SSD</a:t>
-                </a:r>
-              </a:p>
-            </p:txBody>
-          </p:sp>
-          <p:grpSp>
-            <p:nvGrpSpPr>
-              <p:cNvPr id="59" name="Group">
-                <a:extLst>
-                  <a:ext uri="{FF2B5EF4-FFF2-40B4-BE49-F238E27FC236}">
-                    <a16:creationId xmlns:a16="http://schemas.microsoft.com/office/drawing/2014/main" id="{79FCB333-BB5A-5E40-AEE0-D340C8E61E36}"/>
+                    <a16:creationId xmlns:a16="http://schemas.microsoft.com/office/drawing/2014/main" id="{26D7B826-7CEA-A446-93AF-8D2CE3AD544B}"/>
                   </a:ext>
                 </a:extLst>
               </p:cNvPr>
@@ -32755,18 +32881,18 @@
             </p:nvGrpSpPr>
             <p:grpSpPr>
               <a:xfrm>
-                <a:off x="38774" y="326479"/>
-                <a:ext cx="5219225" cy="1270001"/>
-                <a:chOff x="38774" y="326479"/>
-                <a:chExt cx="5219223" cy="1270000"/>
+                <a:off x="10763250" y="2063010"/>
+                <a:ext cx="5247777" cy="1387012"/>
+                <a:chOff x="83728" y="-1201900"/>
+                <a:chExt cx="5247775" cy="1387011"/>
               </a:xfrm>
             </p:grpSpPr>
             <p:sp>
               <p:nvSpPr>
-                <p:cNvPr id="60" name="Line">
+                <p:cNvPr id="53" name="Magnetic HD">
                   <a:extLst>
                     <a:ext uri="{FF2B5EF4-FFF2-40B4-BE49-F238E27FC236}">
-                      <a16:creationId xmlns:a16="http://schemas.microsoft.com/office/drawing/2014/main" id="{B4B50764-CA0F-7346-8A5C-93DBF96F6617}"/>
+                      <a16:creationId xmlns:a16="http://schemas.microsoft.com/office/drawing/2014/main" id="{887EC307-138E-334D-9544-EEE537956F47}"/>
                     </a:ext>
                   </a:extLst>
                 </p:cNvPr>
@@ -32775,645 +32901,480 @@
               </p:nvSpPr>
               <p:spPr>
                 <a:xfrm>
-                  <a:off x="38774" y="1020623"/>
-                  <a:ext cx="2205970" cy="1"/>
+                  <a:off x="2464979" y="-775809"/>
+                  <a:ext cx="2866524" cy="960920"/>
                 </a:xfrm>
-                <a:prstGeom prst="line">
+                <a:prstGeom prst="rect">
                   <a:avLst/>
                 </a:prstGeom>
-                <a:noFill/>
-                <a:ln w="25400" cap="flat">
-                  <a:solidFill>
-                    <a:srgbClr val="000000"/>
-                  </a:solidFill>
-                  <a:prstDash val="solid"/>
+                <a:solidFill>
+                  <a:srgbClr val="EE7D69"/>
+                </a:solidFill>
+                <a:ln w="12700" cap="flat">
+                  <a:noFill/>
                   <a:miter lim="400000"/>
-                  <a:tailEnd type="triangle" w="med" len="med"/>
                 </a:ln>
-                <a:effectLst/>
+                <a:effectLst>
+                  <a:outerShdw blurRad="50800" dist="25400" dir="5400000" rotWithShape="0">
+                    <a:srgbClr val="000000">
+                      <a:alpha val="50000"/>
+                    </a:srgbClr>
+                  </a:outerShdw>
+                </a:effectLst>
+                <a:extLst>
+                  <a:ext uri="{C572A759-6A51-4108-AA02-DFA0A04FC94B}">
+                    <ma14:wrappingTextBoxFlag xmlns:ma14="http://schemas.microsoft.com/office/mac/drawingml/2011/main" xmlns:a14="http://schemas.microsoft.com/office/drawing/2010/main" xmlns:m="http://schemas.openxmlformats.org/officeDocument/2006/math" xmlns="" val="1"/>
+                  </a:ext>
+                </a:extLst>
               </p:spPr>
               <p:txBody>
                 <a:bodyPr wrap="square" lIns="35719" tIns="35719" rIns="35719" bIns="35719" numCol="1" anchor="ctr">
                   <a:noAutofit/>
                 </a:bodyPr>
-                <a:lstStyle/>
-                <a:p>
-                  <a:pPr>
+                <a:lstStyle>
+                  <a:lvl1pPr>
                     <a:defRPr b="0">
                       <a:latin typeface="Helvetica Light"/>
                       <a:ea typeface="Helvetica Light"/>
                       <a:cs typeface="Helvetica Light"/>
                       <a:sym typeface="Helvetica Light"/>
                     </a:defRPr>
-                  </a:pPr>
-                  <a:endParaRPr sz="800"/>
-                </a:p>
-              </p:txBody>
-            </p:sp>
-            <p:sp>
-              <p:nvSpPr>
-                <p:cNvPr id="61" name="Line">
-                  <a:extLst>
-                    <a:ext uri="{FF2B5EF4-FFF2-40B4-BE49-F238E27FC236}">
-                      <a16:creationId xmlns:a16="http://schemas.microsoft.com/office/drawing/2014/main" id="{030C2544-089C-0F47-8C36-C71C58B0C2AB}"/>
-                    </a:ext>
-                  </a:extLst>
-                </p:cNvPr>
-                <p:cNvSpPr/>
-                <p:nvPr/>
-              </p:nvSpPr>
-              <p:spPr>
-                <a:xfrm>
-                  <a:off x="38774" y="1449248"/>
-                  <a:ext cx="2205970" cy="1"/>
-                </a:xfrm>
-                <a:prstGeom prst="line">
-                  <a:avLst/>
-                </a:prstGeom>
-                <a:noFill/>
-                <a:ln w="25400" cap="flat">
-                  <a:solidFill>
-                    <a:srgbClr val="000000"/>
-                  </a:solidFill>
-                  <a:prstDash val="solid"/>
-                  <a:miter lim="400000"/>
-                  <a:headEnd type="triangle" w="med" len="med"/>
-                </a:ln>
-                <a:effectLst/>
-              </p:spPr>
-              <p:txBody>
-                <a:bodyPr wrap="square" lIns="35719" tIns="35719" rIns="35719" bIns="35719" numCol="1" anchor="ctr">
-                  <a:noAutofit/>
-                </a:bodyPr>
-                <a:lstStyle/>
-                <a:p>
-                  <a:pPr>
-                    <a:defRPr b="0">
-                      <a:latin typeface="Helvetica Light"/>
-                      <a:ea typeface="Helvetica Light"/>
-                      <a:cs typeface="Helvetica Light"/>
-                      <a:sym typeface="Helvetica Light"/>
-                    </a:defRPr>
-                  </a:pPr>
-                  <a:endParaRPr sz="800"/>
-                </a:p>
-              </p:txBody>
-            </p:sp>
-            <p:sp>
-              <p:nvSpPr>
-                <p:cNvPr id="62" name="150,000ns (just to read 4KB)">
-                  <a:extLst>
-                    <a:ext uri="{FF2B5EF4-FFF2-40B4-BE49-F238E27FC236}">
-                      <a16:creationId xmlns:a16="http://schemas.microsoft.com/office/drawing/2014/main" id="{9325D6D0-9B33-A049-BD49-8B265CC162CA}"/>
-                    </a:ext>
-                  </a:extLst>
-                </p:cNvPr>
-                <p:cNvSpPr/>
-                <p:nvPr/>
-              </p:nvSpPr>
-              <p:spPr>
-                <a:xfrm>
-                  <a:off x="3987998" y="326479"/>
-                  <a:ext cx="1270001" cy="1270001"/>
-                </a:xfrm>
-                <a:prstGeom prst="line">
-                  <a:avLst/>
-                </a:prstGeom>
-                <a:noFill/>
-                <a:ln w="12700" cap="flat">
-                  <a:noFill/>
-                  <a:miter lim="400000"/>
-                </a:ln>
-                <a:effectLst/>
-                <a:extLst>
-                  <a:ext uri="{C572A759-6A51-4108-AA02-DFA0A04FC94B}">
-                    <ma14:wrappingTextBoxFlag xmlns="" xmlns:m="http://schemas.openxmlformats.org/officeDocument/2006/math" xmlns:a14="http://schemas.microsoft.com/office/drawing/2010/main" xmlns:ma14="http://schemas.microsoft.com/office/mac/drawingml/2011/main" val="1"/>
-                  </a:ext>
-                </a:extLst>
-              </p:spPr>
-              <p:txBody>
-                <a:bodyPr wrap="none" lIns="35719" tIns="35719" rIns="35719" bIns="35719" numCol="1" anchor="ctr">
-                  <a:spAutoFit/>
-                </a:bodyPr>
-                <a:lstStyle>
-                  <a:lvl1pPr>
-                    <a:defRPr sz="4000" b="0">
-                      <a:latin typeface="Consolas"/>
-                      <a:ea typeface="Consolas"/>
-                      <a:cs typeface="Consolas"/>
-                      <a:sym typeface="Consolas"/>
-                    </a:defRPr>
                   </a:lvl1pPr>
                 </a:lstStyle>
                 <a:p>
                   <a:r>
-                    <a:rPr sz="2000">
+                    <a:rPr sz="1600">
                       <a:solidFill>
                         <a:schemeClr val="bg2">
                           <a:lumMod val="10000"/>
                         </a:schemeClr>
                       </a:solidFill>
                     </a:rPr>
-                    <a:t>150,000ns (just to read 4KB)</a:t>
+                    <a:t>Magnetic HD</a:t>
                   </a:r>
                 </a:p>
               </p:txBody>
             </p:sp>
+            <p:grpSp>
+              <p:nvGrpSpPr>
+                <p:cNvPr id="54" name="Group">
+                  <a:extLst>
+                    <a:ext uri="{FF2B5EF4-FFF2-40B4-BE49-F238E27FC236}">
+                      <a16:creationId xmlns:a16="http://schemas.microsoft.com/office/drawing/2014/main" id="{ECC30FC0-871B-8043-BFC0-389A7353B08D}"/>
+                    </a:ext>
+                  </a:extLst>
+                </p:cNvPr>
+                <p:cNvGrpSpPr/>
+                <p:nvPr/>
+              </p:nvGrpSpPr>
+              <p:grpSpPr>
+                <a:xfrm>
+                  <a:off x="83728" y="-1201900"/>
+                  <a:ext cx="5227851" cy="1270003"/>
+                  <a:chOff x="83728" y="-1201899"/>
+                  <a:chExt cx="5227849" cy="1270002"/>
+                </a:xfrm>
+              </p:grpSpPr>
+              <p:sp>
+                <p:nvSpPr>
+                  <p:cNvPr id="55" name="Line">
+                    <a:extLst>
+                      <a:ext uri="{FF2B5EF4-FFF2-40B4-BE49-F238E27FC236}">
+                        <a16:creationId xmlns:a16="http://schemas.microsoft.com/office/drawing/2014/main" id="{6179BC15-F03B-7445-98CA-4DBC78F241E7}"/>
+                      </a:ext>
+                    </a:extLst>
+                  </p:cNvPr>
+                  <p:cNvSpPr/>
+                  <p:nvPr/>
+                </p:nvSpPr>
+                <p:spPr>
+                  <a:xfrm>
+                    <a:off x="83728" y="-507753"/>
+                    <a:ext cx="2205970" cy="2"/>
+                  </a:xfrm>
+                  <a:prstGeom prst="line">
+                    <a:avLst/>
+                  </a:prstGeom>
+                  <a:noFill/>
+                  <a:ln w="25400" cap="flat">
+                    <a:solidFill>
+                      <a:srgbClr val="000000"/>
+                    </a:solidFill>
+                    <a:prstDash val="solid"/>
+                    <a:miter lim="400000"/>
+                    <a:tailEnd type="triangle" w="med" len="med"/>
+                  </a:ln>
+                  <a:effectLst/>
+                </p:spPr>
+                <p:txBody>
+                  <a:bodyPr wrap="square" lIns="35719" tIns="35719" rIns="35719" bIns="35719" numCol="1" anchor="ctr">
+                    <a:noAutofit/>
+                  </a:bodyPr>
+                  <a:lstStyle/>
+                  <a:p>
+                    <a:pPr>
+                      <a:defRPr b="0">
+                        <a:latin typeface="Helvetica Light"/>
+                        <a:ea typeface="Helvetica Light"/>
+                        <a:cs typeface="Helvetica Light"/>
+                        <a:sym typeface="Helvetica Light"/>
+                      </a:defRPr>
+                    </a:pPr>
+                    <a:endParaRPr sz="800"/>
+                  </a:p>
+                </p:txBody>
+              </p:sp>
+              <p:sp>
+                <p:nvSpPr>
+                  <p:cNvPr id="56" name="Line">
+                    <a:extLst>
+                      <a:ext uri="{FF2B5EF4-FFF2-40B4-BE49-F238E27FC236}">
+                        <a16:creationId xmlns:a16="http://schemas.microsoft.com/office/drawing/2014/main" id="{B40C6026-6B48-B84F-B094-67D05B989047}"/>
+                      </a:ext>
+                    </a:extLst>
+                  </p:cNvPr>
+                  <p:cNvSpPr/>
+                  <p:nvPr/>
+                </p:nvSpPr>
+                <p:spPr>
+                  <a:xfrm>
+                    <a:off x="83728" y="-79130"/>
+                    <a:ext cx="2205970" cy="2"/>
+                  </a:xfrm>
+                  <a:prstGeom prst="line">
+                    <a:avLst/>
+                  </a:prstGeom>
+                  <a:noFill/>
+                  <a:ln w="25400" cap="flat">
+                    <a:solidFill>
+                      <a:srgbClr val="000000"/>
+                    </a:solidFill>
+                    <a:prstDash val="solid"/>
+                    <a:miter lim="400000"/>
+                    <a:headEnd type="triangle" w="med" len="med"/>
+                  </a:ln>
+                  <a:effectLst/>
+                </p:spPr>
+                <p:txBody>
+                  <a:bodyPr wrap="square" lIns="35719" tIns="35719" rIns="35719" bIns="35719" numCol="1" anchor="ctr">
+                    <a:noAutofit/>
+                  </a:bodyPr>
+                  <a:lstStyle/>
+                  <a:p>
+                    <a:pPr>
+                      <a:defRPr b="0">
+                        <a:latin typeface="Helvetica Light"/>
+                        <a:ea typeface="Helvetica Light"/>
+                        <a:cs typeface="Helvetica Light"/>
+                        <a:sym typeface="Helvetica Light"/>
+                      </a:defRPr>
+                    </a:pPr>
+                    <a:endParaRPr sz="800"/>
+                  </a:p>
+                </p:txBody>
+              </p:sp>
+              <p:sp>
+                <p:nvSpPr>
+                  <p:cNvPr id="57" name="10,000,000ns (just to seek!)">
+                    <a:extLst>
+                      <a:ext uri="{FF2B5EF4-FFF2-40B4-BE49-F238E27FC236}">
+                        <a16:creationId xmlns:a16="http://schemas.microsoft.com/office/drawing/2014/main" id="{C3FBAB01-6491-AF49-AAA2-2C03731227D2}"/>
+                      </a:ext>
+                    </a:extLst>
+                  </p:cNvPr>
+                  <p:cNvSpPr/>
+                  <p:nvPr/>
+                </p:nvSpPr>
+                <p:spPr>
+                  <a:xfrm>
+                    <a:off x="4041576" y="-1201899"/>
+                    <a:ext cx="1270001" cy="1270002"/>
+                  </a:xfrm>
+                  <a:prstGeom prst="line">
+                    <a:avLst/>
+                  </a:prstGeom>
+                  <a:noFill/>
+                  <a:ln w="12700" cap="flat">
+                    <a:noFill/>
+                    <a:miter lim="400000"/>
+                  </a:ln>
+                  <a:effectLst/>
+                  <a:extLst>
+                    <a:ext uri="{C572A759-6A51-4108-AA02-DFA0A04FC94B}">
+                      <ma14:wrappingTextBoxFlag xmlns:ma14="http://schemas.microsoft.com/office/mac/drawingml/2011/main" xmlns:a14="http://schemas.microsoft.com/office/drawing/2010/main" xmlns:m="http://schemas.openxmlformats.org/officeDocument/2006/math" xmlns="" val="1"/>
+                    </a:ext>
+                  </a:extLst>
+                </p:spPr>
+                <p:txBody>
+                  <a:bodyPr wrap="none" lIns="35719" tIns="35719" rIns="35719" bIns="35719" numCol="1" anchor="ctr">
+                    <a:spAutoFit/>
+                  </a:bodyPr>
+                  <a:lstStyle>
+                    <a:lvl1pPr>
+                      <a:defRPr sz="4000" b="0">
+                        <a:latin typeface="Consolas"/>
+                        <a:ea typeface="Consolas"/>
+                        <a:cs typeface="Consolas"/>
+                        <a:sym typeface="Consolas"/>
+                      </a:defRPr>
+                    </a:lvl1pPr>
+                  </a:lstStyle>
+                  <a:p>
+                    <a:r>
+                      <a:rPr sz="2000" dirty="0">
+                        <a:solidFill>
+                          <a:schemeClr val="bg2">
+                            <a:lumMod val="10000"/>
+                          </a:schemeClr>
+                        </a:solidFill>
+                      </a:rPr>
+                      <a:t>10,000,000ns (just to seek!)</a:t>
+                    </a:r>
+                  </a:p>
+                </p:txBody>
+              </p:sp>
+            </p:grpSp>
           </p:grpSp>
         </p:grpSp>
-        <p:grpSp>
-          <p:nvGrpSpPr>
-            <p:cNvPr id="52" name="Group">
+        <p:sp>
+          <p:nvSpPr>
+            <p:cNvPr id="85" name="CPU 1">
               <a:extLst>
                 <a:ext uri="{FF2B5EF4-FFF2-40B4-BE49-F238E27FC236}">
-                  <a16:creationId xmlns:a16="http://schemas.microsoft.com/office/drawing/2014/main" id="{26D7B826-7CEA-A446-93AF-8D2CE3AD544B}"/>
+                  <a16:creationId xmlns:a16="http://schemas.microsoft.com/office/drawing/2014/main" id="{708F2F5E-4319-B74F-82E2-80860EDE1BA8}"/>
                 </a:ext>
               </a:extLst>
             </p:cNvPr>
-            <p:cNvGrpSpPr/>
+            <p:cNvSpPr/>
             <p:nvPr/>
-          </p:nvGrpSpPr>
-          <p:grpSpPr>
+          </p:nvSpPr>
+          <p:spPr>
             <a:xfrm>
-              <a:off x="10763250" y="2063010"/>
-              <a:ext cx="5247777" cy="1387012"/>
-              <a:chOff x="83728" y="-1201900"/>
-              <a:chExt cx="5247775" cy="1387011"/>
+              <a:off x="5483209" y="5271139"/>
+              <a:ext cx="2005158" cy="547394"/>
             </a:xfrm>
-          </p:grpSpPr>
-          <p:sp>
-            <p:nvSpPr>
-              <p:cNvPr id="53" name="Magnetic HD">
-                <a:extLst>
-                  <a:ext uri="{FF2B5EF4-FFF2-40B4-BE49-F238E27FC236}">
-                    <a16:creationId xmlns:a16="http://schemas.microsoft.com/office/drawing/2014/main" id="{887EC307-138E-334D-9544-EEE537956F47}"/>
-                  </a:ext>
-                </a:extLst>
-              </p:cNvPr>
-              <p:cNvSpPr/>
-              <p:nvPr/>
-            </p:nvSpPr>
-            <p:spPr>
-              <a:xfrm>
-                <a:off x="2464979" y="-775809"/>
-                <a:ext cx="2866524" cy="960920"/>
-              </a:xfrm>
-              <a:prstGeom prst="rect">
-                <a:avLst/>
-              </a:prstGeom>
-              <a:solidFill>
-                <a:srgbClr val="EE7D69"/>
-              </a:solidFill>
-              <a:ln w="12700" cap="flat">
-                <a:noFill/>
-                <a:miter lim="400000"/>
-              </a:ln>
-              <a:effectLst>
-                <a:outerShdw blurRad="50800" dist="25400" dir="5400000" rotWithShape="0">
-                  <a:srgbClr val="000000">
-                    <a:alpha val="50000"/>
-                  </a:srgbClr>
-                </a:outerShdw>
-              </a:effectLst>
+            <a:prstGeom prst="rect">
+              <a:avLst/>
+            </a:prstGeom>
+            <a:solidFill>
+              <a:srgbClr val="516D7C"/>
+            </a:solidFill>
+            <a:ln w="12700" cap="flat">
+              <a:noFill/>
+              <a:miter lim="400000"/>
+            </a:ln>
+            <a:effectLst>
+              <a:outerShdw blurRad="50800" dist="25400" dir="5400000" rotWithShape="0">
+                <a:srgbClr val="000000">
+                  <a:alpha val="50000"/>
+                </a:srgbClr>
+              </a:outerShdw>
+            </a:effectLst>
+            <a:extLst>
+              <a:ext uri="{C572A759-6A51-4108-AA02-DFA0A04FC94B}">
+                <ma14:wrappingTextBoxFlag xmlns:ma14="http://schemas.microsoft.com/office/mac/drawingml/2011/main" xmlns:a14="http://schemas.microsoft.com/office/drawing/2010/main" xmlns:m="http://schemas.openxmlformats.org/officeDocument/2006/math" xmlns="" val="1"/>
+              </a:ext>
+            </a:extLst>
+          </p:spPr>
+          <p:txBody>
+            <a:bodyPr wrap="square" lIns="35719" tIns="35719" rIns="35719" bIns="35719" numCol="1" anchor="t">
+              <a:noAutofit/>
+            </a:bodyPr>
+            <a:lstStyle>
+              <a:lvl1pPr algn="l">
+                <a:defRPr b="0">
+                  <a:solidFill>
+                    <a:srgbClr val="FFFFFF"/>
+                  </a:solidFill>
+                  <a:latin typeface="Helvetica Light"/>
+                  <a:ea typeface="Helvetica Light"/>
+                  <a:cs typeface="Helvetica Light"/>
+                  <a:sym typeface="Helvetica Light"/>
+                </a:defRPr>
+              </a:lvl1pPr>
+            </a:lstStyle>
+            <a:p>
+              <a:pPr algn="ctr"/>
+              <a:r>
+                <a:rPr lang="en-US" sz="1600" dirty="0"/>
+                <a:t>Remote Computer (Internet in between)</a:t>
+              </a:r>
+              <a:endParaRPr sz="1600" dirty="0"/>
+            </a:p>
+          </p:txBody>
+        </p:sp>
+        <p:sp>
+          <p:nvSpPr>
+            <p:cNvPr id="86" name="Line">
               <a:extLst>
-                <a:ext uri="{C572A759-6A51-4108-AA02-DFA0A04FC94B}">
-                  <ma14:wrappingTextBoxFlag xmlns="" xmlns:m="http://schemas.openxmlformats.org/officeDocument/2006/math" xmlns:a14="http://schemas.microsoft.com/office/drawing/2010/main" xmlns:ma14="http://schemas.microsoft.com/office/mac/drawingml/2011/main" val="1"/>
+                <a:ext uri="{FF2B5EF4-FFF2-40B4-BE49-F238E27FC236}">
+                  <a16:creationId xmlns:a16="http://schemas.microsoft.com/office/drawing/2014/main" id="{0AC42634-E149-064A-83E6-ED7D43BA6518}"/>
                 </a:ext>
               </a:extLst>
-            </p:spPr>
-            <p:txBody>
-              <a:bodyPr wrap="square" lIns="35719" tIns="35719" rIns="35719" bIns="35719" numCol="1" anchor="ctr">
-                <a:noAutofit/>
-              </a:bodyPr>
-              <a:lstStyle>
-                <a:lvl1pPr>
-                  <a:defRPr b="0">
-                    <a:latin typeface="Helvetica Light"/>
-                    <a:ea typeface="Helvetica Light"/>
-                    <a:cs typeface="Helvetica Light"/>
-                    <a:sym typeface="Helvetica Light"/>
-                  </a:defRPr>
-                </a:lvl1pPr>
-              </a:lstStyle>
-              <a:p>
-                <a:r>
-                  <a:rPr sz="1600">
-                    <a:solidFill>
-                      <a:schemeClr val="bg2">
-                        <a:lumMod val="10000"/>
-                      </a:schemeClr>
-                    </a:solidFill>
-                  </a:rPr>
-                  <a:t>Magnetic HD</a:t>
-                </a:r>
-              </a:p>
-            </p:txBody>
-          </p:sp>
-          <p:grpSp>
-            <p:nvGrpSpPr>
-              <p:cNvPr id="54" name="Group">
-                <a:extLst>
-                  <a:ext uri="{FF2B5EF4-FFF2-40B4-BE49-F238E27FC236}">
-                    <a16:creationId xmlns:a16="http://schemas.microsoft.com/office/drawing/2014/main" id="{ECC30FC0-871B-8043-BFC0-389A7353B08D}"/>
-                  </a:ext>
-                </a:extLst>
-              </p:cNvPr>
-              <p:cNvGrpSpPr/>
-              <p:nvPr/>
-            </p:nvGrpSpPr>
-            <p:grpSpPr>
-              <a:xfrm>
-                <a:off x="83728" y="-1201900"/>
-                <a:ext cx="5227851" cy="1270003"/>
-                <a:chOff x="83728" y="-1201899"/>
-                <a:chExt cx="5227849" cy="1270002"/>
-              </a:xfrm>
-            </p:grpSpPr>
-            <p:sp>
-              <p:nvSpPr>
-                <p:cNvPr id="55" name="Line">
-                  <a:extLst>
-                    <a:ext uri="{FF2B5EF4-FFF2-40B4-BE49-F238E27FC236}">
-                      <a16:creationId xmlns:a16="http://schemas.microsoft.com/office/drawing/2014/main" id="{6179BC15-F03B-7445-98CA-4DBC78F241E7}"/>
-                    </a:ext>
-                  </a:extLst>
-                </p:cNvPr>
-                <p:cNvSpPr/>
-                <p:nvPr/>
-              </p:nvSpPr>
-              <p:spPr>
-                <a:xfrm>
-                  <a:off x="83728" y="-507753"/>
-                  <a:ext cx="2205970" cy="2"/>
-                </a:xfrm>
-                <a:prstGeom prst="line">
-                  <a:avLst/>
-                </a:prstGeom>
-                <a:noFill/>
-                <a:ln w="25400" cap="flat">
+            </p:cNvPr>
+            <p:cNvSpPr/>
+            <p:nvPr/>
+          </p:nvSpPr>
+          <p:spPr>
+            <a:xfrm flipV="1">
+              <a:off x="6352115" y="4154555"/>
+              <a:ext cx="4389" cy="1113840"/>
+            </a:xfrm>
+            <a:prstGeom prst="line">
+              <a:avLst/>
+            </a:prstGeom>
+            <a:noFill/>
+            <a:ln w="25400" cap="flat">
+              <a:solidFill>
+                <a:srgbClr val="000000"/>
+              </a:solidFill>
+              <a:prstDash val="solid"/>
+              <a:miter lim="400000"/>
+              <a:headEnd type="triangle" w="med" len="med"/>
+            </a:ln>
+            <a:effectLst/>
+          </p:spPr>
+          <p:txBody>
+            <a:bodyPr wrap="square" lIns="35719" tIns="35719" rIns="35719" bIns="35719" numCol="1" anchor="ctr">
+              <a:noAutofit/>
+            </a:bodyPr>
+            <a:lstStyle/>
+            <a:p>
+              <a:pPr>
+                <a:defRPr b="0">
+                  <a:latin typeface="Helvetica Light"/>
+                  <a:ea typeface="Helvetica Light"/>
+                  <a:cs typeface="Helvetica Light"/>
+                  <a:sym typeface="Helvetica Light"/>
+                </a:defRPr>
+              </a:pPr>
+              <a:endParaRPr sz="800"/>
+            </a:p>
+          </p:txBody>
+        </p:sp>
+        <p:sp>
+          <p:nvSpPr>
+            <p:cNvPr id="87" name="Line">
+              <a:extLst>
+                <a:ext uri="{FF2B5EF4-FFF2-40B4-BE49-F238E27FC236}">
+                  <a16:creationId xmlns:a16="http://schemas.microsoft.com/office/drawing/2014/main" id="{BF898E9F-2960-EC4D-94DC-36C091B62C39}"/>
+                </a:ext>
+              </a:extLst>
+            </p:cNvPr>
+            <p:cNvSpPr/>
+            <p:nvPr/>
+          </p:nvSpPr>
+          <p:spPr>
+            <a:xfrm>
+              <a:off x="6544272" y="4154555"/>
+              <a:ext cx="0" cy="1113840"/>
+            </a:xfrm>
+            <a:prstGeom prst="line">
+              <a:avLst/>
+            </a:prstGeom>
+            <a:noFill/>
+            <a:ln w="25400" cap="flat">
+              <a:solidFill>
+                <a:srgbClr val="000000"/>
+              </a:solidFill>
+              <a:prstDash val="solid"/>
+              <a:miter lim="400000"/>
+              <a:headEnd type="triangle" w="med" len="med"/>
+            </a:ln>
+            <a:effectLst/>
+          </p:spPr>
+          <p:txBody>
+            <a:bodyPr wrap="square" lIns="35719" tIns="35719" rIns="35719" bIns="35719" numCol="1" anchor="ctr">
+              <a:noAutofit/>
+            </a:bodyPr>
+            <a:lstStyle/>
+            <a:p>
+              <a:pPr>
+                <a:defRPr b="0">
+                  <a:latin typeface="Helvetica Light"/>
+                  <a:ea typeface="Helvetica Light"/>
+                  <a:cs typeface="Helvetica Light"/>
+                  <a:sym typeface="Helvetica Light"/>
+                </a:defRPr>
+              </a:pPr>
+              <a:endParaRPr sz="800"/>
+            </a:p>
+          </p:txBody>
+        </p:sp>
+        <p:sp>
+          <p:nvSpPr>
+            <p:cNvPr id="89" name="TextBox 88">
+              <a:extLst>
+                <a:ext uri="{FF2B5EF4-FFF2-40B4-BE49-F238E27FC236}">
+                  <a16:creationId xmlns:a16="http://schemas.microsoft.com/office/drawing/2014/main" id="{7B5E046B-2A36-564E-BE8A-235D40FF9BD3}"/>
+                </a:ext>
+              </a:extLst>
+            </p:cNvPr>
+            <p:cNvSpPr txBox="1"/>
+            <p:nvPr/>
+          </p:nvSpPr>
+          <p:spPr>
+            <a:xfrm>
+              <a:off x="6697659" y="4335500"/>
+              <a:ext cx="3753741" cy="1015663"/>
+            </a:xfrm>
+            <a:prstGeom prst="rect">
+              <a:avLst/>
+            </a:prstGeom>
+            <a:noFill/>
+            <a:ln w="12700" cap="flat">
+              <a:noFill/>
+              <a:miter lim="400000"/>
+            </a:ln>
+            <a:effectLst/>
+            <a:sp3d/>
+          </p:spPr>
+          <p:style>
+            <a:lnRef idx="0">
+              <a:scrgbClr r="0" g="0" b="0"/>
+            </a:lnRef>
+            <a:fillRef idx="0">
+              <a:scrgbClr r="0" g="0" b="0"/>
+            </a:fillRef>
+            <a:effectRef idx="0">
+              <a:scrgbClr r="0" g="0" b="0"/>
+            </a:effectRef>
+            <a:fontRef idx="none"/>
+          </p:style>
+          <p:txBody>
+            <a:bodyPr wrap="square">
+              <a:spAutoFit/>
+            </a:bodyPr>
+            <a:lstStyle/>
+            <a:p>
+              <a:pPr algn="l"/>
+              <a:r>
+                <a:rPr lang="en-US" sz="2000" dirty="0">
                   <a:solidFill>
-                    <a:srgbClr val="000000"/>
+                    <a:schemeClr val="bg2">
+                      <a:lumMod val="10000"/>
+                    </a:schemeClr>
                   </a:solidFill>
-                  <a:prstDash val="solid"/>
-                  <a:miter lim="400000"/>
-                  <a:tailEnd type="triangle" w="med" len="med"/>
-                </a:ln>
-                <a:effectLst/>
-              </p:spPr>
-              <p:txBody>
-                <a:bodyPr wrap="square" lIns="35719" tIns="35719" rIns="35719" bIns="35719" numCol="1" anchor="ctr">
-                  <a:noAutofit/>
-                </a:bodyPr>
-                <a:lstStyle/>
-                <a:p>
-                  <a:pPr>
-                    <a:defRPr b="0">
-                      <a:latin typeface="Helvetica Light"/>
-                      <a:ea typeface="Helvetica Light"/>
-                      <a:cs typeface="Helvetica Light"/>
-                      <a:sym typeface="Helvetica Light"/>
-                    </a:defRPr>
-                  </a:pPr>
-                  <a:endParaRPr sz="800"/>
-                </a:p>
-              </p:txBody>
-            </p:sp>
-            <p:sp>
-              <p:nvSpPr>
-                <p:cNvPr id="56" name="Line">
-                  <a:extLst>
-                    <a:ext uri="{FF2B5EF4-FFF2-40B4-BE49-F238E27FC236}">
-                      <a16:creationId xmlns:a16="http://schemas.microsoft.com/office/drawing/2014/main" id="{B40C6026-6B48-B84F-B094-67D05B989047}"/>
-                    </a:ext>
-                  </a:extLst>
-                </p:cNvPr>
-                <p:cNvSpPr/>
-                <p:nvPr/>
-              </p:nvSpPr>
-              <p:spPr>
-                <a:xfrm>
-                  <a:off x="83728" y="-79130"/>
-                  <a:ext cx="2205970" cy="2"/>
-                </a:xfrm>
-                <a:prstGeom prst="line">
-                  <a:avLst/>
-                </a:prstGeom>
-                <a:noFill/>
-                <a:ln w="25400" cap="flat">
+                </a:rPr>
+                <a:t>~100,000,000ns</a:t>
+              </a:r>
+            </a:p>
+            <a:p>
+              <a:pPr algn="l"/>
+              <a:r>
+                <a:rPr lang="en-US" sz="2000" dirty="0">
                   <a:solidFill>
-                    <a:srgbClr val="000000"/>
+                    <a:schemeClr val="bg2">
+                      <a:lumMod val="10000"/>
+                    </a:schemeClr>
                   </a:solidFill>
-                  <a:prstDash val="solid"/>
-                  <a:miter lim="400000"/>
-                  <a:headEnd type="triangle" w="med" len="med"/>
-                </a:ln>
-                <a:effectLst/>
-              </p:spPr>
-              <p:txBody>
-                <a:bodyPr wrap="square" lIns="35719" tIns="35719" rIns="35719" bIns="35719" numCol="1" anchor="ctr">
-                  <a:noAutofit/>
-                </a:bodyPr>
-                <a:lstStyle/>
-                <a:p>
-                  <a:pPr>
-                    <a:defRPr b="0">
-                      <a:latin typeface="Helvetica Light"/>
-                      <a:ea typeface="Helvetica Light"/>
-                      <a:cs typeface="Helvetica Light"/>
-                      <a:sym typeface="Helvetica Light"/>
-                    </a:defRPr>
-                  </a:pPr>
-                  <a:endParaRPr sz="800"/>
-                </a:p>
-              </p:txBody>
-            </p:sp>
-            <p:sp>
-              <p:nvSpPr>
-                <p:cNvPr id="57" name="10,000,000ns (just to seek!)">
-                  <a:extLst>
-                    <a:ext uri="{FF2B5EF4-FFF2-40B4-BE49-F238E27FC236}">
-                      <a16:creationId xmlns:a16="http://schemas.microsoft.com/office/drawing/2014/main" id="{C3FBAB01-6491-AF49-AAA2-2C03731227D2}"/>
-                    </a:ext>
-                  </a:extLst>
-                </p:cNvPr>
-                <p:cNvSpPr/>
-                <p:nvPr/>
-              </p:nvSpPr>
-              <p:spPr>
-                <a:xfrm>
-                  <a:off x="4041576" y="-1201899"/>
-                  <a:ext cx="1270001" cy="1270002"/>
-                </a:xfrm>
-                <a:prstGeom prst="line">
-                  <a:avLst/>
-                </a:prstGeom>
-                <a:noFill/>
-                <a:ln w="12700" cap="flat">
-                  <a:noFill/>
-                  <a:miter lim="400000"/>
-                </a:ln>
-                <a:effectLst/>
-                <a:extLst>
-                  <a:ext uri="{C572A759-6A51-4108-AA02-DFA0A04FC94B}">
-                    <ma14:wrappingTextBoxFlag xmlns="" xmlns:m="http://schemas.openxmlformats.org/officeDocument/2006/math" xmlns:a14="http://schemas.microsoft.com/office/drawing/2010/main" xmlns:ma14="http://schemas.microsoft.com/office/mac/drawingml/2011/main" val="1"/>
-                  </a:ext>
-                </a:extLst>
-              </p:spPr>
-              <p:txBody>
-                <a:bodyPr wrap="none" lIns="35719" tIns="35719" rIns="35719" bIns="35719" numCol="1" anchor="ctr">
-                  <a:spAutoFit/>
-                </a:bodyPr>
-                <a:lstStyle>
-                  <a:lvl1pPr>
-                    <a:defRPr sz="4000" b="0">
-                      <a:latin typeface="Consolas"/>
-                      <a:ea typeface="Consolas"/>
-                      <a:cs typeface="Consolas"/>
-                      <a:sym typeface="Consolas"/>
-                    </a:defRPr>
-                  </a:lvl1pPr>
-                </a:lstStyle>
-                <a:p>
-                  <a:r>
-                    <a:rPr sz="2000" dirty="0">
-                      <a:solidFill>
-                        <a:schemeClr val="bg2">
-                          <a:lumMod val="10000"/>
-                        </a:schemeClr>
-                      </a:solidFill>
-                    </a:rPr>
-                    <a:t>10,000,000ns (just to seek!)</a:t>
-                  </a:r>
-                </a:p>
-              </p:txBody>
-            </p:sp>
-          </p:grpSp>
-        </p:grpSp>
+                </a:rPr>
+                <a:t>Earth to moon: ~16,000,000 inches</a:t>
+              </a:r>
+            </a:p>
+          </p:txBody>
+        </p:sp>
       </p:grpSp>
-      <p:sp>
-        <p:nvSpPr>
-          <p:cNvPr id="85" name="CPU 1">
-            <a:extLst>
-              <a:ext uri="{FF2B5EF4-FFF2-40B4-BE49-F238E27FC236}">
-                <a16:creationId xmlns:a16="http://schemas.microsoft.com/office/drawing/2014/main" id="{708F2F5E-4319-B74F-82E2-80860EDE1BA8}"/>
-              </a:ext>
-            </a:extLst>
-          </p:cNvPr>
-          <p:cNvSpPr/>
-          <p:nvPr/>
-        </p:nvSpPr>
-        <p:spPr>
-          <a:xfrm>
-            <a:off x="5483209" y="5271139"/>
-            <a:ext cx="2005158" cy="547394"/>
-          </a:xfrm>
-          <a:prstGeom prst="rect">
-            <a:avLst/>
-          </a:prstGeom>
-          <a:solidFill>
-            <a:srgbClr val="516D7C"/>
-          </a:solidFill>
-          <a:ln w="12700" cap="flat">
-            <a:noFill/>
-            <a:miter lim="400000"/>
-          </a:ln>
-          <a:effectLst>
-            <a:outerShdw blurRad="50800" dist="25400" dir="5400000" rotWithShape="0">
-              <a:srgbClr val="000000">
-                <a:alpha val="50000"/>
-              </a:srgbClr>
-            </a:outerShdw>
-          </a:effectLst>
-          <a:extLst>
-            <a:ext uri="{C572A759-6A51-4108-AA02-DFA0A04FC94B}">
-              <ma14:wrappingTextBoxFlag xmlns="" xmlns:m="http://schemas.openxmlformats.org/officeDocument/2006/math" xmlns:a14="http://schemas.microsoft.com/office/drawing/2010/main" xmlns:ma14="http://schemas.microsoft.com/office/mac/drawingml/2011/main" val="1"/>
-            </a:ext>
-          </a:extLst>
-        </p:spPr>
-        <p:txBody>
-          <a:bodyPr wrap="square" lIns="35719" tIns="35719" rIns="35719" bIns="35719" numCol="1" anchor="t">
-            <a:noAutofit/>
-          </a:bodyPr>
-          <a:lstStyle>
-            <a:lvl1pPr algn="l">
-              <a:defRPr b="0">
-                <a:solidFill>
-                  <a:srgbClr val="FFFFFF"/>
-                </a:solidFill>
-                <a:latin typeface="Helvetica Light"/>
-                <a:ea typeface="Helvetica Light"/>
-                <a:cs typeface="Helvetica Light"/>
-                <a:sym typeface="Helvetica Light"/>
-              </a:defRPr>
-            </a:lvl1pPr>
-          </a:lstStyle>
-          <a:p>
-            <a:pPr algn="ctr"/>
-            <a:r>
-              <a:rPr lang="en-US" sz="1600" dirty="0"/>
-              <a:t>Remote Computer (Internet in between)</a:t>
-            </a:r>
-            <a:endParaRPr sz="1600" dirty="0"/>
-          </a:p>
-        </p:txBody>
-      </p:sp>
-      <p:sp>
-        <p:nvSpPr>
-          <p:cNvPr id="86" name="Line">
-            <a:extLst>
-              <a:ext uri="{FF2B5EF4-FFF2-40B4-BE49-F238E27FC236}">
-                <a16:creationId xmlns:a16="http://schemas.microsoft.com/office/drawing/2014/main" id="{0AC42634-E149-064A-83E6-ED7D43BA6518}"/>
-              </a:ext>
-            </a:extLst>
-          </p:cNvPr>
-          <p:cNvSpPr/>
-          <p:nvPr/>
-        </p:nvSpPr>
-        <p:spPr>
-          <a:xfrm flipV="1">
-            <a:off x="6352115" y="4154555"/>
-            <a:ext cx="4389" cy="1113840"/>
-          </a:xfrm>
-          <a:prstGeom prst="line">
-            <a:avLst/>
-          </a:prstGeom>
-          <a:noFill/>
-          <a:ln w="25400" cap="flat">
-            <a:solidFill>
-              <a:srgbClr val="000000"/>
-            </a:solidFill>
-            <a:prstDash val="solid"/>
-            <a:miter lim="400000"/>
-            <a:headEnd type="triangle" w="med" len="med"/>
-          </a:ln>
-          <a:effectLst/>
-        </p:spPr>
-        <p:txBody>
-          <a:bodyPr wrap="square" lIns="35719" tIns="35719" rIns="35719" bIns="35719" numCol="1" anchor="ctr">
-            <a:noAutofit/>
-          </a:bodyPr>
-          <a:lstStyle/>
-          <a:p>
-            <a:pPr>
-              <a:defRPr b="0">
-                <a:latin typeface="Helvetica Light"/>
-                <a:ea typeface="Helvetica Light"/>
-                <a:cs typeface="Helvetica Light"/>
-                <a:sym typeface="Helvetica Light"/>
-              </a:defRPr>
-            </a:pPr>
-            <a:endParaRPr sz="800"/>
-          </a:p>
-        </p:txBody>
-      </p:sp>
-      <p:sp>
-        <p:nvSpPr>
-          <p:cNvPr id="87" name="Line">
-            <a:extLst>
-              <a:ext uri="{FF2B5EF4-FFF2-40B4-BE49-F238E27FC236}">
-                <a16:creationId xmlns:a16="http://schemas.microsoft.com/office/drawing/2014/main" id="{BF898E9F-2960-EC4D-94DC-36C091B62C39}"/>
-              </a:ext>
-            </a:extLst>
-          </p:cNvPr>
-          <p:cNvSpPr/>
-          <p:nvPr/>
-        </p:nvSpPr>
-        <p:spPr>
-          <a:xfrm>
-            <a:off x="6544272" y="4154555"/>
-            <a:ext cx="0" cy="1113840"/>
-          </a:xfrm>
-          <a:prstGeom prst="line">
-            <a:avLst/>
-          </a:prstGeom>
-          <a:noFill/>
-          <a:ln w="25400" cap="flat">
-            <a:solidFill>
-              <a:srgbClr val="000000"/>
-            </a:solidFill>
-            <a:prstDash val="solid"/>
-            <a:miter lim="400000"/>
-            <a:headEnd type="triangle" w="med" len="med"/>
-          </a:ln>
-          <a:effectLst/>
-        </p:spPr>
-        <p:txBody>
-          <a:bodyPr wrap="square" lIns="35719" tIns="35719" rIns="35719" bIns="35719" numCol="1" anchor="ctr">
-            <a:noAutofit/>
-          </a:bodyPr>
-          <a:lstStyle/>
-          <a:p>
-            <a:pPr>
-              <a:defRPr b="0">
-                <a:latin typeface="Helvetica Light"/>
-                <a:ea typeface="Helvetica Light"/>
-                <a:cs typeface="Helvetica Light"/>
-                <a:sym typeface="Helvetica Light"/>
-              </a:defRPr>
-            </a:pPr>
-            <a:endParaRPr sz="800"/>
-          </a:p>
-        </p:txBody>
-      </p:sp>
-      <p:sp>
-        <p:nvSpPr>
-          <p:cNvPr id="89" name="TextBox 88">
-            <a:extLst>
-              <a:ext uri="{FF2B5EF4-FFF2-40B4-BE49-F238E27FC236}">
-                <a16:creationId xmlns:a16="http://schemas.microsoft.com/office/drawing/2014/main" id="{7B5E046B-2A36-564E-BE8A-235D40FF9BD3}"/>
-              </a:ext>
-            </a:extLst>
-          </p:cNvPr>
-          <p:cNvSpPr txBox="1"/>
-          <p:nvPr/>
-        </p:nvSpPr>
-        <p:spPr>
-          <a:xfrm>
-            <a:off x="6404454" y="4723348"/>
-            <a:ext cx="2259828" cy="400110"/>
-          </a:xfrm>
-          <a:prstGeom prst="rect">
-            <a:avLst/>
-          </a:prstGeom>
-          <a:noFill/>
-          <a:ln w="12700" cap="flat">
-            <a:noFill/>
-            <a:miter lim="400000"/>
-          </a:ln>
-          <a:effectLst/>
-          <a:sp3d/>
-        </p:spPr>
-        <p:style>
-          <a:lnRef idx="0">
-            <a:scrgbClr r="0" g="0" b="0"/>
-          </a:lnRef>
-          <a:fillRef idx="0">
-            <a:scrgbClr r="0" g="0" b="0"/>
-          </a:fillRef>
-          <a:effectRef idx="0">
-            <a:scrgbClr r="0" g="0" b="0"/>
-          </a:effectRef>
-          <a:fontRef idx="none"/>
-        </p:style>
-        <p:txBody>
-          <a:bodyPr wrap="square">
-            <a:spAutoFit/>
-          </a:bodyPr>
-          <a:lstStyle/>
-          <a:p>
-            <a:r>
-              <a:rPr lang="en-US" sz="2000" dirty="0">
-                <a:solidFill>
-                  <a:schemeClr val="bg2">
-                    <a:lumMod val="10000"/>
-                  </a:schemeClr>
-                </a:solidFill>
-              </a:rPr>
-              <a:t>~100,000,000ns</a:t>
-            </a:r>
-          </a:p>
-        </p:txBody>
-      </p:sp>
       <p:sp>
         <p:nvSpPr>
           <p:cNvPr id="90" name="Typical Java Example">
@@ -33438,7 +33399,7 @@
           </a:prstGeom>
           <a:extLst>
             <a:ext uri="{C572A759-6A51-4108-AA02-DFA0A04FC94B}">
-              <ma14:wrappingTextBoxFlag xmlns="" xmlns:m="http://schemas.openxmlformats.org/officeDocument/2006/math" xmlns:a14="http://schemas.microsoft.com/office/drawing/2010/main" xmlns:ma14="http://schemas.microsoft.com/office/mac/drawingml/2011/main" val="1"/>
+              <ma14:wrappingTextBoxFlag xmlns:ma14="http://schemas.microsoft.com/office/mac/drawingml/2011/main" xmlns:a14="http://schemas.microsoft.com/office/drawing/2010/main" xmlns:m="http://schemas.openxmlformats.org/officeDocument/2006/math" xmlns="" val="1"/>
             </a:ext>
           </a:extLst>
         </p:spPr>
@@ -33686,9 +33647,233 @@
             <a:pPr marL="0" indent="0" hangingPunct="1">
               <a:buNone/>
             </a:pPr>
-            <a:r>
-              <a:rPr lang="en-US" dirty="0"/>
-              <a:t>Consider: a 1Ghz CPU executes an instruction every 1 ns</a:t>
+            <a:endParaRPr lang="en-US" dirty="0"/>
+          </a:p>
+        </p:txBody>
+      </p:sp>
+      <p:sp>
+        <p:nvSpPr>
+          <p:cNvPr id="7" name="Text Placeholder 2">
+            <a:extLst>
+              <a:ext uri="{FF2B5EF4-FFF2-40B4-BE49-F238E27FC236}">
+                <a16:creationId xmlns:a16="http://schemas.microsoft.com/office/drawing/2014/main" id="{D04E28F1-8A9A-1F7F-3A64-3130A6130F08}"/>
+              </a:ext>
+            </a:extLst>
+          </p:cNvPr>
+          <p:cNvSpPr txBox="1">
+            <a:spLocks/>
+          </p:cNvSpPr>
+          <p:nvPr/>
+        </p:nvSpPr>
+        <p:spPr>
+          <a:xfrm>
+            <a:off x="378738" y="4471620"/>
+            <a:ext cx="5597525" cy="4127500"/>
+          </a:xfrm>
+          <a:prstGeom prst="rect">
+            <a:avLst/>
+          </a:prstGeom>
+        </p:spPr>
+        <p:txBody>
+          <a:bodyPr vert="horz" lIns="91440" tIns="45720" rIns="91440" bIns="45720" rtlCol="0">
+            <a:normAutofit/>
+          </a:bodyPr>
+          <a:lstStyle>
+            <a:lvl1pPr marL="228600" indent="-228600" algn="l" defTabSz="914400" rtl="0" eaLnBrk="1" latinLnBrk="0" hangingPunct="1">
+              <a:lnSpc>
+                <a:spcPct val="90000"/>
+              </a:lnSpc>
+              <a:spcBef>
+                <a:spcPts val="1000"/>
+              </a:spcBef>
+              <a:buFont typeface="Arial" panose="020B0604020202020204" pitchFamily="34" charset="0"/>
+              <a:buChar char="•"/>
+              <a:defRPr sz="2800" kern="1200">
+                <a:solidFill>
+                  <a:schemeClr val="tx1"/>
+                </a:solidFill>
+                <a:latin typeface="Verdana" panose="020B0604030504040204" pitchFamily="34" charset="0"/>
+                <a:ea typeface="Verdana" panose="020B0604030504040204" pitchFamily="34" charset="0"/>
+                <a:cs typeface="+mn-cs"/>
+              </a:defRPr>
+            </a:lvl1pPr>
+            <a:lvl2pPr marL="685800" indent="-228600" algn="l" defTabSz="914400" rtl="0" eaLnBrk="1" latinLnBrk="0" hangingPunct="1">
+              <a:lnSpc>
+                <a:spcPct val="90000"/>
+              </a:lnSpc>
+              <a:spcBef>
+                <a:spcPts val="500"/>
+              </a:spcBef>
+              <a:buFont typeface="Arial" panose="020B0604020202020204" pitchFamily="34" charset="0"/>
+              <a:buChar char="•"/>
+              <a:defRPr sz="2400" kern="1200">
+                <a:solidFill>
+                  <a:schemeClr val="tx1"/>
+                </a:solidFill>
+                <a:latin typeface="Verdana" panose="020B0604030504040204" pitchFamily="34" charset="0"/>
+                <a:ea typeface="Verdana" panose="020B0604030504040204" pitchFamily="34" charset="0"/>
+                <a:cs typeface="+mn-cs"/>
+              </a:defRPr>
+            </a:lvl2pPr>
+            <a:lvl3pPr marL="1143000" indent="-228600" algn="l" defTabSz="914400" rtl="0" eaLnBrk="1" latinLnBrk="0" hangingPunct="1">
+              <a:lnSpc>
+                <a:spcPct val="90000"/>
+              </a:lnSpc>
+              <a:spcBef>
+                <a:spcPts val="500"/>
+              </a:spcBef>
+              <a:buFont typeface="Arial" panose="020B0604020202020204" pitchFamily="34" charset="0"/>
+              <a:buChar char="•"/>
+              <a:defRPr sz="2000" kern="1200">
+                <a:solidFill>
+                  <a:schemeClr val="tx1"/>
+                </a:solidFill>
+                <a:latin typeface="Verdana" panose="020B0604030504040204" pitchFamily="34" charset="0"/>
+                <a:ea typeface="Verdana" panose="020B0604030504040204" pitchFamily="34" charset="0"/>
+                <a:cs typeface="+mn-cs"/>
+              </a:defRPr>
+            </a:lvl3pPr>
+            <a:lvl4pPr marL="1600200" indent="-228600" algn="l" defTabSz="914400" rtl="0" eaLnBrk="1" latinLnBrk="0" hangingPunct="1">
+              <a:lnSpc>
+                <a:spcPct val="90000"/>
+              </a:lnSpc>
+              <a:spcBef>
+                <a:spcPts val="500"/>
+              </a:spcBef>
+              <a:buFont typeface="Arial" panose="020B0604020202020204" pitchFamily="34" charset="0"/>
+              <a:buChar char="•"/>
+              <a:defRPr sz="1800" kern="1200">
+                <a:solidFill>
+                  <a:schemeClr val="tx1"/>
+                </a:solidFill>
+                <a:latin typeface="Verdana" panose="020B0604030504040204" pitchFamily="34" charset="0"/>
+                <a:ea typeface="Verdana" panose="020B0604030504040204" pitchFamily="34" charset="0"/>
+                <a:cs typeface="+mn-cs"/>
+              </a:defRPr>
+            </a:lvl4pPr>
+            <a:lvl5pPr marL="2057400" indent="-228600" algn="l" defTabSz="914400" rtl="0" eaLnBrk="1" latinLnBrk="0" hangingPunct="1">
+              <a:lnSpc>
+                <a:spcPct val="90000"/>
+              </a:lnSpc>
+              <a:spcBef>
+                <a:spcPts val="500"/>
+              </a:spcBef>
+              <a:buFont typeface="Arial" panose="020B0604020202020204" pitchFamily="34" charset="0"/>
+              <a:buChar char="•"/>
+              <a:defRPr sz="1800" kern="1200">
+                <a:solidFill>
+                  <a:schemeClr val="tx1"/>
+                </a:solidFill>
+                <a:latin typeface="Verdana" panose="020B0604030504040204" pitchFamily="34" charset="0"/>
+                <a:ea typeface="Verdana" panose="020B0604030504040204" pitchFamily="34" charset="0"/>
+                <a:cs typeface="+mn-cs"/>
+              </a:defRPr>
+            </a:lvl5pPr>
+            <a:lvl6pPr marL="2514600" indent="-228600" algn="l" defTabSz="914400" rtl="0" eaLnBrk="1" latinLnBrk="0" hangingPunct="1">
+              <a:lnSpc>
+                <a:spcPct val="90000"/>
+              </a:lnSpc>
+              <a:spcBef>
+                <a:spcPts val="500"/>
+              </a:spcBef>
+              <a:buFont typeface="Arial" panose="020B0604020202020204" pitchFamily="34" charset="0"/>
+              <a:buChar char="•"/>
+              <a:defRPr sz="1800" kern="1200">
+                <a:solidFill>
+                  <a:schemeClr val="tx1"/>
+                </a:solidFill>
+                <a:latin typeface="+mn-lt"/>
+                <a:ea typeface="+mn-ea"/>
+                <a:cs typeface="+mn-cs"/>
+              </a:defRPr>
+            </a:lvl6pPr>
+            <a:lvl7pPr marL="2971800" indent="-228600" algn="l" defTabSz="914400" rtl="0" eaLnBrk="1" latinLnBrk="0" hangingPunct="1">
+              <a:lnSpc>
+                <a:spcPct val="90000"/>
+              </a:lnSpc>
+              <a:spcBef>
+                <a:spcPts val="500"/>
+              </a:spcBef>
+              <a:buFont typeface="Arial" panose="020B0604020202020204" pitchFamily="34" charset="0"/>
+              <a:buChar char="•"/>
+              <a:defRPr sz="1800" kern="1200">
+                <a:solidFill>
+                  <a:schemeClr val="tx1"/>
+                </a:solidFill>
+                <a:latin typeface="+mn-lt"/>
+                <a:ea typeface="+mn-ea"/>
+                <a:cs typeface="+mn-cs"/>
+              </a:defRPr>
+            </a:lvl7pPr>
+            <a:lvl8pPr marL="3429000" indent="-228600" algn="l" defTabSz="914400" rtl="0" eaLnBrk="1" latinLnBrk="0" hangingPunct="1">
+              <a:lnSpc>
+                <a:spcPct val="90000"/>
+              </a:lnSpc>
+              <a:spcBef>
+                <a:spcPts val="500"/>
+              </a:spcBef>
+              <a:buFont typeface="Arial" panose="020B0604020202020204" pitchFamily="34" charset="0"/>
+              <a:buChar char="•"/>
+              <a:defRPr sz="1800" kern="1200">
+                <a:solidFill>
+                  <a:schemeClr val="tx1"/>
+                </a:solidFill>
+                <a:latin typeface="+mn-lt"/>
+                <a:ea typeface="+mn-ea"/>
+                <a:cs typeface="+mn-cs"/>
+              </a:defRPr>
+            </a:lvl8pPr>
+            <a:lvl9pPr marL="3886200" indent="-228600" algn="l" defTabSz="914400" rtl="0" eaLnBrk="1" latinLnBrk="0" hangingPunct="1">
+              <a:lnSpc>
+                <a:spcPct val="90000"/>
+              </a:lnSpc>
+              <a:spcBef>
+                <a:spcPts val="500"/>
+              </a:spcBef>
+              <a:buFont typeface="Arial" panose="020B0604020202020204" pitchFamily="34" charset="0"/>
+              <a:buChar char="•"/>
+              <a:defRPr sz="1800" kern="1200">
+                <a:solidFill>
+                  <a:schemeClr val="tx1"/>
+                </a:solidFill>
+                <a:latin typeface="+mn-lt"/>
+                <a:ea typeface="+mn-ea"/>
+                <a:cs typeface="+mn-cs"/>
+              </a:defRPr>
+            </a:lvl9pPr>
+          </a:lstStyle>
+          <a:p>
+            <a:r>
+              <a:rPr lang="en-US" sz="2400" dirty="0"/>
+              <a:t>Utilize this “wasted” time by doing something else</a:t>
+            </a:r>
+          </a:p>
+          <a:p>
+            <a:pPr lvl="1"/>
+            <a:r>
+              <a:rPr lang="en-US" sz="1800" dirty="0"/>
+              <a:t>Processing data</a:t>
+            </a:r>
+          </a:p>
+          <a:p>
+            <a:pPr lvl="1"/>
+            <a:r>
+              <a:rPr lang="en-US" sz="1800" dirty="0"/>
+              <a:t>Communicating with remote hosts</a:t>
+            </a:r>
+          </a:p>
+          <a:p>
+            <a:pPr lvl="1"/>
+            <a:r>
+              <a:rPr lang="en-US" sz="1800" dirty="0"/>
+              <a:t>Timers that countdown while our app is running</a:t>
+            </a:r>
+          </a:p>
+          <a:p>
+            <a:pPr lvl="1"/>
+            <a:r>
+              <a:rPr lang="en-US" sz="1800" dirty="0"/>
+              <a:t>Waiting for users to provide input</a:t>
             </a:r>
           </a:p>
         </p:txBody>
@@ -33703,6 +33888,129 @@
   <p:clrMapOvr>
     <a:masterClrMapping/>
   </p:clrMapOvr>
+  <p:timing>
+    <p:tnLst>
+      <p:par>
+        <p:cTn id="1" dur="indefinite" restart="never" nodeType="tmRoot">
+          <p:childTnLst>
+            <p:seq concurrent="1" nextAc="seek">
+              <p:cTn id="2" dur="indefinite" nodeType="mainSeq">
+                <p:childTnLst>
+                  <p:par>
+                    <p:cTn id="3" fill="hold">
+                      <p:stCondLst>
+                        <p:cond delay="indefinite"/>
+                      </p:stCondLst>
+                      <p:childTnLst>
+                        <p:par>
+                          <p:cTn id="4" fill="hold">
+                            <p:stCondLst>
+                              <p:cond delay="0"/>
+                            </p:stCondLst>
+                            <p:childTnLst>
+                              <p:par>
+                                <p:cTn id="5" presetID="1" presetClass="entr" presetSubtype="0" fill="hold" nodeType="clickEffect">
+                                  <p:stCondLst>
+                                    <p:cond delay="0"/>
+                                  </p:stCondLst>
+                                  <p:childTnLst>
+                                    <p:set>
+                                      <p:cBhvr>
+                                        <p:cTn id="6" dur="1" fill="hold">
+                                          <p:stCondLst>
+                                            <p:cond delay="0"/>
+                                          </p:stCondLst>
+                                        </p:cTn>
+                                        <p:tgtEl>
+                                          <p:spTgt spid="4"/>
+                                        </p:tgtEl>
+                                        <p:attrNameLst>
+                                          <p:attrName>style.visibility</p:attrName>
+                                        </p:attrNameLst>
+                                      </p:cBhvr>
+                                      <p:to>
+                                        <p:strVal val="visible"/>
+                                      </p:to>
+                                    </p:set>
+                                  </p:childTnLst>
+                                </p:cTn>
+                              </p:par>
+                            </p:childTnLst>
+                          </p:cTn>
+                        </p:par>
+                      </p:childTnLst>
+                    </p:cTn>
+                  </p:par>
+                  <p:par>
+                    <p:cTn id="7" fill="hold">
+                      <p:stCondLst>
+                        <p:cond delay="indefinite"/>
+                      </p:stCondLst>
+                      <p:childTnLst>
+                        <p:par>
+                          <p:cTn id="8" fill="hold">
+                            <p:stCondLst>
+                              <p:cond delay="0"/>
+                            </p:stCondLst>
+                            <p:childTnLst>
+                              <p:par>
+                                <p:cTn id="9" presetID="1" presetClass="entr" presetSubtype="0" fill="hold" grpId="0" nodeType="clickEffect">
+                                  <p:stCondLst>
+                                    <p:cond delay="0"/>
+                                  </p:stCondLst>
+                                  <p:childTnLst>
+                                    <p:set>
+                                      <p:cBhvr>
+                                        <p:cTn id="10" dur="1" fill="hold">
+                                          <p:stCondLst>
+                                            <p:cond delay="0"/>
+                                          </p:stCondLst>
+                                        </p:cTn>
+                                        <p:tgtEl>
+                                          <p:spTgt spid="7"/>
+                                        </p:tgtEl>
+                                        <p:attrNameLst>
+                                          <p:attrName>style.visibility</p:attrName>
+                                        </p:attrNameLst>
+                                      </p:cBhvr>
+                                      <p:to>
+                                        <p:strVal val="visible"/>
+                                      </p:to>
+                                    </p:set>
+                                  </p:childTnLst>
+                                </p:cTn>
+                              </p:par>
+                            </p:childTnLst>
+                          </p:cTn>
+                        </p:par>
+                      </p:childTnLst>
+                    </p:cTn>
+                  </p:par>
+                </p:childTnLst>
+              </p:cTn>
+              <p:prevCondLst>
+                <p:cond evt="onPrev" delay="0">
+                  <p:tgtEl>
+                    <p:sldTgt/>
+                  </p:tgtEl>
+                </p:cond>
+              </p:prevCondLst>
+              <p:nextCondLst>
+                <p:cond evt="onNext" delay="0">
+                  <p:tgtEl>
+                    <p:sldTgt/>
+                  </p:tgtEl>
+                </p:cond>
+              </p:nextCondLst>
+            </p:seq>
+          </p:childTnLst>
+        </p:cTn>
+      </p:par>
+    </p:tnLst>
+    <p:bldLst>
+      <p:bldP spid="7" grpId="0"/>
+    </p:bldLst>
+  </p:timing>
 </p:sld>
 </file>
 
@@ -33853,7 +34161,7 @@
           </a:ln>
           <a:extLst>
             <a:ext uri="{C572A759-6A51-4108-AA02-DFA0A04FC94B}">
-              <ma14:wrappingTextBoxFlag xmlns:ma14="http://schemas.microsoft.com/office/mac/drawingml/2011/main" xmlns:a14="http://schemas.microsoft.com/office/drawing/2010/main" xmlns:m="http://schemas.openxmlformats.org/officeDocument/2006/math" xmlns="" val="1"/>
+              <ma14:wrappingTextBoxFlag xmlns="" xmlns:m="http://schemas.openxmlformats.org/officeDocument/2006/math" xmlns:a14="http://schemas.microsoft.com/office/drawing/2010/main" xmlns:ma14="http://schemas.microsoft.com/office/mac/drawingml/2011/main" val="1"/>
             </a:ext>
           </a:extLst>
         </p:spPr>
@@ -35914,7 +36222,7 @@
           </a:ln>
           <a:extLst>
             <a:ext uri="{C572A759-6A51-4108-AA02-DFA0A04FC94B}">
-              <ma14:wrappingTextBoxFlag xmlns="" xmlns:m="http://schemas.openxmlformats.org/officeDocument/2006/math" xmlns:a14="http://schemas.microsoft.com/office/drawing/2010/main" xmlns:ma14="http://schemas.microsoft.com/office/mac/drawingml/2011/main" val="1"/>
+              <ma14:wrappingTextBoxFlag xmlns:ma14="http://schemas.microsoft.com/office/mac/drawingml/2011/main" xmlns:a14="http://schemas.microsoft.com/office/drawing/2010/main" xmlns:m="http://schemas.openxmlformats.org/officeDocument/2006/math" xmlns="" val="1"/>
             </a:ext>
           </a:extLst>
         </p:spPr>
@@ -36696,7 +37004,7 @@
           </a:ln>
           <a:extLst>
             <a:ext uri="{C572A759-6A51-4108-AA02-DFA0A04FC94B}">
-              <ma14:wrappingTextBoxFlag xmlns="" xmlns:m="http://schemas.openxmlformats.org/officeDocument/2006/math" xmlns:a14="http://schemas.microsoft.com/office/drawing/2010/main" xmlns:ma14="http://schemas.microsoft.com/office/mac/drawingml/2011/main" val="1"/>
+              <ma14:wrappingTextBoxFlag xmlns:ma14="http://schemas.microsoft.com/office/mac/drawingml/2011/main" xmlns:a14="http://schemas.microsoft.com/office/drawing/2010/main" xmlns:m="http://schemas.openxmlformats.org/officeDocument/2006/math" xmlns="" val="1"/>
             </a:ext>
           </a:extLst>
         </p:spPr>
@@ -39920,7 +40228,7 @@
           <a:p>
             <a:r>
               <a:rPr lang="en-US" dirty="0"/>
-              <a:t>A computation is suspended when it hits an ‘await’.</a:t>
+              <a:t>A computation is suspended when it hits an ‘await’. The runtime system (node.js, for us) chooses what to do next. (In addition to whatever asynchronous IO it may be doing).</a:t>
             </a:r>
           </a:p>
         </p:txBody>
@@ -40623,8 +40931,8 @@
         </p:nvSpPr>
         <p:spPr>
           <a:xfrm>
-            <a:off x="1884876" y="3582363"/>
-            <a:ext cx="8422248" cy="4351338"/>
+            <a:off x="998163" y="3582363"/>
+            <a:ext cx="5489875" cy="4351338"/>
           </a:xfrm>
         </p:spPr>
         <p:txBody>
@@ -40741,10 +41049,10 @@
       </p:sp>
       <p:grpSp>
         <p:nvGrpSpPr>
-          <p:cNvPr id="15" name="Group 14">
+          <p:cNvPr id="7" name="Group 6">
             <a:extLst>
               <a:ext uri="{FF2B5EF4-FFF2-40B4-BE49-F238E27FC236}">
-                <a16:creationId xmlns:a16="http://schemas.microsoft.com/office/drawing/2014/main" id="{D3966E2D-54B5-68A3-DA38-6B8B8A67F087}"/>
+                <a16:creationId xmlns:a16="http://schemas.microsoft.com/office/drawing/2014/main" id="{F65995AC-CB7A-C4BD-A863-E67B69B33F4F}"/>
               </a:ext>
             </a:extLst>
           </p:cNvPr>
@@ -40753,10 +41061,10 @@
         </p:nvGrpSpPr>
         <p:grpSpPr>
           <a:xfrm>
-            <a:off x="5797549" y="1976342"/>
-            <a:ext cx="5030872" cy="2472874"/>
-            <a:chOff x="5797549" y="1976342"/>
-            <a:chExt cx="5030872" cy="2472874"/>
+            <a:off x="6096000" y="1829593"/>
+            <a:ext cx="5816972" cy="3941379"/>
+            <a:chOff x="6096000" y="1829593"/>
+            <a:chExt cx="5816972" cy="3941379"/>
           </a:xfrm>
         </p:grpSpPr>
         <p:sp>
@@ -40775,8 +41083,8 @@
           </p:nvSpPr>
           <p:spPr>
             <a:xfrm>
-              <a:off x="6096000" y="3123653"/>
-              <a:ext cx="4586868" cy="1325563"/>
+              <a:off x="7326104" y="3898433"/>
+              <a:ext cx="4586868" cy="1872539"/>
             </a:xfrm>
             <a:prstGeom prst="rect">
               <a:avLst/>
@@ -41005,8 +41313,8 @@
           </p:nvSpPr>
           <p:spPr>
             <a:xfrm>
-              <a:off x="5797549" y="1976342"/>
-              <a:ext cx="5030872" cy="519303"/>
+              <a:off x="6096000" y="1829593"/>
+              <a:ext cx="5030872" cy="733586"/>
             </a:xfrm>
             <a:prstGeom prst="roundRect">
               <a:avLst/>
@@ -41058,14 +41366,13 @@
             </p:cNvPr>
             <p:cNvCxnSpPr>
               <a:cxnSpLocks/>
-              <a:stCxn id="9" idx="0"/>
             </p:cNvCxnSpPr>
             <p:nvPr/>
           </p:nvCxnSpPr>
           <p:spPr>
             <a:xfrm flipH="1" flipV="1">
-              <a:off x="8205652" y="2495645"/>
-              <a:ext cx="183782" cy="628008"/>
+              <a:off x="8729829" y="2431632"/>
+              <a:ext cx="776766" cy="1466801"/>
             </a:xfrm>
             <a:prstGeom prst="straightConnector1">
               <a:avLst/>
@@ -41125,7 +41432,7 @@
                             </p:stCondLst>
                             <p:childTnLst>
                               <p:par>
-                                <p:cTn id="5" presetID="1" presetClass="entr" presetSubtype="0" fill="hold" nodeType="clickEffect">
+                                <p:cTn id="5" presetID="1" presetClass="entr" presetSubtype="0" fill="hold" grpId="0" nodeType="clickEffect">
                                   <p:stCondLst>
                                     <p:cond delay="0"/>
                                   </p:stCondLst>
@@ -41133,96 +41440,6 @@
                                     <p:set>
                                       <p:cBhvr>
                                         <p:cTn id="6" dur="1" fill="hold">
-                                          <p:stCondLst>
-                                            <p:cond delay="0"/>
-                                          </p:stCondLst>
-                                        </p:cTn>
-                                        <p:tgtEl>
-                                          <p:spTgt spid="15"/>
-                                        </p:tgtEl>
-                                        <p:attrNameLst>
-                                          <p:attrName>style.visibility</p:attrName>
-                                        </p:attrNameLst>
-                                      </p:cBhvr>
-                                      <p:to>
-                                        <p:strVal val="visible"/>
-                                      </p:to>
-                                    </p:set>
-                                  </p:childTnLst>
-                                </p:cTn>
-                              </p:par>
-                            </p:childTnLst>
-                          </p:cTn>
-                        </p:par>
-                      </p:childTnLst>
-                    </p:cTn>
-                  </p:par>
-                  <p:par>
-                    <p:cTn id="7" fill="hold">
-                      <p:stCondLst>
-                        <p:cond delay="indefinite"/>
-                      </p:stCondLst>
-                      <p:childTnLst>
-                        <p:par>
-                          <p:cTn id="8" fill="hold">
-                            <p:stCondLst>
-                              <p:cond delay="0"/>
-                            </p:stCondLst>
-                            <p:childTnLst>
-                              <p:par>
-                                <p:cTn id="9" presetID="1" presetClass="exit" presetSubtype="0" fill="hold" nodeType="clickEffect">
-                                  <p:stCondLst>
-                                    <p:cond delay="0"/>
-                                  </p:stCondLst>
-                                  <p:childTnLst>
-                                    <p:set>
-                                      <p:cBhvr>
-                                        <p:cTn id="10" dur="1" fill="hold">
-                                          <p:stCondLst>
-                                            <p:cond delay="0"/>
-                                          </p:stCondLst>
-                                        </p:cTn>
-                                        <p:tgtEl>
-                                          <p:spTgt spid="15"/>
-                                        </p:tgtEl>
-                                        <p:attrNameLst>
-                                          <p:attrName>style.visibility</p:attrName>
-                                        </p:attrNameLst>
-                                      </p:cBhvr>
-                                      <p:to>
-                                        <p:strVal val="hidden"/>
-                                      </p:to>
-                                    </p:set>
-                                  </p:childTnLst>
-                                </p:cTn>
-                              </p:par>
-                            </p:childTnLst>
-                          </p:cTn>
-                        </p:par>
-                      </p:childTnLst>
-                    </p:cTn>
-                  </p:par>
-                  <p:par>
-                    <p:cTn id="11" fill="hold">
-                      <p:stCondLst>
-                        <p:cond delay="indefinite"/>
-                      </p:stCondLst>
-                      <p:childTnLst>
-                        <p:par>
-                          <p:cTn id="12" fill="hold">
-                            <p:stCondLst>
-                              <p:cond delay="0"/>
-                            </p:stCondLst>
-                            <p:childTnLst>
-                              <p:par>
-                                <p:cTn id="13" presetID="1" presetClass="entr" presetSubtype="0" fill="hold" grpId="0" nodeType="clickEffect">
-                                  <p:stCondLst>
-                                    <p:cond delay="0"/>
-                                  </p:stCondLst>
-                                  <p:childTnLst>
-                                    <p:set>
-                                      <p:cBhvr>
-                                        <p:cTn id="14" dur="1" fill="hold">
                                           <p:stCondLst>
                                             <p:cond delay="0"/>
                                           </p:stCondLst>
@@ -41242,14 +41459,14 @@
                                 </p:cTn>
                               </p:par>
                               <p:par>
-                                <p:cTn id="15" presetID="1" presetClass="entr" presetSubtype="0" fill="hold" grpId="0" nodeType="withEffect">
+                                <p:cTn id="7" presetID="1" presetClass="entr" presetSubtype="0" fill="hold" grpId="0" nodeType="withEffect">
                                   <p:stCondLst>
                                     <p:cond delay="0"/>
                                   </p:stCondLst>
                                   <p:childTnLst>
                                     <p:set>
                                       <p:cBhvr>
-                                        <p:cTn id="16" dur="1" fill="hold">
+                                        <p:cTn id="8" dur="1" fill="hold">
                                           <p:stCondLst>
                                             <p:cond delay="0"/>
                                           </p:stCondLst>

</xml_diff>

<commit_message>
added l5.md, Activity, L05 slides
</commit_message>
<xml_diff>
--- a/Slides/Lecture 05 Concurrency Patterns in Typescript.pptx
+++ b/Slides/Lecture 05 Concurrency Patterns in Typescript.pptx
@@ -5,11 +5,11 @@
     <p:sldMasterId id="2147483703" r:id="rId1"/>
   </p:sldMasterIdLst>
   <p:notesMasterIdLst>
-    <p:notesMasterId r:id="rId39"/>
+    <p:notesMasterId r:id="rId40"/>
   </p:notesMasterIdLst>
   <p:sldIdLst>
     <p:sldId id="485" r:id="rId2"/>
-    <p:sldId id="513" r:id="rId3"/>
+    <p:sldId id="556" r:id="rId3"/>
     <p:sldId id="486" r:id="rId4"/>
     <p:sldId id="262" r:id="rId5"/>
     <p:sldId id="514" r:id="rId6"/>
@@ -33,18 +33,19 @@
     <p:sldId id="511" r:id="rId24"/>
     <p:sldId id="289" r:id="rId25"/>
     <p:sldId id="543" r:id="rId26"/>
-    <p:sldId id="551" r:id="rId27"/>
-    <p:sldId id="544" r:id="rId28"/>
-    <p:sldId id="277" r:id="rId29"/>
-    <p:sldId id="549" r:id="rId30"/>
-    <p:sldId id="550" r:id="rId31"/>
-    <p:sldId id="499" r:id="rId32"/>
-    <p:sldId id="284" r:id="rId33"/>
-    <p:sldId id="545" r:id="rId34"/>
-    <p:sldId id="546" r:id="rId35"/>
-    <p:sldId id="547" r:id="rId36"/>
-    <p:sldId id="548" r:id="rId37"/>
-    <p:sldId id="552" r:id="rId38"/>
+    <p:sldId id="554" r:id="rId27"/>
+    <p:sldId id="555" r:id="rId28"/>
+    <p:sldId id="544" r:id="rId29"/>
+    <p:sldId id="277" r:id="rId30"/>
+    <p:sldId id="549" r:id="rId31"/>
+    <p:sldId id="550" r:id="rId32"/>
+    <p:sldId id="499" r:id="rId33"/>
+    <p:sldId id="284" r:id="rId34"/>
+    <p:sldId id="545" r:id="rId35"/>
+    <p:sldId id="546" r:id="rId36"/>
+    <p:sldId id="547" r:id="rId37"/>
+    <p:sldId id="548" r:id="rId38"/>
+    <p:sldId id="552" r:id="rId39"/>
   </p:sldIdLst>
   <p:sldSz cx="12192000" cy="6858000"/>
   <p:notesSz cx="6858000" cy="9144000"/>
@@ -354,6 +355,108 @@
 </p:presentation>
 </file>
 
+<file path=ppt/revisionInfo.xml><?xml version="1.0" encoding="utf-8"?>
+<p1510:revInfo xmlns:a="http://schemas.openxmlformats.org/drawingml/2006/main" xmlns:r="http://schemas.openxmlformats.org/officeDocument/2006/relationships" xmlns:p1510="http://schemas.microsoft.com/office/powerpoint/2015/10/main">
+  <p1510:revLst>
+    <p1510:client id="{AC681E7E-7BCE-42F4-8397-34877DEEDE5D}" v="5" dt="2022-09-09T17:52:22.260"/>
+  </p1510:revLst>
+</p1510:revInfo>
+</file>
+
+<file path=ppt/changesInfos/changesInfo1.xml><?xml version="1.0" encoding="utf-8"?>
+<pc:chgInfo xmlns:a="http://schemas.openxmlformats.org/drawingml/2006/main" xmlns:r="http://schemas.openxmlformats.org/officeDocument/2006/relationships" xmlns:ac="http://schemas.microsoft.com/office/drawing/2013/main/command" xmlns:pc="http://schemas.microsoft.com/office/powerpoint/2013/main/command">
+  <pc:docChgLst>
+    <pc:chgData name="Mitchell Wand" userId="de9b44c55c049659" providerId="LiveId" clId="{AC681E7E-7BCE-42F4-8397-34877DEEDE5D}"/>
+    <pc:docChg chg="addSld delSld modSld">
+      <pc:chgData name="Mitchell Wand" userId="de9b44c55c049659" providerId="LiveId" clId="{AC681E7E-7BCE-42F4-8397-34877DEEDE5D}" dt="2022-09-09T17:52:31.662" v="75" actId="2696"/>
+      <pc:docMkLst>
+        <pc:docMk/>
+      </pc:docMkLst>
+      <pc:sldChg chg="modSp del mod">
+        <pc:chgData name="Mitchell Wand" userId="de9b44c55c049659" providerId="LiveId" clId="{AC681E7E-7BCE-42F4-8397-34877DEEDE5D}" dt="2022-09-09T17:52:31.662" v="75" actId="2696"/>
+        <pc:sldMkLst>
+          <pc:docMk/>
+          <pc:sldMk cId="3463548191" sldId="513"/>
+        </pc:sldMkLst>
+        <pc:spChg chg="mod">
+          <ac:chgData name="Mitchell Wand" userId="de9b44c55c049659" providerId="LiveId" clId="{AC681E7E-7BCE-42F4-8397-34877DEEDE5D}" dt="2022-09-09T17:48:29.400" v="64" actId="20577"/>
+          <ac:spMkLst>
+            <pc:docMk/>
+            <pc:sldMk cId="3463548191" sldId="513"/>
+            <ac:spMk id="3" creationId="{AC300E2B-BFD0-4090-AFC5-FE82683F997F}"/>
+          </ac:spMkLst>
+        </pc:spChg>
+      </pc:sldChg>
+      <pc:sldChg chg="del">
+        <pc:chgData name="Mitchell Wand" userId="de9b44c55c049659" providerId="LiveId" clId="{AC681E7E-7BCE-42F4-8397-34877DEEDE5D}" dt="2022-09-09T17:49:10.740" v="66" actId="2696"/>
+        <pc:sldMkLst>
+          <pc:docMk/>
+          <pc:sldMk cId="4247007316" sldId="551"/>
+        </pc:sldMkLst>
+      </pc:sldChg>
+      <pc:sldChg chg="add del">
+        <pc:chgData name="Mitchell Wand" userId="de9b44c55c049659" providerId="LiveId" clId="{AC681E7E-7BCE-42F4-8397-34877DEEDE5D}" dt="2022-09-09T17:50:19.058" v="70" actId="2696"/>
+        <pc:sldMkLst>
+          <pc:docMk/>
+          <pc:sldMk cId="1522486575" sldId="553"/>
+        </pc:sldMkLst>
+      </pc:sldChg>
+      <pc:sldChg chg="add del">
+        <pc:chgData name="Mitchell Wand" userId="de9b44c55c049659" providerId="LiveId" clId="{AC681E7E-7BCE-42F4-8397-34877DEEDE5D}" dt="2022-09-09T17:47:03.385" v="26" actId="2696"/>
+        <pc:sldMkLst>
+          <pc:docMk/>
+          <pc:sldMk cId="3060696973" sldId="553"/>
+        </pc:sldMkLst>
+      </pc:sldChg>
+      <pc:sldChg chg="modSp add mod">
+        <pc:chgData name="Mitchell Wand" userId="de9b44c55c049659" providerId="LiveId" clId="{AC681E7E-7BCE-42F4-8397-34877DEEDE5D}" dt="2022-09-09T17:51:55.382" v="73" actId="20577"/>
+        <pc:sldMkLst>
+          <pc:docMk/>
+          <pc:sldMk cId="2490106296" sldId="554"/>
+        </pc:sldMkLst>
+        <pc:spChg chg="mod">
+          <ac:chgData name="Mitchell Wand" userId="de9b44c55c049659" providerId="LiveId" clId="{AC681E7E-7BCE-42F4-8397-34877DEEDE5D}" dt="2022-09-09T17:51:47.379" v="72" actId="20577"/>
+          <ac:spMkLst>
+            <pc:docMk/>
+            <pc:sldMk cId="2490106296" sldId="554"/>
+            <ac:spMk id="2" creationId="{E743D407-5B53-49A7-9907-E801EA7FFD8E}"/>
+          </ac:spMkLst>
+        </pc:spChg>
+        <pc:spChg chg="mod">
+          <ac:chgData name="Mitchell Wand" userId="de9b44c55c049659" providerId="LiveId" clId="{AC681E7E-7BCE-42F4-8397-34877DEEDE5D}" dt="2022-09-09T17:51:55.382" v="73" actId="20577"/>
+          <ac:spMkLst>
+            <pc:docMk/>
+            <pc:sldMk cId="2490106296" sldId="554"/>
+            <ac:spMk id="3" creationId="{AC300E2B-BFD0-4090-AFC5-FE82683F997F}"/>
+          </ac:spMkLst>
+        </pc:spChg>
+      </pc:sldChg>
+      <pc:sldChg chg="add del">
+        <pc:chgData name="Mitchell Wand" userId="de9b44c55c049659" providerId="LiveId" clId="{AC681E7E-7BCE-42F4-8397-34877DEEDE5D}" dt="2022-09-09T17:49:49.423" v="68" actId="2696"/>
+        <pc:sldMkLst>
+          <pc:docMk/>
+          <pc:sldMk cId="2814110292" sldId="554"/>
+        </pc:sldMkLst>
+      </pc:sldChg>
+      <pc:sldChg chg="add">
+        <pc:chgData name="Mitchell Wand" userId="de9b44c55c049659" providerId="LiveId" clId="{AC681E7E-7BCE-42F4-8397-34877DEEDE5D}" dt="2022-09-09T17:51:37.957" v="71" actId="2890"/>
+        <pc:sldMkLst>
+          <pc:docMk/>
+          <pc:sldMk cId="2176297323" sldId="555"/>
+        </pc:sldMkLst>
+      </pc:sldChg>
+      <pc:sldChg chg="add">
+        <pc:chgData name="Mitchell Wand" userId="de9b44c55c049659" providerId="LiveId" clId="{AC681E7E-7BCE-42F4-8397-34877DEEDE5D}" dt="2022-09-09T17:52:22.260" v="74"/>
+        <pc:sldMkLst>
+          <pc:docMk/>
+          <pc:sldMk cId="2314319587" sldId="556"/>
+        </pc:sldMkLst>
+      </pc:sldChg>
+    </pc:docChg>
+  </pc:docChgLst>
+</pc:chgInfo>
+</file>
+
 <file path=ppt/notesMasters/notesMaster1.xml><?xml version="1.0" encoding="utf-8"?>
 <p:notesMaster xmlns:a="http://schemas.openxmlformats.org/drawingml/2006/main" xmlns:r="http://schemas.openxmlformats.org/officeDocument/2006/relationships" xmlns:p="http://schemas.openxmlformats.org/presentationml/2006/main">
   <p:cSld>
@@ -1573,7 +1676,7 @@
     </p:spTree>
     <p:extLst>
       <p:ext uri="{BB962C8B-B14F-4D97-AF65-F5344CB8AC3E}">
-        <p14:creationId xmlns:p14="http://schemas.microsoft.com/office/powerpoint/2010/main" val="1624675966"/>
+        <p14:creationId xmlns:p14="http://schemas.microsoft.com/office/powerpoint/2010/main" val="2177558325"/>
       </p:ext>
     </p:extLst>
   </p:cSld>
@@ -1660,7 +1763,7 @@
     </p:spTree>
     <p:extLst>
       <p:ext uri="{BB962C8B-B14F-4D97-AF65-F5344CB8AC3E}">
-        <p14:creationId xmlns:p14="http://schemas.microsoft.com/office/powerpoint/2010/main" val="2814291599"/>
+        <p14:creationId xmlns:p14="http://schemas.microsoft.com/office/powerpoint/2010/main" val="391175510"/>
       </p:ext>
     </p:extLst>
   </p:cSld>
@@ -1716,15 +1819,38 @@
           <a:p>
             <a:r>
               <a:rPr lang="en-US" dirty="0"/>
-              <a:t>(Read slide, these points summarize past few slides, adding the note that if you have concurrency, you have concurrency)</a:t>
-            </a:r>
+              <a:t>&lt;read slide&gt;</a:t>
+            </a:r>
+          </a:p>
+        </p:txBody>
+      </p:sp>
+      <p:sp>
+        <p:nvSpPr>
+          <p:cNvPr id="4" name="Slide Number Placeholder 3"/>
+          <p:cNvSpPr>
+            <a:spLocks noGrp="1"/>
+          </p:cNvSpPr>
+          <p:nvPr>
+            <p:ph type="sldNum" sz="quarter" idx="5"/>
+          </p:nvPr>
+        </p:nvSpPr>
+        <p:spPr/>
+        <p:txBody>
+          <a:bodyPr/>
+          <a:lstStyle/>
+          <a:p>
+            <a:fld id="{07937F07-1250-4CCE-B198-1B2887014F41}" type="slidenum">
+              <a:rPr lang="en-US" smtClean="0"/>
+              <a:t>27</a:t>
+            </a:fld>
+            <a:endParaRPr lang="en-US"/>
           </a:p>
         </p:txBody>
       </p:sp>
     </p:spTree>
     <p:extLst>
       <p:ext uri="{BB962C8B-B14F-4D97-AF65-F5344CB8AC3E}">
-        <p14:creationId xmlns:p14="http://schemas.microsoft.com/office/powerpoint/2010/main" val="358283542"/>
+        <p14:creationId xmlns:p14="http://schemas.microsoft.com/office/powerpoint/2010/main" val="1416934236"/>
       </p:ext>
     </p:extLst>
   </p:cSld>
@@ -1780,32 +1906,7 @@
           <a:p>
             <a:r>
               <a:rPr lang="en-US" dirty="0"/>
-              <a:t>Promises enforce the order of operations only through the .then. The code in the ‘then’ won’t run until the promise is resolved.</a:t>
-            </a:r>
-          </a:p>
-          <a:p>
-            <a:br>
-              <a:rPr lang="en-US" dirty="0"/>
-            </a:br>
-            <a:r>
-              <a:rPr lang="en-US" dirty="0"/>
-              <a:t>(build through example, explaining the possible orders of results. Point out that we should never depend on the order of results we hear back form google/</a:t>
-            </a:r>
-            <a:r>
-              <a:rPr lang="en-US" dirty="0" err="1"/>
-              <a:t>facebook</a:t>
-            </a:r>
-            <a:r>
-              <a:rPr lang="en-US" dirty="0"/>
-              <a:t>/</a:t>
-            </a:r>
-            <a:r>
-              <a:rPr lang="en-US" dirty="0" err="1"/>
-              <a:t>coveytown</a:t>
-            </a:r>
-            <a:r>
-              <a:rPr lang="en-US" dirty="0"/>
-              <a:t> because it is non-deterministic. You might happen to see 9/10 times one ordering, but there is no guarantee)</a:t>
+              <a:t>(Read slide, these points summarize past few slides, adding the note that if you have concurrency, you have concurrency)</a:t>
             </a:r>
           </a:p>
         </p:txBody>
@@ -1813,7 +1914,7 @@
     </p:spTree>
     <p:extLst>
       <p:ext uri="{BB962C8B-B14F-4D97-AF65-F5344CB8AC3E}">
-        <p14:creationId xmlns:p14="http://schemas.microsoft.com/office/powerpoint/2010/main" val="2370993432"/>
+        <p14:creationId xmlns:p14="http://schemas.microsoft.com/office/powerpoint/2010/main" val="358283542"/>
       </p:ext>
     </p:extLst>
   </p:cSld>
@@ -1869,7 +1970,32 @@
           <a:p>
             <a:r>
               <a:rPr lang="en-US" dirty="0"/>
-              <a:t>Promises </a:t>
+              <a:t>Promises enforce the order of operations only through the .then. The code in the ‘then’ won’t run until the promise is resolved.</a:t>
+            </a:r>
+          </a:p>
+          <a:p>
+            <a:br>
+              <a:rPr lang="en-US" dirty="0"/>
+            </a:br>
+            <a:r>
+              <a:rPr lang="en-US" dirty="0"/>
+              <a:t>(build through example, explaining the possible orders of results. Point out that we should never depend on the order of results we hear back form google/</a:t>
+            </a:r>
+            <a:r>
+              <a:rPr lang="en-US" dirty="0" err="1"/>
+              <a:t>facebook</a:t>
+            </a:r>
+            <a:r>
+              <a:rPr lang="en-US" dirty="0"/>
+              <a:t>/</a:t>
+            </a:r>
+            <a:r>
+              <a:rPr lang="en-US" dirty="0" err="1"/>
+              <a:t>coveytown</a:t>
+            </a:r>
+            <a:r>
+              <a:rPr lang="en-US" dirty="0"/>
+              <a:t> because it is non-deterministic. You might happen to see 9/10 times one ordering, but there is no guarantee)</a:t>
             </a:r>
           </a:p>
         </p:txBody>
@@ -1877,7 +2003,7 @@
     </p:spTree>
     <p:extLst>
       <p:ext uri="{BB962C8B-B14F-4D97-AF65-F5344CB8AC3E}">
-        <p14:creationId xmlns:p14="http://schemas.microsoft.com/office/powerpoint/2010/main" val="2379886627"/>
+        <p14:creationId xmlns:p14="http://schemas.microsoft.com/office/powerpoint/2010/main" val="2370993432"/>
       </p:ext>
     </p:extLst>
   </p:cSld>
@@ -1933,37 +2059,7 @@
           <a:p>
             <a:r>
               <a:rPr lang="en-US" dirty="0"/>
-              <a:t>Here is a one-slide comparison of async/await and promises. You should be familiar with the “rules of the road” for async/await.</a:t>
-            </a:r>
-          </a:p>
-          <a:p>
-            <a:r>
-              <a:rPr lang="en-US" dirty="0"/>
-              <a:t>(read slide)</a:t>
-            </a:r>
-          </a:p>
-          <a:p>
-            <a:endParaRPr lang="en-US" dirty="0"/>
-          </a:p>
-          <a:p>
-            <a:r>
-              <a:rPr lang="en-US" dirty="0"/>
-              <a:t>We haven’t talked about error handling yet, but that doesn’t mean you should ignore them! Here’s the two ways to handle errors, one for await, one for using promises.</a:t>
-            </a:r>
-          </a:p>
-          <a:p>
-            <a:r>
-              <a:rPr lang="en-US" dirty="0"/>
-              <a:t>Common gotcha is that try/catch around a promise won’t catch async errors thrown by promise!</a:t>
-            </a:r>
-          </a:p>
-          <a:p>
-            <a:endParaRPr lang="en-US" dirty="0"/>
-          </a:p>
-          <a:p>
-            <a:r>
-              <a:rPr lang="en-US" dirty="0"/>
-              <a:t>Feel free to point out that, again, code on left and code on right are functionally equivalent, and the JS engine will generate code on right from code on left</a:t>
+              <a:t>Promises </a:t>
             </a:r>
           </a:p>
         </p:txBody>
@@ -1971,7 +2067,7 @@
     </p:spTree>
     <p:extLst>
       <p:ext uri="{BB962C8B-B14F-4D97-AF65-F5344CB8AC3E}">
-        <p14:creationId xmlns:p14="http://schemas.microsoft.com/office/powerpoint/2010/main" val="1067216613"/>
+        <p14:creationId xmlns:p14="http://schemas.microsoft.com/office/powerpoint/2010/main" val="2379886627"/>
       </p:ext>
     </p:extLst>
   </p:cSld>
@@ -2027,7 +2123,37 @@
           <a:p>
             <a:r>
               <a:rPr lang="en-US" dirty="0"/>
-              <a:t>In JS, only one computation (other than asynchronous IO) is running at a time, so statement 3 is guaranteed to run *immediately* after statement 2.</a:t>
+              <a:t>Here is a one-slide comparison of async/await and promises. You should be familiar with the “rules of the road” for async/await.</a:t>
+            </a:r>
+          </a:p>
+          <a:p>
+            <a:r>
+              <a:rPr lang="en-US" dirty="0"/>
+              <a:t>(read slide)</a:t>
+            </a:r>
+          </a:p>
+          <a:p>
+            <a:endParaRPr lang="en-US" dirty="0"/>
+          </a:p>
+          <a:p>
+            <a:r>
+              <a:rPr lang="en-US" dirty="0"/>
+              <a:t>We haven’t talked about error handling yet, but that doesn’t mean you should ignore them! Here’s the two ways to handle errors, one for await, one for using promises.</a:t>
+            </a:r>
+          </a:p>
+          <a:p>
+            <a:r>
+              <a:rPr lang="en-US" dirty="0"/>
+              <a:t>Common gotcha is that try/catch around a promise won’t catch async errors thrown by promise!</a:t>
+            </a:r>
+          </a:p>
+          <a:p>
+            <a:endParaRPr lang="en-US" dirty="0"/>
+          </a:p>
+          <a:p>
+            <a:r>
+              <a:rPr lang="en-US" dirty="0"/>
+              <a:t>Feel free to point out that, again, code on left and code on right are functionally equivalent, and the JS engine will generate code on right from code on left</a:t>
             </a:r>
           </a:p>
         </p:txBody>
@@ -2035,7 +2161,7 @@
     </p:spTree>
     <p:extLst>
       <p:ext uri="{BB962C8B-B14F-4D97-AF65-F5344CB8AC3E}">
-        <p14:creationId xmlns:p14="http://schemas.microsoft.com/office/powerpoint/2010/main" val="4154279858"/>
+        <p14:creationId xmlns:p14="http://schemas.microsoft.com/office/powerpoint/2010/main" val="1067216613"/>
       </p:ext>
     </p:extLst>
   </p:cSld>
@@ -2091,6 +2217,70 @@
           <a:p>
             <a:r>
               <a:rPr lang="en-US" dirty="0"/>
+              <a:t>In JS, only one computation (other than asynchronous IO) is running at a time, so statement 3 is guaranteed to run *immediately* after statement 2.</a:t>
+            </a:r>
+          </a:p>
+        </p:txBody>
+      </p:sp>
+    </p:spTree>
+    <p:extLst>
+      <p:ext uri="{BB962C8B-B14F-4D97-AF65-F5344CB8AC3E}">
+        <p14:creationId xmlns:p14="http://schemas.microsoft.com/office/powerpoint/2010/main" val="4154279858"/>
+      </p:ext>
+    </p:extLst>
+  </p:cSld>
+  <p:clrMapOvr>
+    <a:masterClrMapping/>
+  </p:clrMapOvr>
+</p:notes>
+</file>
+
+<file path=ppt/notesSlides/notesSlide27.xml><?xml version="1.0" encoding="utf-8"?>
+<p:notes xmlns:a="http://schemas.openxmlformats.org/drawingml/2006/main" xmlns:r="http://schemas.openxmlformats.org/officeDocument/2006/relationships" xmlns:p="http://schemas.openxmlformats.org/presentationml/2006/main">
+  <p:cSld>
+    <p:spTree>
+      <p:nvGrpSpPr>
+        <p:cNvPr id="1" name=""/>
+        <p:cNvGrpSpPr/>
+        <p:nvPr/>
+      </p:nvGrpSpPr>
+      <p:grpSpPr>
+        <a:xfrm>
+          <a:off x="0" y="0"/>
+          <a:ext cx="0" cy="0"/>
+          <a:chOff x="0" y="0"/>
+          <a:chExt cx="0" cy="0"/>
+        </a:xfrm>
+      </p:grpSpPr>
+      <p:sp>
+        <p:nvSpPr>
+          <p:cNvPr id="2" name="Slide Image Placeholder 1"/>
+          <p:cNvSpPr>
+            <a:spLocks noGrp="1" noRot="1" noChangeAspect="1"/>
+          </p:cNvSpPr>
+          <p:nvPr>
+            <p:ph type="sldImg"/>
+          </p:nvPr>
+        </p:nvSpPr>
+        <p:spPr/>
+      </p:sp>
+      <p:sp>
+        <p:nvSpPr>
+          <p:cNvPr id="3" name="Notes Placeholder 2"/>
+          <p:cNvSpPr>
+            <a:spLocks noGrp="1"/>
+          </p:cNvSpPr>
+          <p:nvPr>
+            <p:ph type="body" idx="1"/>
+          </p:nvPr>
+        </p:nvSpPr>
+        <p:spPr/>
+        <p:txBody>
+          <a:bodyPr/>
+          <a:lstStyle/>
+          <a:p>
+            <a:r>
+              <a:rPr lang="en-US" dirty="0"/>
               <a:t>&lt;read slide&gt;</a:t>
             </a:r>
           </a:p>
@@ -2113,7 +2303,7 @@
           <a:p>
             <a:fld id="{07937F07-1250-4CCE-B198-1B2887014F41}" type="slidenum">
               <a:rPr lang="en-US" smtClean="0"/>
-              <a:t>37</a:t>
+              <a:t>38</a:t>
             </a:fld>
             <a:endParaRPr lang="en-US"/>
           </a:p>
@@ -2889,7 +3079,7 @@
                 <a:tabLst/>
                 <a:defRPr/>
               </a:pPr>
-              <a:t>9/6/2022</a:t>
+              <a:t>9/9/2022</a:t>
             </a:fld>
             <a:endParaRPr kumimoji="0" lang="en-US" sz="1200" b="0" i="0" u="none" strike="noStrike" kern="1200" cap="none" spc="0" normalizeH="0" baseline="0" noProof="0">
               <a:ln>
@@ -3373,7 +3563,7 @@
                 <a:tabLst/>
                 <a:defRPr/>
               </a:pPr>
-              <a:t>9/6/2022</a:t>
+              <a:t>9/9/2022</a:t>
             </a:fld>
             <a:endParaRPr kumimoji="0" lang="en-US" sz="1200" b="0" i="0" u="none" strike="noStrike" kern="1200" cap="none" spc="0" normalizeH="0" baseline="0" noProof="0">
               <a:ln>
@@ -3731,7 +3921,7 @@
                 <a:tabLst/>
                 <a:defRPr/>
               </a:pPr>
-              <a:t>9/6/2022</a:t>
+              <a:t>9/9/2022</a:t>
             </a:fld>
             <a:endParaRPr kumimoji="0" lang="en-US" sz="1200" b="0" i="0" u="none" strike="noStrike" kern="1200" cap="none" spc="0" normalizeH="0" baseline="0" noProof="0">
               <a:ln>
@@ -4099,7 +4289,7 @@
                 <a:tabLst/>
                 <a:defRPr/>
               </a:pPr>
-              <a:t>9/6/2022</a:t>
+              <a:t>9/9/2022</a:t>
             </a:fld>
             <a:endParaRPr kumimoji="0" lang="en-US" sz="1200" b="0" i="0" u="none" strike="noStrike" kern="1200" cap="none" spc="0" normalizeH="0" baseline="0" noProof="0">
               <a:ln>
@@ -5065,7 +5255,7 @@
                 <a:tabLst/>
                 <a:defRPr/>
               </a:pPr>
-              <a:t>9/6/2022</a:t>
+              <a:t>9/9/2022</a:t>
             </a:fld>
             <a:endParaRPr kumimoji="0" lang="en-US" sz="1200" b="0" i="0" u="none" strike="noStrike" kern="1200" cap="none" spc="0" normalizeH="0" baseline="0" noProof="0">
               <a:ln>
@@ -5475,7 +5665,7 @@
                 <a:tabLst/>
                 <a:defRPr/>
               </a:pPr>
-              <a:t>9/6/2022</a:t>
+              <a:t>9/9/2022</a:t>
             </a:fld>
             <a:endParaRPr kumimoji="0" lang="en-US" sz="1200" b="0" i="0" u="none" strike="noStrike" kern="1200" cap="none" spc="0" normalizeH="0" baseline="0" noProof="0">
               <a:ln>
@@ -5817,7 +6007,7 @@
                 <a:tabLst/>
                 <a:defRPr/>
               </a:pPr>
-              <a:t>9/6/2022</a:t>
+              <a:t>9/9/2022</a:t>
             </a:fld>
             <a:endParaRPr kumimoji="0" lang="en-US" sz="1200" b="0" i="0" u="none" strike="noStrike" kern="1200" cap="none" spc="0" normalizeH="0" baseline="0" noProof="0">
               <a:ln>
@@ -6290,7 +6480,7 @@
                 <a:tabLst/>
                 <a:defRPr/>
               </a:pPr>
-              <a:t>9/6/2022</a:t>
+              <a:t>9/9/2022</a:t>
             </a:fld>
             <a:endParaRPr kumimoji="0" lang="en-US" sz="1200" b="0" i="0" u="none" strike="noStrike" kern="1200" cap="none" spc="0" normalizeH="0" baseline="0" noProof="0">
               <a:ln>
@@ -6751,7 +6941,7 @@
                 <a:tabLst/>
                 <a:defRPr/>
               </a:pPr>
-              <a:t>9/6/2022</a:t>
+              <a:t>9/9/2022</a:t>
             </a:fld>
             <a:endParaRPr kumimoji="0" lang="en-US" sz="1200" b="0" i="0" u="none" strike="noStrike" kern="1200" cap="none" spc="0" normalizeH="0" baseline="0" noProof="0">
               <a:ln>
@@ -7359,7 +7549,7 @@
                 <a:tabLst/>
                 <a:defRPr/>
               </a:pPr>
-              <a:t>9/6/2022</a:t>
+              <a:t>9/9/2022</a:t>
             </a:fld>
             <a:endParaRPr kumimoji="0" lang="en-US" sz="1200" b="0" i="0" u="none" strike="noStrike" kern="1200" cap="none" spc="0" normalizeH="0" baseline="0" noProof="0">
               <a:ln>
@@ -7632,7 +7822,7 @@
                 <a:tabLst/>
                 <a:defRPr/>
               </a:pPr>
-              <a:t>9/6/2022</a:t>
+              <a:t>9/9/2022</a:t>
             </a:fld>
             <a:endParaRPr kumimoji="0" lang="en-US" sz="1200" b="0" i="0" u="none" strike="noStrike" kern="1200" cap="none" spc="0" normalizeH="0" baseline="0" noProof="0">
               <a:ln>
@@ -8103,7 +8293,7 @@
                 <a:tabLst/>
                 <a:defRPr/>
               </a:pPr>
-              <a:t>9/6/2022</a:t>
+              <a:t>9/9/2022</a:t>
             </a:fld>
             <a:endParaRPr kumimoji="0" lang="en-US" sz="1200" b="0" i="0" u="none" strike="noStrike" kern="1200" cap="none" spc="0" normalizeH="0" baseline="0" noProof="0">
               <a:ln>
@@ -8504,7 +8694,7 @@
                 <a:tabLst/>
                 <a:defRPr/>
               </a:pPr>
-              <a:t>9/6/2022</a:t>
+              <a:t>9/9/2022</a:t>
             </a:fld>
             <a:endParaRPr kumimoji="0" lang="en-US" sz="1200" b="0" i="0" u="none" strike="noStrike" kern="1200" cap="none" spc="0" normalizeH="0" baseline="0" noProof="0">
               <a:ln>
@@ -12890,7 +13080,7 @@
           </a:ln>
           <a:extLst>
             <a:ext uri="{C572A759-6A51-4108-AA02-DFA0A04FC94B}">
-              <ma14:wrappingTextBoxFlag xmlns:ma14="http://schemas.microsoft.com/office/mac/drawingml/2011/main" xmlns:a14="http://schemas.microsoft.com/office/drawing/2010/main" xmlns:m="http://schemas.openxmlformats.org/officeDocument/2006/math" xmlns="" val="1"/>
+              <ma14:wrappingTextBoxFlag xmlns="" xmlns:m="http://schemas.openxmlformats.org/officeDocument/2006/math" xmlns:a14="http://schemas.microsoft.com/office/drawing/2010/main" xmlns:ma14="http://schemas.microsoft.com/office/mac/drawingml/2011/main" val="1"/>
             </a:ext>
           </a:extLst>
         </p:spPr>
@@ -13479,7 +13669,7 @@
           </a:ln>
           <a:extLst>
             <a:ext uri="{C572A759-6A51-4108-AA02-DFA0A04FC94B}">
-              <ma14:wrappingTextBoxFlag xmlns:ma14="http://schemas.microsoft.com/office/mac/drawingml/2011/main" xmlns:a14="http://schemas.microsoft.com/office/drawing/2010/main" xmlns:m="http://schemas.openxmlformats.org/officeDocument/2006/math" xmlns="" val="1"/>
+              <ma14:wrappingTextBoxFlag xmlns="" xmlns:m="http://schemas.openxmlformats.org/officeDocument/2006/math" xmlns:a14="http://schemas.microsoft.com/office/drawing/2010/main" xmlns:ma14="http://schemas.microsoft.com/office/mac/drawingml/2011/main" val="1"/>
             </a:ext>
           </a:extLst>
         </p:spPr>
@@ -14680,7 +14870,7 @@
             <a:effectLst/>
             <a:extLst>
               <a:ext uri="{C572A759-6A51-4108-AA02-DFA0A04FC94B}">
-                <ma14:wrappingTextBoxFlag xmlns:ma14="http://schemas.microsoft.com/office/mac/drawingml/2011/main" xmlns:a14="http://schemas.microsoft.com/office/drawing/2010/main" xmlns:m="http://schemas.openxmlformats.org/officeDocument/2006/math" xmlns="" val="1"/>
+                <ma14:wrappingTextBoxFlag xmlns="" xmlns:m="http://schemas.openxmlformats.org/officeDocument/2006/math" xmlns:a14="http://schemas.microsoft.com/office/drawing/2010/main" xmlns:ma14="http://schemas.microsoft.com/office/mac/drawingml/2011/main" val="1"/>
               </a:ext>
             </a:extLst>
           </p:spPr>
@@ -14749,7 +14939,7 @@
             <a:effectLst/>
             <a:extLst>
               <a:ext uri="{C572A759-6A51-4108-AA02-DFA0A04FC94B}">
-                <ma14:wrappingTextBoxFlag xmlns:ma14="http://schemas.microsoft.com/office/mac/drawingml/2011/main" xmlns:a14="http://schemas.microsoft.com/office/drawing/2010/main" xmlns:m="http://schemas.openxmlformats.org/officeDocument/2006/math" xmlns="" val="1"/>
+                <ma14:wrappingTextBoxFlag xmlns="" xmlns:m="http://schemas.openxmlformats.org/officeDocument/2006/math" xmlns:a14="http://schemas.microsoft.com/office/drawing/2010/main" xmlns:ma14="http://schemas.microsoft.com/office/mac/drawingml/2011/main" val="1"/>
               </a:ext>
             </a:extLst>
           </p:spPr>
@@ -14815,7 +15005,7 @@
             </a:ln>
             <a:extLst>
               <a:ext uri="{C572A759-6A51-4108-AA02-DFA0A04FC94B}">
-                <ma14:wrappingTextBoxFlag xmlns:ma14="http://schemas.microsoft.com/office/mac/drawingml/2011/main" xmlns:a14="http://schemas.microsoft.com/office/drawing/2010/main" xmlns:m="http://schemas.openxmlformats.org/officeDocument/2006/math" xmlns="" val="1"/>
+                <ma14:wrappingTextBoxFlag xmlns="" xmlns:m="http://schemas.openxmlformats.org/officeDocument/2006/math" xmlns:a14="http://schemas.microsoft.com/office/drawing/2010/main" xmlns:ma14="http://schemas.microsoft.com/office/mac/drawingml/2011/main" val="1"/>
               </a:ext>
             </a:extLst>
           </p:spPr>
@@ -14873,7 +15063,7 @@
             </a:ln>
             <a:extLst>
               <a:ext uri="{C572A759-6A51-4108-AA02-DFA0A04FC94B}">
-                <ma14:wrappingTextBoxFlag xmlns:ma14="http://schemas.microsoft.com/office/mac/drawingml/2011/main" xmlns:a14="http://schemas.microsoft.com/office/drawing/2010/main" xmlns:m="http://schemas.openxmlformats.org/officeDocument/2006/math" xmlns="" val="1"/>
+                <ma14:wrappingTextBoxFlag xmlns="" xmlns:m="http://schemas.openxmlformats.org/officeDocument/2006/math" xmlns:a14="http://schemas.microsoft.com/office/drawing/2010/main" xmlns:ma14="http://schemas.microsoft.com/office/mac/drawingml/2011/main" val="1"/>
               </a:ext>
             </a:extLst>
           </p:spPr>
@@ -14954,7 +15144,7 @@
             <a:effectLst/>
             <a:extLst>
               <a:ext uri="{C572A759-6A51-4108-AA02-DFA0A04FC94B}">
-                <ma14:wrappingTextBoxFlag xmlns:ma14="http://schemas.microsoft.com/office/mac/drawingml/2011/main" xmlns:a14="http://schemas.microsoft.com/office/drawing/2010/main" xmlns:m="http://schemas.openxmlformats.org/officeDocument/2006/math" xmlns="" val="1"/>
+                <ma14:wrappingTextBoxFlag xmlns="" xmlns:m="http://schemas.openxmlformats.org/officeDocument/2006/math" xmlns:a14="http://schemas.microsoft.com/office/drawing/2010/main" xmlns:ma14="http://schemas.microsoft.com/office/mac/drawingml/2011/main" val="1"/>
               </a:ext>
             </a:extLst>
           </p:spPr>
@@ -15027,7 +15217,7 @@
             <a:effectLst/>
             <a:extLst>
               <a:ext uri="{C572A759-6A51-4108-AA02-DFA0A04FC94B}">
-                <ma14:wrappingTextBoxFlag xmlns:ma14="http://schemas.microsoft.com/office/mac/drawingml/2011/main" xmlns:a14="http://schemas.microsoft.com/office/drawing/2010/main" xmlns:m="http://schemas.openxmlformats.org/officeDocument/2006/math" xmlns="" val="1"/>
+                <ma14:wrappingTextBoxFlag xmlns="" xmlns:m="http://schemas.openxmlformats.org/officeDocument/2006/math" xmlns:a14="http://schemas.microsoft.com/office/drawing/2010/main" xmlns:ma14="http://schemas.microsoft.com/office/mac/drawingml/2011/main" val="1"/>
               </a:ext>
             </a:extLst>
           </p:spPr>
@@ -15093,7 +15283,7 @@
             </a:ln>
             <a:extLst>
               <a:ext uri="{C572A759-6A51-4108-AA02-DFA0A04FC94B}">
-                <ma14:wrappingTextBoxFlag xmlns:ma14="http://schemas.microsoft.com/office/mac/drawingml/2011/main" xmlns:a14="http://schemas.microsoft.com/office/drawing/2010/main" xmlns:m="http://schemas.openxmlformats.org/officeDocument/2006/math" xmlns="" val="1"/>
+                <ma14:wrappingTextBoxFlag xmlns="" xmlns:m="http://schemas.openxmlformats.org/officeDocument/2006/math" xmlns:a14="http://schemas.microsoft.com/office/drawing/2010/main" xmlns:ma14="http://schemas.microsoft.com/office/mac/drawingml/2011/main" val="1"/>
               </a:ext>
             </a:extLst>
           </p:spPr>
@@ -15151,7 +15341,7 @@
             </a:ln>
             <a:extLst>
               <a:ext uri="{C572A759-6A51-4108-AA02-DFA0A04FC94B}">
-                <ma14:wrappingTextBoxFlag xmlns:ma14="http://schemas.microsoft.com/office/mac/drawingml/2011/main" xmlns:a14="http://schemas.microsoft.com/office/drawing/2010/main" xmlns:m="http://schemas.openxmlformats.org/officeDocument/2006/math" xmlns="" val="1"/>
+                <ma14:wrappingTextBoxFlag xmlns="" xmlns:m="http://schemas.openxmlformats.org/officeDocument/2006/math" xmlns:a14="http://schemas.microsoft.com/office/drawing/2010/main" xmlns:ma14="http://schemas.microsoft.com/office/mac/drawingml/2011/main" val="1"/>
               </a:ext>
             </a:extLst>
           </p:spPr>
@@ -15232,7 +15422,7 @@
             <a:effectLst/>
             <a:extLst>
               <a:ext uri="{C572A759-6A51-4108-AA02-DFA0A04FC94B}">
-                <ma14:wrappingTextBoxFlag xmlns:ma14="http://schemas.microsoft.com/office/mac/drawingml/2011/main" xmlns:a14="http://schemas.microsoft.com/office/drawing/2010/main" xmlns:m="http://schemas.openxmlformats.org/officeDocument/2006/math" xmlns="" val="1"/>
+                <ma14:wrappingTextBoxFlag xmlns="" xmlns:m="http://schemas.openxmlformats.org/officeDocument/2006/math" xmlns:a14="http://schemas.microsoft.com/office/drawing/2010/main" xmlns:ma14="http://schemas.microsoft.com/office/mac/drawingml/2011/main" val="1"/>
               </a:ext>
             </a:extLst>
           </p:spPr>
@@ -15305,7 +15495,7 @@
             <a:effectLst/>
             <a:extLst>
               <a:ext uri="{C572A759-6A51-4108-AA02-DFA0A04FC94B}">
-                <ma14:wrappingTextBoxFlag xmlns:ma14="http://schemas.microsoft.com/office/mac/drawingml/2011/main" xmlns:a14="http://schemas.microsoft.com/office/drawing/2010/main" xmlns:m="http://schemas.openxmlformats.org/officeDocument/2006/math" xmlns="" val="1"/>
+                <ma14:wrappingTextBoxFlag xmlns="" xmlns:m="http://schemas.openxmlformats.org/officeDocument/2006/math" xmlns:a14="http://schemas.microsoft.com/office/drawing/2010/main" xmlns:ma14="http://schemas.microsoft.com/office/mac/drawingml/2011/main" val="1"/>
               </a:ext>
             </a:extLst>
           </p:spPr>
@@ -15371,7 +15561,7 @@
             </a:ln>
             <a:extLst>
               <a:ext uri="{C572A759-6A51-4108-AA02-DFA0A04FC94B}">
-                <ma14:wrappingTextBoxFlag xmlns:ma14="http://schemas.microsoft.com/office/mac/drawingml/2011/main" xmlns:a14="http://schemas.microsoft.com/office/drawing/2010/main" xmlns:m="http://schemas.openxmlformats.org/officeDocument/2006/math" xmlns="" val="1"/>
+                <ma14:wrappingTextBoxFlag xmlns="" xmlns:m="http://schemas.openxmlformats.org/officeDocument/2006/math" xmlns:a14="http://schemas.microsoft.com/office/drawing/2010/main" xmlns:ma14="http://schemas.microsoft.com/office/mac/drawingml/2011/main" val="1"/>
               </a:ext>
             </a:extLst>
           </p:spPr>
@@ -15429,7 +15619,7 @@
             </a:ln>
             <a:extLst>
               <a:ext uri="{C572A759-6A51-4108-AA02-DFA0A04FC94B}">
-                <ma14:wrappingTextBoxFlag xmlns:ma14="http://schemas.microsoft.com/office/mac/drawingml/2011/main" xmlns:a14="http://schemas.microsoft.com/office/drawing/2010/main" xmlns:m="http://schemas.openxmlformats.org/officeDocument/2006/math" xmlns="" val="1"/>
+                <ma14:wrappingTextBoxFlag xmlns="" xmlns:m="http://schemas.openxmlformats.org/officeDocument/2006/math" xmlns:a14="http://schemas.microsoft.com/office/drawing/2010/main" xmlns:ma14="http://schemas.microsoft.com/office/mac/drawingml/2011/main" val="1"/>
               </a:ext>
             </a:extLst>
           </p:spPr>
@@ -15510,7 +15700,7 @@
             <a:effectLst/>
             <a:extLst>
               <a:ext uri="{C572A759-6A51-4108-AA02-DFA0A04FC94B}">
-                <ma14:wrappingTextBoxFlag xmlns:ma14="http://schemas.microsoft.com/office/mac/drawingml/2011/main" xmlns:a14="http://schemas.microsoft.com/office/drawing/2010/main" xmlns:m="http://schemas.openxmlformats.org/officeDocument/2006/math" xmlns="" val="1"/>
+                <ma14:wrappingTextBoxFlag xmlns="" xmlns:m="http://schemas.openxmlformats.org/officeDocument/2006/math" xmlns:a14="http://schemas.microsoft.com/office/drawing/2010/main" xmlns:ma14="http://schemas.microsoft.com/office/mac/drawingml/2011/main" val="1"/>
               </a:ext>
             </a:extLst>
           </p:spPr>
@@ -15579,7 +15769,7 @@
             <a:effectLst/>
             <a:extLst>
               <a:ext uri="{C572A759-6A51-4108-AA02-DFA0A04FC94B}">
-                <ma14:wrappingTextBoxFlag xmlns:ma14="http://schemas.microsoft.com/office/mac/drawingml/2011/main" xmlns:a14="http://schemas.microsoft.com/office/drawing/2010/main" xmlns:m="http://schemas.openxmlformats.org/officeDocument/2006/math" xmlns="" val="1"/>
+                <ma14:wrappingTextBoxFlag xmlns="" xmlns:m="http://schemas.openxmlformats.org/officeDocument/2006/math" xmlns:a14="http://schemas.microsoft.com/office/drawing/2010/main" xmlns:ma14="http://schemas.microsoft.com/office/mac/drawingml/2011/main" val="1"/>
               </a:ext>
             </a:extLst>
           </p:spPr>
@@ -15645,7 +15835,7 @@
             </a:ln>
             <a:extLst>
               <a:ext uri="{C572A759-6A51-4108-AA02-DFA0A04FC94B}">
-                <ma14:wrappingTextBoxFlag xmlns:ma14="http://schemas.microsoft.com/office/mac/drawingml/2011/main" xmlns:a14="http://schemas.microsoft.com/office/drawing/2010/main" xmlns:m="http://schemas.openxmlformats.org/officeDocument/2006/math" xmlns="" val="1"/>
+                <ma14:wrappingTextBoxFlag xmlns="" xmlns:m="http://schemas.openxmlformats.org/officeDocument/2006/math" xmlns:a14="http://schemas.microsoft.com/office/drawing/2010/main" xmlns:ma14="http://schemas.microsoft.com/office/mac/drawingml/2011/main" val="1"/>
               </a:ext>
             </a:extLst>
           </p:spPr>
@@ -15703,7 +15893,7 @@
             </a:ln>
             <a:extLst>
               <a:ext uri="{C572A759-6A51-4108-AA02-DFA0A04FC94B}">
-                <ma14:wrappingTextBoxFlag xmlns:ma14="http://schemas.microsoft.com/office/mac/drawingml/2011/main" xmlns:a14="http://schemas.microsoft.com/office/drawing/2010/main" xmlns:m="http://schemas.openxmlformats.org/officeDocument/2006/math" xmlns="" val="1"/>
+                <ma14:wrappingTextBoxFlag xmlns="" xmlns:m="http://schemas.openxmlformats.org/officeDocument/2006/math" xmlns:a14="http://schemas.microsoft.com/office/drawing/2010/main" xmlns:ma14="http://schemas.microsoft.com/office/mac/drawingml/2011/main" val="1"/>
               </a:ext>
             </a:extLst>
           </p:spPr>
@@ -15784,7 +15974,7 @@
             <a:effectLst/>
             <a:extLst>
               <a:ext uri="{C572A759-6A51-4108-AA02-DFA0A04FC94B}">
-                <ma14:wrappingTextBoxFlag xmlns:ma14="http://schemas.microsoft.com/office/mac/drawingml/2011/main" xmlns:a14="http://schemas.microsoft.com/office/drawing/2010/main" xmlns:m="http://schemas.openxmlformats.org/officeDocument/2006/math" xmlns="" val="1"/>
+                <ma14:wrappingTextBoxFlag xmlns="" xmlns:m="http://schemas.openxmlformats.org/officeDocument/2006/math" xmlns:a14="http://schemas.microsoft.com/office/drawing/2010/main" xmlns:ma14="http://schemas.microsoft.com/office/mac/drawingml/2011/main" val="1"/>
               </a:ext>
             </a:extLst>
           </p:spPr>
@@ -15857,7 +16047,7 @@
             <a:effectLst/>
             <a:extLst>
               <a:ext uri="{C572A759-6A51-4108-AA02-DFA0A04FC94B}">
-                <ma14:wrappingTextBoxFlag xmlns:ma14="http://schemas.microsoft.com/office/mac/drawingml/2011/main" xmlns:a14="http://schemas.microsoft.com/office/drawing/2010/main" xmlns:m="http://schemas.openxmlformats.org/officeDocument/2006/math" xmlns="" val="1"/>
+                <ma14:wrappingTextBoxFlag xmlns="" xmlns:m="http://schemas.openxmlformats.org/officeDocument/2006/math" xmlns:a14="http://schemas.microsoft.com/office/drawing/2010/main" xmlns:ma14="http://schemas.microsoft.com/office/mac/drawingml/2011/main" val="1"/>
               </a:ext>
             </a:extLst>
           </p:spPr>
@@ -15923,7 +16113,7 @@
             </a:ln>
             <a:extLst>
               <a:ext uri="{C572A759-6A51-4108-AA02-DFA0A04FC94B}">
-                <ma14:wrappingTextBoxFlag xmlns:ma14="http://schemas.microsoft.com/office/mac/drawingml/2011/main" xmlns:a14="http://schemas.microsoft.com/office/drawing/2010/main" xmlns:m="http://schemas.openxmlformats.org/officeDocument/2006/math" xmlns="" val="1"/>
+                <ma14:wrappingTextBoxFlag xmlns="" xmlns:m="http://schemas.openxmlformats.org/officeDocument/2006/math" xmlns:a14="http://schemas.microsoft.com/office/drawing/2010/main" xmlns:ma14="http://schemas.microsoft.com/office/mac/drawingml/2011/main" val="1"/>
               </a:ext>
             </a:extLst>
           </p:spPr>
@@ -15981,7 +16171,7 @@
             </a:ln>
             <a:extLst>
               <a:ext uri="{C572A759-6A51-4108-AA02-DFA0A04FC94B}">
-                <ma14:wrappingTextBoxFlag xmlns:ma14="http://schemas.microsoft.com/office/mac/drawingml/2011/main" xmlns:a14="http://schemas.microsoft.com/office/drawing/2010/main" xmlns:m="http://schemas.openxmlformats.org/officeDocument/2006/math" xmlns="" val="1"/>
+                <ma14:wrappingTextBoxFlag xmlns="" xmlns:m="http://schemas.openxmlformats.org/officeDocument/2006/math" xmlns:a14="http://schemas.microsoft.com/office/drawing/2010/main" xmlns:ma14="http://schemas.microsoft.com/office/mac/drawingml/2011/main" val="1"/>
               </a:ext>
             </a:extLst>
           </p:spPr>
@@ -16062,7 +16252,7 @@
             <a:effectLst/>
             <a:extLst>
               <a:ext uri="{C572A759-6A51-4108-AA02-DFA0A04FC94B}">
-                <ma14:wrappingTextBoxFlag xmlns:ma14="http://schemas.microsoft.com/office/mac/drawingml/2011/main" xmlns:a14="http://schemas.microsoft.com/office/drawing/2010/main" xmlns:m="http://schemas.openxmlformats.org/officeDocument/2006/math" xmlns="" val="1"/>
+                <ma14:wrappingTextBoxFlag xmlns="" xmlns:m="http://schemas.openxmlformats.org/officeDocument/2006/math" xmlns:a14="http://schemas.microsoft.com/office/drawing/2010/main" xmlns:ma14="http://schemas.microsoft.com/office/mac/drawingml/2011/main" val="1"/>
               </a:ext>
             </a:extLst>
           </p:spPr>
@@ -16135,7 +16325,7 @@
             <a:effectLst/>
             <a:extLst>
               <a:ext uri="{C572A759-6A51-4108-AA02-DFA0A04FC94B}">
-                <ma14:wrappingTextBoxFlag xmlns:ma14="http://schemas.microsoft.com/office/mac/drawingml/2011/main" xmlns:a14="http://schemas.microsoft.com/office/drawing/2010/main" xmlns:m="http://schemas.openxmlformats.org/officeDocument/2006/math" xmlns="" val="1"/>
+                <ma14:wrappingTextBoxFlag xmlns="" xmlns:m="http://schemas.openxmlformats.org/officeDocument/2006/math" xmlns:a14="http://schemas.microsoft.com/office/drawing/2010/main" xmlns:ma14="http://schemas.microsoft.com/office/mac/drawingml/2011/main" val="1"/>
               </a:ext>
             </a:extLst>
           </p:spPr>
@@ -16201,7 +16391,7 @@
             </a:ln>
             <a:extLst>
               <a:ext uri="{C572A759-6A51-4108-AA02-DFA0A04FC94B}">
-                <ma14:wrappingTextBoxFlag xmlns:ma14="http://schemas.microsoft.com/office/mac/drawingml/2011/main" xmlns:a14="http://schemas.microsoft.com/office/drawing/2010/main" xmlns:m="http://schemas.openxmlformats.org/officeDocument/2006/math" xmlns="" val="1"/>
+                <ma14:wrappingTextBoxFlag xmlns="" xmlns:m="http://schemas.openxmlformats.org/officeDocument/2006/math" xmlns:a14="http://schemas.microsoft.com/office/drawing/2010/main" xmlns:ma14="http://schemas.microsoft.com/office/mac/drawingml/2011/main" val="1"/>
               </a:ext>
             </a:extLst>
           </p:spPr>
@@ -16259,7 +16449,7 @@
             </a:ln>
             <a:extLst>
               <a:ext uri="{C572A759-6A51-4108-AA02-DFA0A04FC94B}">
-                <ma14:wrappingTextBoxFlag xmlns:ma14="http://schemas.microsoft.com/office/mac/drawingml/2011/main" xmlns:a14="http://schemas.microsoft.com/office/drawing/2010/main" xmlns:m="http://schemas.openxmlformats.org/officeDocument/2006/math" xmlns="" val="1"/>
+                <ma14:wrappingTextBoxFlag xmlns="" xmlns:m="http://schemas.openxmlformats.org/officeDocument/2006/math" xmlns:a14="http://schemas.microsoft.com/office/drawing/2010/main" xmlns:ma14="http://schemas.microsoft.com/office/mac/drawingml/2011/main" val="1"/>
               </a:ext>
             </a:extLst>
           </p:spPr>
@@ -16318,7 +16508,7 @@
           </a:ln>
           <a:extLst>
             <a:ext uri="{C572A759-6A51-4108-AA02-DFA0A04FC94B}">
-              <ma14:wrappingTextBoxFlag xmlns:ma14="http://schemas.microsoft.com/office/mac/drawingml/2011/main" xmlns:a14="http://schemas.microsoft.com/office/drawing/2010/main" xmlns:m="http://schemas.openxmlformats.org/officeDocument/2006/math" xmlns="" val="1"/>
+              <ma14:wrappingTextBoxFlag xmlns="" xmlns:m="http://schemas.openxmlformats.org/officeDocument/2006/math" xmlns:a14="http://schemas.microsoft.com/office/drawing/2010/main" xmlns:ma14="http://schemas.microsoft.com/office/mac/drawingml/2011/main" val="1"/>
             </a:ext>
           </a:extLst>
         </p:spPr>
@@ -16376,7 +16566,7 @@
           </a:ln>
           <a:extLst>
             <a:ext uri="{C572A759-6A51-4108-AA02-DFA0A04FC94B}">
-              <ma14:wrappingTextBoxFlag xmlns:ma14="http://schemas.microsoft.com/office/mac/drawingml/2011/main" xmlns:a14="http://schemas.microsoft.com/office/drawing/2010/main" xmlns:m="http://schemas.openxmlformats.org/officeDocument/2006/math" xmlns="" val="1"/>
+              <ma14:wrappingTextBoxFlag xmlns="" xmlns:m="http://schemas.openxmlformats.org/officeDocument/2006/math" xmlns:a14="http://schemas.microsoft.com/office/drawing/2010/main" xmlns:ma14="http://schemas.microsoft.com/office/mac/drawingml/2011/main" val="1"/>
             </a:ext>
           </a:extLst>
         </p:spPr>
@@ -16620,7 +16810,7 @@
             </a:ln>
             <a:extLst>
               <a:ext uri="{C572A759-6A51-4108-AA02-DFA0A04FC94B}">
-                <ma14:wrappingTextBoxFlag xmlns:ma14="http://schemas.microsoft.com/office/mac/drawingml/2011/main" xmlns:a14="http://schemas.microsoft.com/office/drawing/2010/main" xmlns:m="http://schemas.openxmlformats.org/officeDocument/2006/math" xmlns="" val="1"/>
+                <ma14:wrappingTextBoxFlag xmlns="" xmlns:m="http://schemas.openxmlformats.org/officeDocument/2006/math" xmlns:a14="http://schemas.microsoft.com/office/drawing/2010/main" xmlns:ma14="http://schemas.microsoft.com/office/mac/drawingml/2011/main" val="1"/>
               </a:ext>
             </a:extLst>
           </p:spPr>
@@ -17172,7 +17362,7 @@
             </a:ln>
             <a:extLst>
               <a:ext uri="{C572A759-6A51-4108-AA02-DFA0A04FC94B}">
-                <ma14:wrappingTextBoxFlag xmlns:ma14="http://schemas.microsoft.com/office/mac/drawingml/2011/main" xmlns:a14="http://schemas.microsoft.com/office/drawing/2010/main" xmlns:m="http://schemas.openxmlformats.org/officeDocument/2006/math" xmlns="" val="1"/>
+                <ma14:wrappingTextBoxFlag xmlns="" xmlns:m="http://schemas.openxmlformats.org/officeDocument/2006/math" xmlns:a14="http://schemas.microsoft.com/office/drawing/2010/main" xmlns:ma14="http://schemas.microsoft.com/office/mac/drawingml/2011/main" val="1"/>
               </a:ext>
             </a:extLst>
           </p:spPr>
@@ -18395,7 +18585,7 @@
           </a:prstGeom>
           <a:extLst>
             <a:ext uri="{C572A759-6A51-4108-AA02-DFA0A04FC94B}">
-              <ma14:wrappingTextBoxFlag xmlns:ma14="http://schemas.microsoft.com/office/mac/drawingml/2011/main" xmlns:a14="http://schemas.microsoft.com/office/drawing/2010/main" xmlns:m="http://schemas.openxmlformats.org/officeDocument/2006/math" xmlns="" val="1"/>
+              <ma14:wrappingTextBoxFlag xmlns="" xmlns:m="http://schemas.openxmlformats.org/officeDocument/2006/math" xmlns:a14="http://schemas.microsoft.com/office/drawing/2010/main" xmlns:ma14="http://schemas.microsoft.com/office/mac/drawingml/2011/main" val="1"/>
             </a:ext>
           </a:extLst>
         </p:spPr>
@@ -19142,7 +19332,7 @@
             <a:effectLst/>
             <a:extLst>
               <a:ext uri="{C572A759-6A51-4108-AA02-DFA0A04FC94B}">
-                <ma14:wrappingTextBoxFlag xmlns="" xmlns:m="http://schemas.openxmlformats.org/officeDocument/2006/math" xmlns:a14="http://schemas.microsoft.com/office/drawing/2010/main" xmlns:ma14="http://schemas.microsoft.com/office/mac/drawingml/2011/main" val="1"/>
+                <ma14:wrappingTextBoxFlag xmlns:ma14="http://schemas.microsoft.com/office/mac/drawingml/2011/main" xmlns:a14="http://schemas.microsoft.com/office/drawing/2010/main" xmlns:m="http://schemas.openxmlformats.org/officeDocument/2006/math" xmlns="" val="1"/>
               </a:ext>
             </a:extLst>
           </p:spPr>
@@ -19425,7 +19615,7 @@
             <a:effectLst/>
             <a:extLst>
               <a:ext uri="{C572A759-6A51-4108-AA02-DFA0A04FC94B}">
-                <ma14:wrappingTextBoxFlag xmlns="" xmlns:m="http://schemas.openxmlformats.org/officeDocument/2006/math" xmlns:a14="http://schemas.microsoft.com/office/drawing/2010/main" xmlns:ma14="http://schemas.microsoft.com/office/mac/drawingml/2011/main" val="1"/>
+                <ma14:wrappingTextBoxFlag xmlns:ma14="http://schemas.microsoft.com/office/mac/drawingml/2011/main" xmlns:a14="http://schemas.microsoft.com/office/drawing/2010/main" xmlns:m="http://schemas.openxmlformats.org/officeDocument/2006/math" xmlns="" val="1"/>
               </a:ext>
             </a:extLst>
           </p:spPr>
@@ -20559,7 +20749,7 @@
             <a:effectLst/>
             <a:extLst>
               <a:ext uri="{C572A759-6A51-4108-AA02-DFA0A04FC94B}">
-                <ma14:wrappingTextBoxFlag xmlns:ma14="http://schemas.microsoft.com/office/mac/drawingml/2011/main" xmlns:a14="http://schemas.microsoft.com/office/drawing/2010/main" xmlns:m="http://schemas.openxmlformats.org/officeDocument/2006/math" xmlns="" val="1"/>
+                <ma14:wrappingTextBoxFlag xmlns="" xmlns:m="http://schemas.openxmlformats.org/officeDocument/2006/math" xmlns:a14="http://schemas.microsoft.com/office/drawing/2010/main" xmlns:ma14="http://schemas.microsoft.com/office/mac/drawingml/2011/main" val="1"/>
               </a:ext>
             </a:extLst>
           </p:spPr>
@@ -20824,7 +21014,7 @@
             <a:effectLst/>
             <a:extLst>
               <a:ext uri="{C572A759-6A51-4108-AA02-DFA0A04FC94B}">
-                <ma14:wrappingTextBoxFlag xmlns:ma14="http://schemas.microsoft.com/office/mac/drawingml/2011/main" xmlns:a14="http://schemas.microsoft.com/office/drawing/2010/main" xmlns:m="http://schemas.openxmlformats.org/officeDocument/2006/math" xmlns="" val="1"/>
+                <ma14:wrappingTextBoxFlag xmlns="" xmlns:m="http://schemas.openxmlformats.org/officeDocument/2006/math" xmlns:a14="http://schemas.microsoft.com/office/drawing/2010/main" xmlns:ma14="http://schemas.microsoft.com/office/mac/drawingml/2011/main" val="1"/>
               </a:ext>
             </a:extLst>
           </p:spPr>
@@ -21230,14 +21420,30 @@
             <a:pPr lvl="1"/>
             <a:r>
               <a:rPr lang="en-US" dirty="0"/>
-              <a:t>Explain why almost all programs need to support concurrent actions</a:t>
+              <a:t>Explain how to achieve concurrency through asynchronous operations and </a:t>
+            </a:r>
+            <a:r>
+              <a:rPr lang="en-US" dirty="0" err="1"/>
+              <a:t>Promise.all</a:t>
+            </a:r>
+            <a:r>
+              <a:rPr lang="en-US" dirty="0"/>
+              <a:t> in TypeScript.</a:t>
             </a:r>
           </a:p>
           <a:p>
             <a:pPr lvl="1"/>
             <a:r>
               <a:rPr lang="en-US" dirty="0"/>
-              <a:t>Write code that uses asynchronous computation using async/await</a:t>
+              <a:t>Write asynchronous and concurrent code in TypeScript using async/await and </a:t>
+            </a:r>
+            <a:r>
+              <a:rPr lang="en-US" dirty="0" err="1"/>
+              <a:t>Promise.all</a:t>
+            </a:r>
+            <a:r>
+              <a:rPr lang="en-US" dirty="0"/>
+              <a:t>.</a:t>
             </a:r>
           </a:p>
         </p:txBody>
@@ -21274,7 +21480,7 @@
     </p:spTree>
     <p:extLst>
       <p:ext uri="{BB962C8B-B14F-4D97-AF65-F5344CB8AC3E}">
-        <p14:creationId xmlns:p14="http://schemas.microsoft.com/office/powerpoint/2010/main" val="3463548191"/>
+        <p14:creationId xmlns:p14="http://schemas.microsoft.com/office/powerpoint/2010/main" val="2314319587"/>
       </p:ext>
     </p:extLst>
   </p:cSld>
@@ -22398,7 +22604,7 @@
             <a:effectLst/>
             <a:extLst>
               <a:ext uri="{C572A759-6A51-4108-AA02-DFA0A04FC94B}">
-                <ma14:wrappingTextBoxFlag xmlns="" xmlns:m="http://schemas.openxmlformats.org/officeDocument/2006/math" xmlns:a14="http://schemas.microsoft.com/office/drawing/2010/main" xmlns:ma14="http://schemas.microsoft.com/office/mac/drawingml/2011/main" val="1"/>
+                <ma14:wrappingTextBoxFlag xmlns:ma14="http://schemas.microsoft.com/office/mac/drawingml/2011/main" xmlns:a14="http://schemas.microsoft.com/office/drawing/2010/main" xmlns:m="http://schemas.openxmlformats.org/officeDocument/2006/math" xmlns="" val="1"/>
               </a:ext>
             </a:extLst>
           </p:spPr>
@@ -26714,7 +26920,7 @@
             <a:effectLst/>
             <a:extLst>
               <a:ext uri="{C572A759-6A51-4108-AA02-DFA0A04FC94B}">
-                <ma14:wrappingTextBoxFlag xmlns="" xmlns:m="http://schemas.openxmlformats.org/officeDocument/2006/math" xmlns:a14="http://schemas.microsoft.com/office/drawing/2010/main" xmlns:ma14="http://schemas.microsoft.com/office/mac/drawingml/2011/main" val="1"/>
+                <ma14:wrappingTextBoxFlag xmlns:ma14="http://schemas.microsoft.com/office/mac/drawingml/2011/main" xmlns:a14="http://schemas.microsoft.com/office/drawing/2010/main" xmlns:m="http://schemas.openxmlformats.org/officeDocument/2006/math" xmlns="" val="1"/>
               </a:ext>
             </a:extLst>
           </p:spPr>
@@ -27017,7 +27223,7 @@
           </a:prstGeom>
           <a:extLst>
             <a:ext uri="{C572A759-6A51-4108-AA02-DFA0A04FC94B}">
-              <ma14:wrappingTextBoxFlag xmlns="" xmlns:m="http://schemas.openxmlformats.org/officeDocument/2006/math" xmlns:a14="http://schemas.microsoft.com/office/drawing/2010/main" xmlns:ma14="http://schemas.microsoft.com/office/mac/drawingml/2011/main" val="1"/>
+              <ma14:wrappingTextBoxFlag xmlns:ma14="http://schemas.microsoft.com/office/mac/drawingml/2011/main" xmlns:a14="http://schemas.microsoft.com/office/drawing/2010/main" xmlns:m="http://schemas.openxmlformats.org/officeDocument/2006/math" xmlns="" val="1"/>
             </a:ext>
           </a:extLst>
         </p:spPr>
@@ -27055,7 +27261,7 @@
           </a:ln>
           <a:extLst>
             <a:ext uri="{C572A759-6A51-4108-AA02-DFA0A04FC94B}">
-              <ma14:wrappingTextBoxFlag xmlns="" xmlns:m="http://schemas.openxmlformats.org/officeDocument/2006/math" xmlns:a14="http://schemas.microsoft.com/office/drawing/2010/main" xmlns:ma14="http://schemas.microsoft.com/office/mac/drawingml/2011/main" val="1"/>
+              <ma14:wrappingTextBoxFlag xmlns:ma14="http://schemas.microsoft.com/office/mac/drawingml/2011/main" xmlns:a14="http://schemas.microsoft.com/office/drawing/2010/main" xmlns:m="http://schemas.openxmlformats.org/officeDocument/2006/math" xmlns="" val="1"/>
             </a:ext>
           </a:extLst>
         </p:spPr>
@@ -28122,7 +28328,7 @@
           </a:ln>
           <a:extLst>
             <a:ext uri="{C572A759-6A51-4108-AA02-DFA0A04FC94B}">
-              <ma14:wrappingTextBoxFlag xmlns="" xmlns:m="http://schemas.openxmlformats.org/officeDocument/2006/math" xmlns:a14="http://schemas.microsoft.com/office/drawing/2010/main" xmlns:ma14="http://schemas.microsoft.com/office/mac/drawingml/2011/main" val="1"/>
+              <ma14:wrappingTextBoxFlag xmlns:ma14="http://schemas.microsoft.com/office/mac/drawingml/2011/main" xmlns:a14="http://schemas.microsoft.com/office/drawing/2010/main" xmlns:m="http://schemas.openxmlformats.org/officeDocument/2006/math" xmlns="" val="1"/>
             </a:ext>
           </a:extLst>
         </p:spPr>
@@ -29154,7 +29360,7 @@
           </a:ln>
           <a:extLst>
             <a:ext uri="{C572A759-6A51-4108-AA02-DFA0A04FC94B}">
-              <ma14:wrappingTextBoxFlag xmlns="" xmlns:m="http://schemas.openxmlformats.org/officeDocument/2006/math" xmlns:a14="http://schemas.microsoft.com/office/drawing/2010/main" xmlns:ma14="http://schemas.microsoft.com/office/mac/drawingml/2011/main" val="1"/>
+              <ma14:wrappingTextBoxFlag xmlns:ma14="http://schemas.microsoft.com/office/mac/drawingml/2011/main" xmlns:a14="http://schemas.microsoft.com/office/drawing/2010/main" xmlns:m="http://schemas.openxmlformats.org/officeDocument/2006/math" xmlns="" val="1"/>
             </a:ext>
           </a:extLst>
         </p:spPr>
@@ -29212,7 +29418,7 @@
           </a:ln>
           <a:extLst>
             <a:ext uri="{C572A759-6A51-4108-AA02-DFA0A04FC94B}">
-              <ma14:wrappingTextBoxFlag xmlns="" xmlns:m="http://schemas.openxmlformats.org/officeDocument/2006/math" xmlns:a14="http://schemas.microsoft.com/office/drawing/2010/main" xmlns:ma14="http://schemas.microsoft.com/office/mac/drawingml/2011/main" val="1"/>
+              <ma14:wrappingTextBoxFlag xmlns:ma14="http://schemas.microsoft.com/office/mac/drawingml/2011/main" xmlns:a14="http://schemas.microsoft.com/office/drawing/2010/main" xmlns:m="http://schemas.openxmlformats.org/officeDocument/2006/math" xmlns="" val="1"/>
             </a:ext>
           </a:extLst>
         </p:spPr>
@@ -29256,7 +29462,7 @@
           </a:ln>
           <a:extLst>
             <a:ext uri="{C572A759-6A51-4108-AA02-DFA0A04FC94B}">
-              <ma14:wrappingTextBoxFlag xmlns="" xmlns:m="http://schemas.openxmlformats.org/officeDocument/2006/math" xmlns:a14="http://schemas.microsoft.com/office/drawing/2010/main" xmlns:ma14="http://schemas.microsoft.com/office/mac/drawingml/2011/main" val="1"/>
+              <ma14:wrappingTextBoxFlag xmlns:ma14="http://schemas.microsoft.com/office/mac/drawingml/2011/main" xmlns:a14="http://schemas.microsoft.com/office/drawing/2010/main" xmlns:m="http://schemas.openxmlformats.org/officeDocument/2006/math" xmlns="" val="1"/>
             </a:ext>
           </a:extLst>
         </p:spPr>
@@ -29292,7 +29498,7 @@
           </a:ln>
           <a:extLst>
             <a:ext uri="{C572A759-6A51-4108-AA02-DFA0A04FC94B}">
-              <ma14:wrappingTextBoxFlag xmlns="" xmlns:m="http://schemas.openxmlformats.org/officeDocument/2006/math" xmlns:a14="http://schemas.microsoft.com/office/drawing/2010/main" xmlns:ma14="http://schemas.microsoft.com/office/mac/drawingml/2011/main" val="1"/>
+              <ma14:wrappingTextBoxFlag xmlns:ma14="http://schemas.microsoft.com/office/mac/drawingml/2011/main" xmlns:a14="http://schemas.microsoft.com/office/drawing/2010/main" xmlns:m="http://schemas.openxmlformats.org/officeDocument/2006/math" xmlns="" val="1"/>
             </a:ext>
           </a:extLst>
         </p:spPr>
@@ -29380,7 +29586,7 @@
             <a:effectLst/>
             <a:extLst>
               <a:ext uri="{C572A759-6A51-4108-AA02-DFA0A04FC94B}">
-                <ma14:wrappingTextBoxFlag xmlns="" xmlns:m="http://schemas.openxmlformats.org/officeDocument/2006/math" xmlns:a14="http://schemas.microsoft.com/office/drawing/2010/main" xmlns:ma14="http://schemas.microsoft.com/office/mac/drawingml/2011/main" val="1"/>
+                <ma14:wrappingTextBoxFlag xmlns:ma14="http://schemas.microsoft.com/office/mac/drawingml/2011/main" xmlns:a14="http://schemas.microsoft.com/office/drawing/2010/main" xmlns:m="http://schemas.openxmlformats.org/officeDocument/2006/math" xmlns="" val="1"/>
               </a:ext>
             </a:extLst>
           </p:spPr>
@@ -29642,7 +29848,7 @@
             <a:effectLst/>
             <a:extLst>
               <a:ext uri="{C572A759-6A51-4108-AA02-DFA0A04FC94B}">
-                <ma14:wrappingTextBoxFlag xmlns="" xmlns:m="http://schemas.openxmlformats.org/officeDocument/2006/math" xmlns:a14="http://schemas.microsoft.com/office/drawing/2010/main" xmlns:ma14="http://schemas.microsoft.com/office/mac/drawingml/2011/main" val="1"/>
+                <ma14:wrappingTextBoxFlag xmlns:ma14="http://schemas.microsoft.com/office/mac/drawingml/2011/main" xmlns:a14="http://schemas.microsoft.com/office/drawing/2010/main" xmlns:m="http://schemas.openxmlformats.org/officeDocument/2006/math" xmlns="" val="1"/>
               </a:ext>
             </a:extLst>
           </p:spPr>
@@ -31005,7 +31211,7 @@
             </a:r>
             <a:r>
               <a:rPr lang="en-US" dirty="0"/>
-              <a:t> in TypeScript</a:t>
+              <a:t> in TypeScript.</a:t>
             </a:r>
           </a:p>
           <a:p>
@@ -31018,7 +31224,10 @@
               <a:rPr lang="en-US" dirty="0" err="1"/>
               <a:t>Promise.all</a:t>
             </a:r>
-            <a:endParaRPr lang="en-US" dirty="0"/>
+            <a:r>
+              <a:rPr lang="en-US" dirty="0"/>
+              <a:t>.</a:t>
+            </a:r>
           </a:p>
         </p:txBody>
       </p:sp>
@@ -31054,7 +31263,7 @@
     </p:spTree>
     <p:extLst>
       <p:ext uri="{BB962C8B-B14F-4D97-AF65-F5344CB8AC3E}">
-        <p14:creationId xmlns:p14="http://schemas.microsoft.com/office/powerpoint/2010/main" val="4247007316"/>
+        <p14:creationId xmlns:p14="http://schemas.microsoft.com/office/powerpoint/2010/main" val="2490106296"/>
       </p:ext>
     </p:extLst>
   </p:cSld>
@@ -31065,6 +31274,170 @@
 </file>
 
 <file path=ppt/slides/slide27.xml><?xml version="1.0" encoding="utf-8"?>
+<p:sld xmlns:a="http://schemas.openxmlformats.org/drawingml/2006/main" xmlns:r="http://schemas.openxmlformats.org/officeDocument/2006/relationships" xmlns:p="http://schemas.openxmlformats.org/presentationml/2006/main">
+  <p:cSld>
+    <p:spTree>
+      <p:nvGrpSpPr>
+        <p:cNvPr id="1" name=""/>
+        <p:cNvGrpSpPr/>
+        <p:nvPr/>
+      </p:nvGrpSpPr>
+      <p:grpSpPr>
+        <a:xfrm>
+          <a:off x="0" y="0"/>
+          <a:ext cx="0" cy="0"/>
+          <a:chOff x="0" y="0"/>
+          <a:chExt cx="0" cy="0"/>
+        </a:xfrm>
+      </p:grpSpPr>
+      <p:sp>
+        <p:nvSpPr>
+          <p:cNvPr id="2" name="Title 1">
+            <a:extLst>
+              <a:ext uri="{FF2B5EF4-FFF2-40B4-BE49-F238E27FC236}">
+                <a16:creationId xmlns:a16="http://schemas.microsoft.com/office/drawing/2014/main" id="{E743D407-5B53-49A7-9907-E801EA7FFD8E}"/>
+              </a:ext>
+            </a:extLst>
+          </p:cNvPr>
+          <p:cNvSpPr>
+            <a:spLocks noGrp="1"/>
+          </p:cNvSpPr>
+          <p:nvPr>
+            <p:ph type="title"/>
+          </p:nvPr>
+        </p:nvSpPr>
+        <p:spPr/>
+        <p:txBody>
+          <a:bodyPr/>
+          <a:lstStyle/>
+          <a:p>
+            <a:r>
+              <a:rPr lang="en-US" dirty="0"/>
+              <a:t>Learning Goals for this Lesson (expanded)</a:t>
+            </a:r>
+          </a:p>
+        </p:txBody>
+      </p:sp>
+      <p:sp>
+        <p:nvSpPr>
+          <p:cNvPr id="3" name="Content Placeholder 2">
+            <a:extLst>
+              <a:ext uri="{FF2B5EF4-FFF2-40B4-BE49-F238E27FC236}">
+                <a16:creationId xmlns:a16="http://schemas.microsoft.com/office/drawing/2014/main" id="{AC300E2B-BFD0-4090-AFC5-FE82683F997F}"/>
+              </a:ext>
+            </a:extLst>
+          </p:cNvPr>
+          <p:cNvSpPr>
+            <a:spLocks noGrp="1"/>
+          </p:cNvSpPr>
+          <p:nvPr>
+            <p:ph idx="1"/>
+          </p:nvPr>
+        </p:nvSpPr>
+        <p:spPr>
+          <a:xfrm>
+            <a:off x="838199" y="1500160"/>
+            <a:ext cx="10515599" cy="4351338"/>
+          </a:xfrm>
+        </p:spPr>
+        <p:txBody>
+          <a:bodyPr/>
+          <a:lstStyle/>
+          <a:p>
+            <a:r>
+              <a:rPr lang="en-US" dirty="0"/>
+              <a:t>At the end of this lesson, you should be prepared to:</a:t>
+            </a:r>
+          </a:p>
+          <a:p>
+            <a:pPr lvl="1"/>
+            <a:r>
+              <a:rPr lang="en-US" dirty="0"/>
+              <a:t>Explain how to achieve concurrency through asynchronous operations and </a:t>
+            </a:r>
+            <a:r>
+              <a:rPr lang="en-US" dirty="0" err="1"/>
+              <a:t>Promise.all</a:t>
+            </a:r>
+            <a:r>
+              <a:rPr lang="en-US" dirty="0"/>
+              <a:t> in TypeScript.</a:t>
+            </a:r>
+          </a:p>
+          <a:p>
+            <a:pPr lvl="1"/>
+            <a:r>
+              <a:rPr lang="en-US" dirty="0"/>
+              <a:t>Write asynchronous and concurrent code in TypeScript using async/await and </a:t>
+            </a:r>
+            <a:r>
+              <a:rPr lang="en-US" dirty="0" err="1"/>
+              <a:t>Promise.all</a:t>
+            </a:r>
+            <a:r>
+              <a:rPr lang="en-US" dirty="0"/>
+              <a:t>.</a:t>
+            </a:r>
+          </a:p>
+          <a:p>
+            <a:pPr lvl="1"/>
+            <a:r>
+              <a:rPr lang="en-US" dirty="0"/>
+              <a:t>Write asynchronous code using promises and .then().</a:t>
+            </a:r>
+          </a:p>
+          <a:p>
+            <a:pPr lvl="1"/>
+            <a:r>
+              <a:rPr lang="en-US" dirty="0"/>
+              <a:t>Explain the difference between JS run-to-completion semantics and interrupt-based semantics.</a:t>
+            </a:r>
+          </a:p>
+        </p:txBody>
+      </p:sp>
+      <p:sp>
+        <p:nvSpPr>
+          <p:cNvPr id="4" name="Slide Number Placeholder 3">
+            <a:extLst>
+              <a:ext uri="{FF2B5EF4-FFF2-40B4-BE49-F238E27FC236}">
+                <a16:creationId xmlns:a16="http://schemas.microsoft.com/office/drawing/2014/main" id="{B7BF3F82-6F96-41E0-9C15-23CE00076176}"/>
+              </a:ext>
+            </a:extLst>
+          </p:cNvPr>
+          <p:cNvSpPr>
+            <a:spLocks noGrp="1"/>
+          </p:cNvSpPr>
+          <p:nvPr>
+            <p:ph type="sldNum" sz="quarter" idx="12"/>
+          </p:nvPr>
+        </p:nvSpPr>
+        <p:spPr/>
+        <p:txBody>
+          <a:bodyPr/>
+          <a:lstStyle/>
+          <a:p>
+            <a:fld id="{20F37917-FD3A-4669-9018-DA04BCDD3D75}" type="slidenum">
+              <a:rPr lang="en-US" smtClean="0"/>
+              <a:t>27</a:t>
+            </a:fld>
+            <a:endParaRPr lang="en-US"/>
+          </a:p>
+        </p:txBody>
+      </p:sp>
+    </p:spTree>
+    <p:extLst>
+      <p:ext uri="{BB962C8B-B14F-4D97-AF65-F5344CB8AC3E}">
+        <p14:creationId xmlns:p14="http://schemas.microsoft.com/office/powerpoint/2010/main" val="2176297323"/>
+      </p:ext>
+    </p:extLst>
+  </p:cSld>
+  <p:clrMapOvr>
+    <a:masterClrMapping/>
+  </p:clrMapOvr>
+</p:sld>
+</file>
+
+<file path=ppt/slides/slide28.xml><?xml version="1.0" encoding="utf-8"?>
 <p:sld xmlns:a="http://schemas.openxmlformats.org/drawingml/2006/main" xmlns:r="http://schemas.openxmlformats.org/officeDocument/2006/relationships" xmlns:p="http://schemas.openxmlformats.org/presentationml/2006/main">
   <p:cSld>
     <p:spTree>
@@ -31181,7 +31554,7 @@
                 <a:tabLst/>
                 <a:defRPr/>
               </a:pPr>
-              <a:t>27</a:t>
+              <a:t>28</a:t>
             </a:fld>
             <a:endParaRPr kumimoji="0" lang="en-US" sz="1200" b="0" i="0" u="none" strike="noStrike" kern="1200" cap="none" spc="0" normalizeH="0" baseline="0" noProof="0">
               <a:ln>
@@ -31215,7 +31588,7 @@
 </p:sld>
 </file>
 
-<file path=ppt/slides/slide28.xml><?xml version="1.0" encoding="utf-8"?>
+<file path=ppt/slides/slide29.xml><?xml version="1.0" encoding="utf-8"?>
 <p:sld xmlns:a="http://schemas.openxmlformats.org/drawingml/2006/main" xmlns:r="http://schemas.openxmlformats.org/officeDocument/2006/relationships" xmlns:p="http://schemas.openxmlformats.org/presentationml/2006/main">
   <p:cSld>
     <p:spTree>
@@ -31342,182 +31715,6 @@
         </p:txBody>
       </p:sp>
     </p:spTree>
-  </p:cSld>
-  <p:clrMapOvr>
-    <a:masterClrMapping/>
-  </p:clrMapOvr>
-</p:sld>
-</file>
-
-<file path=ppt/slides/slide29.xml><?xml version="1.0" encoding="utf-8"?>
-<p:sld xmlns:a="http://schemas.openxmlformats.org/drawingml/2006/main" xmlns:r="http://schemas.openxmlformats.org/officeDocument/2006/relationships" xmlns:p="http://schemas.openxmlformats.org/presentationml/2006/main">
-  <p:cSld>
-    <p:spTree>
-      <p:nvGrpSpPr>
-        <p:cNvPr id="1" name=""/>
-        <p:cNvGrpSpPr/>
-        <p:nvPr/>
-      </p:nvGrpSpPr>
-      <p:grpSpPr>
-        <a:xfrm>
-          <a:off x="0" y="0"/>
-          <a:ext cx="0" cy="0"/>
-          <a:chOff x="0" y="0"/>
-          <a:chExt cx="0" cy="0"/>
-        </a:xfrm>
-      </p:grpSpPr>
-      <p:sp>
-        <p:nvSpPr>
-          <p:cNvPr id="2" name="Title 1">
-            <a:extLst>
-              <a:ext uri="{FF2B5EF4-FFF2-40B4-BE49-F238E27FC236}">
-                <a16:creationId xmlns:a16="http://schemas.microsoft.com/office/drawing/2014/main" id="{2E39E48C-7DF7-CFF4-A102-2C8AA719E8CB}"/>
-              </a:ext>
-            </a:extLst>
-          </p:cNvPr>
-          <p:cNvSpPr>
-            <a:spLocks noGrp="1"/>
-          </p:cNvSpPr>
-          <p:nvPr>
-            <p:ph type="title"/>
-          </p:nvPr>
-        </p:nvSpPr>
-        <p:spPr/>
-        <p:txBody>
-          <a:bodyPr/>
-          <a:lstStyle/>
-          <a:p>
-            <a:r>
-              <a:rPr lang="en-US" dirty="0"/>
-              <a:t>Async functions use Promises Under the Hood</a:t>
-            </a:r>
-          </a:p>
-        </p:txBody>
-      </p:sp>
-      <p:sp>
-        <p:nvSpPr>
-          <p:cNvPr id="3" name="Content Placeholder 2">
-            <a:extLst>
-              <a:ext uri="{FF2B5EF4-FFF2-40B4-BE49-F238E27FC236}">
-                <a16:creationId xmlns:a16="http://schemas.microsoft.com/office/drawing/2014/main" id="{D94C0420-7FD4-279D-3DAF-86AFA6DBC2F3}"/>
-              </a:ext>
-            </a:extLst>
-          </p:cNvPr>
-          <p:cNvSpPr>
-            <a:spLocks noGrp="1"/>
-          </p:cNvSpPr>
-          <p:nvPr>
-            <p:ph idx="1"/>
-          </p:nvPr>
-        </p:nvSpPr>
-        <p:spPr/>
-        <p:txBody>
-          <a:bodyPr/>
-          <a:lstStyle/>
-          <a:p>
-            <a:endParaRPr lang="en-US" dirty="0"/>
-          </a:p>
-        </p:txBody>
-      </p:sp>
-      <p:sp>
-        <p:nvSpPr>
-          <p:cNvPr id="4" name="Slide Number Placeholder 3">
-            <a:extLst>
-              <a:ext uri="{FF2B5EF4-FFF2-40B4-BE49-F238E27FC236}">
-                <a16:creationId xmlns:a16="http://schemas.microsoft.com/office/drawing/2014/main" id="{DACCF1D1-C6F4-344E-6EEC-62A93619DB47}"/>
-              </a:ext>
-            </a:extLst>
-          </p:cNvPr>
-          <p:cNvSpPr>
-            <a:spLocks noGrp="1"/>
-          </p:cNvSpPr>
-          <p:nvPr>
-            <p:ph type="sldNum" sz="quarter" idx="12"/>
-          </p:nvPr>
-        </p:nvSpPr>
-        <p:spPr/>
-        <p:txBody>
-          <a:bodyPr/>
-          <a:lstStyle/>
-          <a:p>
-            <a:pPr marL="0" marR="0" lvl="0" indent="0" algn="r" defTabSz="914400" rtl="0" eaLnBrk="1" fontAlgn="auto" latinLnBrk="0" hangingPunct="1">
-              <a:lnSpc>
-                <a:spcPct val="100000"/>
-              </a:lnSpc>
-              <a:spcBef>
-                <a:spcPts val="0"/>
-              </a:spcBef>
-              <a:spcAft>
-                <a:spcPts val="0"/>
-              </a:spcAft>
-              <a:buClrTx/>
-              <a:buSzTx/>
-              <a:buFontTx/>
-              <a:buNone/>
-              <a:tabLst/>
-              <a:defRPr/>
-            </a:pPr>
-            <a:fld id="{20F37917-FD3A-4669-9018-DA04BCDD3D75}" type="slidenum">
-              <a:rPr kumimoji="0" lang="en-US" sz="1200" b="0" i="0" u="none" strike="noStrike" kern="1200" cap="none" spc="0" normalizeH="0" baseline="0" noProof="0" smtClean="0">
-                <a:ln>
-                  <a:noFill/>
-                </a:ln>
-                <a:solidFill>
-                  <a:prstClr val="black">
-                    <a:tint val="75000"/>
-                  </a:prstClr>
-                </a:solidFill>
-                <a:effectLst/>
-                <a:uLnTx/>
-                <a:uFillTx/>
-                <a:latin typeface="Calibri" panose="020F0502020204030204"/>
-                <a:ea typeface="+mn-ea"/>
-                <a:cs typeface="+mn-cs"/>
-              </a:rPr>
-              <a:pPr marL="0" marR="0" lvl="0" indent="0" algn="r" defTabSz="914400" rtl="0" eaLnBrk="1" fontAlgn="auto" latinLnBrk="0" hangingPunct="1">
-                <a:lnSpc>
-                  <a:spcPct val="100000"/>
-                </a:lnSpc>
-                <a:spcBef>
-                  <a:spcPts val="0"/>
-                </a:spcBef>
-                <a:spcAft>
-                  <a:spcPts val="0"/>
-                </a:spcAft>
-                <a:buClrTx/>
-                <a:buSzTx/>
-                <a:buFontTx/>
-                <a:buNone/>
-                <a:tabLst/>
-                <a:defRPr/>
-              </a:pPr>
-              <a:t>29</a:t>
-            </a:fld>
-            <a:endParaRPr kumimoji="0" lang="en-US" sz="1200" b="0" i="0" u="none" strike="noStrike" kern="1200" cap="none" spc="0" normalizeH="0" baseline="0" noProof="0">
-              <a:ln>
-                <a:noFill/>
-              </a:ln>
-              <a:solidFill>
-                <a:prstClr val="black">
-                  <a:tint val="75000"/>
-                </a:prstClr>
-              </a:solidFill>
-              <a:effectLst/>
-              <a:uLnTx/>
-              <a:uFillTx/>
-              <a:latin typeface="Calibri" panose="020F0502020204030204"/>
-              <a:ea typeface="+mn-ea"/>
-              <a:cs typeface="+mn-cs"/>
-            </a:endParaRPr>
-          </a:p>
-        </p:txBody>
-      </p:sp>
-    </p:spTree>
-    <p:extLst>
-      <p:ext uri="{BB962C8B-B14F-4D97-AF65-F5344CB8AC3E}">
-        <p14:creationId xmlns:p14="http://schemas.microsoft.com/office/powerpoint/2010/main" val="2387147600"/>
-      </p:ext>
-    </p:extLst>
   </p:cSld>
   <p:clrMapOvr>
     <a:masterClrMapping/>
@@ -31635,7 +31832,7 @@
           </a:prstGeom>
           <a:extLst>
             <a:ext uri="{C572A759-6A51-4108-AA02-DFA0A04FC94B}">
-              <ma14:wrappingTextBoxFlag xmlns="" xmlns:m="http://schemas.openxmlformats.org/officeDocument/2006/math" xmlns:a14="http://schemas.microsoft.com/office/drawing/2010/main" xmlns:ma14="http://schemas.microsoft.com/office/mac/drawingml/2011/main" val="1"/>
+              <ma14:wrappingTextBoxFlag xmlns:ma14="http://schemas.microsoft.com/office/mac/drawingml/2011/main" xmlns:a14="http://schemas.microsoft.com/office/drawing/2010/main" xmlns:m="http://schemas.openxmlformats.org/officeDocument/2006/math" xmlns="" val="1"/>
             </a:ext>
           </a:extLst>
         </p:spPr>
@@ -32025,7 +32222,7 @@
               </a:effectLst>
               <a:extLst>
                 <a:ext uri="{C572A759-6A51-4108-AA02-DFA0A04FC94B}">
-                  <ma14:wrappingTextBoxFlag xmlns="" xmlns:m="http://schemas.openxmlformats.org/officeDocument/2006/math" xmlns:a14="http://schemas.microsoft.com/office/drawing/2010/main" xmlns:ma14="http://schemas.microsoft.com/office/mac/drawingml/2011/main" val="1"/>
+                  <ma14:wrappingTextBoxFlag xmlns:ma14="http://schemas.microsoft.com/office/mac/drawingml/2011/main" xmlns:a14="http://schemas.microsoft.com/office/drawing/2010/main" xmlns:m="http://schemas.openxmlformats.org/officeDocument/2006/math" xmlns="" val="1"/>
                 </a:ext>
               </a:extLst>
             </p:spPr>
@@ -32095,7 +32292,7 @@
               </a:effectLst>
               <a:extLst>
                 <a:ext uri="{C572A759-6A51-4108-AA02-DFA0A04FC94B}">
-                  <ma14:wrappingTextBoxFlag xmlns="" xmlns:m="http://schemas.openxmlformats.org/officeDocument/2006/math" xmlns:a14="http://schemas.microsoft.com/office/drawing/2010/main" xmlns:ma14="http://schemas.microsoft.com/office/mac/drawingml/2011/main" val="1"/>
+                  <ma14:wrappingTextBoxFlag xmlns:ma14="http://schemas.microsoft.com/office/mac/drawingml/2011/main" xmlns:a14="http://schemas.microsoft.com/office/drawing/2010/main" xmlns:m="http://schemas.openxmlformats.org/officeDocument/2006/math" xmlns="" val="1"/>
                 </a:ext>
               </a:extLst>
             </p:spPr>
@@ -32163,7 +32360,7 @@
               </a:effectLst>
               <a:extLst>
                 <a:ext uri="{C572A759-6A51-4108-AA02-DFA0A04FC94B}">
-                  <ma14:wrappingTextBoxFlag xmlns="" xmlns:m="http://schemas.openxmlformats.org/officeDocument/2006/math" xmlns:a14="http://schemas.microsoft.com/office/drawing/2010/main" xmlns:ma14="http://schemas.microsoft.com/office/mac/drawingml/2011/main" val="1"/>
+                  <ma14:wrappingTextBoxFlag xmlns:ma14="http://schemas.microsoft.com/office/mac/drawingml/2011/main" xmlns:a14="http://schemas.microsoft.com/office/drawing/2010/main" xmlns:m="http://schemas.openxmlformats.org/officeDocument/2006/math" xmlns="" val="1"/>
                 </a:ext>
               </a:extLst>
             </p:spPr>
@@ -32251,7 +32448,7 @@
                 </a:effectLst>
                 <a:extLst>
                   <a:ext uri="{C572A759-6A51-4108-AA02-DFA0A04FC94B}">
-                    <ma14:wrappingTextBoxFlag xmlns="" xmlns:m="http://schemas.openxmlformats.org/officeDocument/2006/math" xmlns:a14="http://schemas.microsoft.com/office/drawing/2010/main" xmlns:ma14="http://schemas.microsoft.com/office/mac/drawingml/2011/main" val="1"/>
+                    <ma14:wrappingTextBoxFlag xmlns:ma14="http://schemas.microsoft.com/office/mac/drawingml/2011/main" xmlns:a14="http://schemas.microsoft.com/office/drawing/2010/main" xmlns:m="http://schemas.openxmlformats.org/officeDocument/2006/math" xmlns="" val="1"/>
                   </a:ext>
                 </a:extLst>
               </p:spPr>
@@ -32429,7 +32626,7 @@
                   <a:effectLst/>
                   <a:extLst>
                     <a:ext uri="{C572A759-6A51-4108-AA02-DFA0A04FC94B}">
-                      <ma14:wrappingTextBoxFlag xmlns="" xmlns:m="http://schemas.openxmlformats.org/officeDocument/2006/math" xmlns:a14="http://schemas.microsoft.com/office/drawing/2010/main" xmlns:ma14="http://schemas.microsoft.com/office/mac/drawingml/2011/main" val="1"/>
+                      <ma14:wrappingTextBoxFlag xmlns:ma14="http://schemas.microsoft.com/office/mac/drawingml/2011/main" xmlns:a14="http://schemas.microsoft.com/office/drawing/2010/main" xmlns:m="http://schemas.openxmlformats.org/officeDocument/2006/math" xmlns="" val="1"/>
                     </a:ext>
                   </a:extLst>
                 </p:spPr>
@@ -32629,7 +32826,7 @@
                   <a:effectLst/>
                   <a:extLst>
                     <a:ext uri="{C572A759-6A51-4108-AA02-DFA0A04FC94B}">
-                      <ma14:wrappingTextBoxFlag xmlns="" xmlns:m="http://schemas.openxmlformats.org/officeDocument/2006/math" xmlns:a14="http://schemas.microsoft.com/office/drawing/2010/main" xmlns:ma14="http://schemas.microsoft.com/office/mac/drawingml/2011/main" val="1"/>
+                      <ma14:wrappingTextBoxFlag xmlns:ma14="http://schemas.microsoft.com/office/mac/drawingml/2011/main" xmlns:a14="http://schemas.microsoft.com/office/drawing/2010/main" xmlns:m="http://schemas.openxmlformats.org/officeDocument/2006/math" xmlns="" val="1"/>
                     </a:ext>
                   </a:extLst>
                 </p:spPr>
@@ -32719,7 +32916,7 @@
                 </a:effectLst>
                 <a:extLst>
                   <a:ext uri="{C572A759-6A51-4108-AA02-DFA0A04FC94B}">
-                    <ma14:wrappingTextBoxFlag xmlns="" xmlns:m="http://schemas.openxmlformats.org/officeDocument/2006/math" xmlns:a14="http://schemas.microsoft.com/office/drawing/2010/main" xmlns:ma14="http://schemas.microsoft.com/office/mac/drawingml/2011/main" val="1"/>
+                    <ma14:wrappingTextBoxFlag xmlns:ma14="http://schemas.microsoft.com/office/mac/drawingml/2011/main" xmlns:a14="http://schemas.microsoft.com/office/drawing/2010/main" xmlns:m="http://schemas.openxmlformats.org/officeDocument/2006/math" xmlns="" val="1"/>
                   </a:ext>
                 </a:extLst>
               </p:spPr>
@@ -32897,7 +33094,7 @@
                   <a:effectLst/>
                   <a:extLst>
                     <a:ext uri="{C572A759-6A51-4108-AA02-DFA0A04FC94B}">
-                      <ma14:wrappingTextBoxFlag xmlns="" xmlns:m="http://schemas.openxmlformats.org/officeDocument/2006/math" xmlns:a14="http://schemas.microsoft.com/office/drawing/2010/main" xmlns:ma14="http://schemas.microsoft.com/office/mac/drawingml/2011/main" val="1"/>
+                      <ma14:wrappingTextBoxFlag xmlns:ma14="http://schemas.microsoft.com/office/mac/drawingml/2011/main" xmlns:a14="http://schemas.microsoft.com/office/drawing/2010/main" xmlns:m="http://schemas.openxmlformats.org/officeDocument/2006/math" xmlns="" val="1"/>
                     </a:ext>
                   </a:extLst>
                 </p:spPr>
@@ -32987,7 +33184,7 @@
                 </a:effectLst>
                 <a:extLst>
                   <a:ext uri="{C572A759-6A51-4108-AA02-DFA0A04FC94B}">
-                    <ma14:wrappingTextBoxFlag xmlns="" xmlns:m="http://schemas.openxmlformats.org/officeDocument/2006/math" xmlns:a14="http://schemas.microsoft.com/office/drawing/2010/main" xmlns:ma14="http://schemas.microsoft.com/office/mac/drawingml/2011/main" val="1"/>
+                    <ma14:wrappingTextBoxFlag xmlns:ma14="http://schemas.microsoft.com/office/mac/drawingml/2011/main" xmlns:a14="http://schemas.microsoft.com/office/drawing/2010/main" xmlns:m="http://schemas.openxmlformats.org/officeDocument/2006/math" xmlns="" val="1"/>
                   </a:ext>
                 </a:extLst>
               </p:spPr>
@@ -33165,7 +33362,7 @@
                   <a:effectLst/>
                   <a:extLst>
                     <a:ext uri="{C572A759-6A51-4108-AA02-DFA0A04FC94B}">
-                      <ma14:wrappingTextBoxFlag xmlns="" xmlns:m="http://schemas.openxmlformats.org/officeDocument/2006/math" xmlns:a14="http://schemas.microsoft.com/office/drawing/2010/main" xmlns:ma14="http://schemas.microsoft.com/office/mac/drawingml/2011/main" val="1"/>
+                      <ma14:wrappingTextBoxFlag xmlns:ma14="http://schemas.microsoft.com/office/mac/drawingml/2011/main" xmlns:a14="http://schemas.microsoft.com/office/drawing/2010/main" xmlns:m="http://schemas.openxmlformats.org/officeDocument/2006/math" xmlns="" val="1"/>
                     </a:ext>
                   </a:extLst>
                 </p:spPr>
@@ -33236,7 +33433,7 @@
             </a:effectLst>
             <a:extLst>
               <a:ext uri="{C572A759-6A51-4108-AA02-DFA0A04FC94B}">
-                <ma14:wrappingTextBoxFlag xmlns="" xmlns:m="http://schemas.openxmlformats.org/officeDocument/2006/math" xmlns:a14="http://schemas.microsoft.com/office/drawing/2010/main" xmlns:ma14="http://schemas.microsoft.com/office/mac/drawingml/2011/main" val="1"/>
+                <ma14:wrappingTextBoxFlag xmlns:ma14="http://schemas.microsoft.com/office/mac/drawingml/2011/main" xmlns:a14="http://schemas.microsoft.com/office/drawing/2010/main" xmlns:m="http://schemas.openxmlformats.org/officeDocument/2006/math" xmlns="" val="1"/>
               </a:ext>
             </a:extLst>
           </p:spPr>
@@ -33463,7 +33660,7 @@
           </a:prstGeom>
           <a:extLst>
             <a:ext uri="{C572A759-6A51-4108-AA02-DFA0A04FC94B}">
-              <ma14:wrappingTextBoxFlag xmlns="" xmlns:m="http://schemas.openxmlformats.org/officeDocument/2006/math" xmlns:a14="http://schemas.microsoft.com/office/drawing/2010/main" xmlns:ma14="http://schemas.microsoft.com/office/mac/drawingml/2011/main" val="1"/>
+              <ma14:wrappingTextBoxFlag xmlns:ma14="http://schemas.microsoft.com/office/mac/drawingml/2011/main" xmlns:a14="http://schemas.microsoft.com/office/drawing/2010/main" xmlns:m="http://schemas.openxmlformats.org/officeDocument/2006/math" xmlns="" val="1"/>
             </a:ext>
           </a:extLst>
         </p:spPr>
@@ -34097,6 +34294,182 @@
       </p:grpSpPr>
       <p:sp>
         <p:nvSpPr>
+          <p:cNvPr id="2" name="Title 1">
+            <a:extLst>
+              <a:ext uri="{FF2B5EF4-FFF2-40B4-BE49-F238E27FC236}">
+                <a16:creationId xmlns:a16="http://schemas.microsoft.com/office/drawing/2014/main" id="{2E39E48C-7DF7-CFF4-A102-2C8AA719E8CB}"/>
+              </a:ext>
+            </a:extLst>
+          </p:cNvPr>
+          <p:cNvSpPr>
+            <a:spLocks noGrp="1"/>
+          </p:cNvSpPr>
+          <p:nvPr>
+            <p:ph type="title"/>
+          </p:nvPr>
+        </p:nvSpPr>
+        <p:spPr/>
+        <p:txBody>
+          <a:bodyPr/>
+          <a:lstStyle/>
+          <a:p>
+            <a:r>
+              <a:rPr lang="en-US" dirty="0"/>
+              <a:t>Async functions use Promises Under the Hood</a:t>
+            </a:r>
+          </a:p>
+        </p:txBody>
+      </p:sp>
+      <p:sp>
+        <p:nvSpPr>
+          <p:cNvPr id="3" name="Content Placeholder 2">
+            <a:extLst>
+              <a:ext uri="{FF2B5EF4-FFF2-40B4-BE49-F238E27FC236}">
+                <a16:creationId xmlns:a16="http://schemas.microsoft.com/office/drawing/2014/main" id="{D94C0420-7FD4-279D-3DAF-86AFA6DBC2F3}"/>
+              </a:ext>
+            </a:extLst>
+          </p:cNvPr>
+          <p:cNvSpPr>
+            <a:spLocks noGrp="1"/>
+          </p:cNvSpPr>
+          <p:nvPr>
+            <p:ph idx="1"/>
+          </p:nvPr>
+        </p:nvSpPr>
+        <p:spPr/>
+        <p:txBody>
+          <a:bodyPr/>
+          <a:lstStyle/>
+          <a:p>
+            <a:endParaRPr lang="en-US" dirty="0"/>
+          </a:p>
+        </p:txBody>
+      </p:sp>
+      <p:sp>
+        <p:nvSpPr>
+          <p:cNvPr id="4" name="Slide Number Placeholder 3">
+            <a:extLst>
+              <a:ext uri="{FF2B5EF4-FFF2-40B4-BE49-F238E27FC236}">
+                <a16:creationId xmlns:a16="http://schemas.microsoft.com/office/drawing/2014/main" id="{DACCF1D1-C6F4-344E-6EEC-62A93619DB47}"/>
+              </a:ext>
+            </a:extLst>
+          </p:cNvPr>
+          <p:cNvSpPr>
+            <a:spLocks noGrp="1"/>
+          </p:cNvSpPr>
+          <p:nvPr>
+            <p:ph type="sldNum" sz="quarter" idx="12"/>
+          </p:nvPr>
+        </p:nvSpPr>
+        <p:spPr/>
+        <p:txBody>
+          <a:bodyPr/>
+          <a:lstStyle/>
+          <a:p>
+            <a:pPr marL="0" marR="0" lvl="0" indent="0" algn="r" defTabSz="914400" rtl="0" eaLnBrk="1" fontAlgn="auto" latinLnBrk="0" hangingPunct="1">
+              <a:lnSpc>
+                <a:spcPct val="100000"/>
+              </a:lnSpc>
+              <a:spcBef>
+                <a:spcPts val="0"/>
+              </a:spcBef>
+              <a:spcAft>
+                <a:spcPts val="0"/>
+              </a:spcAft>
+              <a:buClrTx/>
+              <a:buSzTx/>
+              <a:buFontTx/>
+              <a:buNone/>
+              <a:tabLst/>
+              <a:defRPr/>
+            </a:pPr>
+            <a:fld id="{20F37917-FD3A-4669-9018-DA04BCDD3D75}" type="slidenum">
+              <a:rPr kumimoji="0" lang="en-US" sz="1200" b="0" i="0" u="none" strike="noStrike" kern="1200" cap="none" spc="0" normalizeH="0" baseline="0" noProof="0" smtClean="0">
+                <a:ln>
+                  <a:noFill/>
+                </a:ln>
+                <a:solidFill>
+                  <a:prstClr val="black">
+                    <a:tint val="75000"/>
+                  </a:prstClr>
+                </a:solidFill>
+                <a:effectLst/>
+                <a:uLnTx/>
+                <a:uFillTx/>
+                <a:latin typeface="Calibri" panose="020F0502020204030204"/>
+                <a:ea typeface="+mn-ea"/>
+                <a:cs typeface="+mn-cs"/>
+              </a:rPr>
+              <a:pPr marL="0" marR="0" lvl="0" indent="0" algn="r" defTabSz="914400" rtl="0" eaLnBrk="1" fontAlgn="auto" latinLnBrk="0" hangingPunct="1">
+                <a:lnSpc>
+                  <a:spcPct val="100000"/>
+                </a:lnSpc>
+                <a:spcBef>
+                  <a:spcPts val="0"/>
+                </a:spcBef>
+                <a:spcAft>
+                  <a:spcPts val="0"/>
+                </a:spcAft>
+                <a:buClrTx/>
+                <a:buSzTx/>
+                <a:buFontTx/>
+                <a:buNone/>
+                <a:tabLst/>
+                <a:defRPr/>
+              </a:pPr>
+              <a:t>30</a:t>
+            </a:fld>
+            <a:endParaRPr kumimoji="0" lang="en-US" sz="1200" b="0" i="0" u="none" strike="noStrike" kern="1200" cap="none" spc="0" normalizeH="0" baseline="0" noProof="0">
+              <a:ln>
+                <a:noFill/>
+              </a:ln>
+              <a:solidFill>
+                <a:prstClr val="black">
+                  <a:tint val="75000"/>
+                </a:prstClr>
+              </a:solidFill>
+              <a:effectLst/>
+              <a:uLnTx/>
+              <a:uFillTx/>
+              <a:latin typeface="Calibri" panose="020F0502020204030204"/>
+              <a:ea typeface="+mn-ea"/>
+              <a:cs typeface="+mn-cs"/>
+            </a:endParaRPr>
+          </a:p>
+        </p:txBody>
+      </p:sp>
+    </p:spTree>
+    <p:extLst>
+      <p:ext uri="{BB962C8B-B14F-4D97-AF65-F5344CB8AC3E}">
+        <p14:creationId xmlns:p14="http://schemas.microsoft.com/office/powerpoint/2010/main" val="2387147600"/>
+      </p:ext>
+    </p:extLst>
+  </p:cSld>
+  <p:clrMapOvr>
+    <a:masterClrMapping/>
+  </p:clrMapOvr>
+</p:sld>
+</file>
+
+<file path=ppt/slides/slide31.xml><?xml version="1.0" encoding="utf-8"?>
+<p:sld xmlns:a="http://schemas.openxmlformats.org/drawingml/2006/main" xmlns:r="http://schemas.openxmlformats.org/officeDocument/2006/relationships" xmlns:p="http://schemas.openxmlformats.org/presentationml/2006/main">
+  <p:cSld>
+    <p:spTree>
+      <p:nvGrpSpPr>
+        <p:cNvPr id="1" name=""/>
+        <p:cNvGrpSpPr/>
+        <p:nvPr/>
+      </p:nvGrpSpPr>
+      <p:grpSpPr>
+        <a:xfrm>
+          <a:off x="0" y="0"/>
+          <a:ext cx="0" cy="0"/>
+          <a:chOff x="0" y="0"/>
+          <a:chExt cx="0" cy="0"/>
+        </a:xfrm>
+      </p:grpSpPr>
+      <p:sp>
+        <p:nvSpPr>
           <p:cNvPr id="268" name="Making lots of requests"/>
           <p:cNvSpPr txBox="1">
             <a:spLocks noGrp="1"/>
@@ -34225,7 +34598,7 @@
           </a:ln>
           <a:extLst>
             <a:ext uri="{C572A759-6A51-4108-AA02-DFA0A04FC94B}">
-              <ma14:wrappingTextBoxFlag xmlns:ma14="http://schemas.microsoft.com/office/mac/drawingml/2011/main" xmlns:a14="http://schemas.microsoft.com/office/drawing/2010/main" xmlns:m="http://schemas.openxmlformats.org/officeDocument/2006/math" xmlns="" val="1"/>
+              <ma14:wrappingTextBoxFlag xmlns="" xmlns:m="http://schemas.openxmlformats.org/officeDocument/2006/math" xmlns:a14="http://schemas.microsoft.com/office/drawing/2010/main" xmlns:ma14="http://schemas.microsoft.com/office/mac/drawingml/2011/main" val="1"/>
             </a:ext>
           </a:extLst>
         </p:spPr>
@@ -35073,7 +35446,7 @@
 </p:sld>
 </file>
 
-<file path=ppt/slides/slide31.xml><?xml version="1.0" encoding="utf-8"?>
+<file path=ppt/slides/slide32.xml><?xml version="1.0" encoding="utf-8"?>
 <p:sld xmlns:a="http://schemas.openxmlformats.org/drawingml/2006/main" xmlns:r="http://schemas.openxmlformats.org/officeDocument/2006/relationships" xmlns:p="http://schemas.openxmlformats.org/presentationml/2006/main">
   <p:cSld>
     <p:spTree>
@@ -36087,7 +36460,7 @@
 </p:sld>
 </file>
 
-<file path=ppt/slides/slide32.xml><?xml version="1.0" encoding="utf-8"?>
+<file path=ppt/slides/slide33.xml><?xml version="1.0" encoding="utf-8"?>
 <p:sld xmlns:a="http://schemas.openxmlformats.org/drawingml/2006/main" xmlns:r="http://schemas.openxmlformats.org/officeDocument/2006/relationships" xmlns:p="http://schemas.openxmlformats.org/presentationml/2006/main">
   <p:cSld>
     <p:spTree>
@@ -36286,7 +36659,7 @@
           </a:ln>
           <a:extLst>
             <a:ext uri="{C572A759-6A51-4108-AA02-DFA0A04FC94B}">
-              <ma14:wrappingTextBoxFlag xmlns="" xmlns:m="http://schemas.openxmlformats.org/officeDocument/2006/math" xmlns:a14="http://schemas.microsoft.com/office/drawing/2010/main" xmlns:ma14="http://schemas.microsoft.com/office/mac/drawingml/2011/main" val="1"/>
+              <ma14:wrappingTextBoxFlag xmlns:ma14="http://schemas.microsoft.com/office/mac/drawingml/2011/main" xmlns:a14="http://schemas.microsoft.com/office/drawing/2010/main" xmlns:m="http://schemas.openxmlformats.org/officeDocument/2006/math" xmlns="" val="1"/>
             </a:ext>
           </a:extLst>
         </p:spPr>
@@ -37068,7 +37441,7 @@
           </a:ln>
           <a:extLst>
             <a:ext uri="{C572A759-6A51-4108-AA02-DFA0A04FC94B}">
-              <ma14:wrappingTextBoxFlag xmlns="" xmlns:m="http://schemas.openxmlformats.org/officeDocument/2006/math" xmlns:a14="http://schemas.microsoft.com/office/drawing/2010/main" xmlns:ma14="http://schemas.microsoft.com/office/mac/drawingml/2011/main" val="1"/>
+              <ma14:wrappingTextBoxFlag xmlns:ma14="http://schemas.microsoft.com/office/mac/drawingml/2011/main" xmlns:a14="http://schemas.microsoft.com/office/drawing/2010/main" xmlns:m="http://schemas.openxmlformats.org/officeDocument/2006/math" xmlns="" val="1"/>
             </a:ext>
           </a:extLst>
         </p:spPr>
@@ -37852,157 +38225,6 @@
         </p:txBody>
       </p:sp>
     </p:spTree>
-  </p:cSld>
-  <p:clrMapOvr>
-    <a:masterClrMapping/>
-  </p:clrMapOvr>
-</p:sld>
-</file>
-
-<file path=ppt/slides/slide33.xml><?xml version="1.0" encoding="utf-8"?>
-<p:sld xmlns:a="http://schemas.openxmlformats.org/drawingml/2006/main" xmlns:r="http://schemas.openxmlformats.org/officeDocument/2006/relationships" xmlns:p="http://schemas.openxmlformats.org/presentationml/2006/main">
-  <p:cSld>
-    <p:spTree>
-      <p:nvGrpSpPr>
-        <p:cNvPr id="1" name=""/>
-        <p:cNvGrpSpPr/>
-        <p:nvPr/>
-      </p:nvGrpSpPr>
-      <p:grpSpPr>
-        <a:xfrm>
-          <a:off x="0" y="0"/>
-          <a:ext cx="0" cy="0"/>
-          <a:chOff x="0" y="0"/>
-          <a:chExt cx="0" cy="0"/>
-        </a:xfrm>
-      </p:grpSpPr>
-      <p:sp>
-        <p:nvSpPr>
-          <p:cNvPr id="2" name="Title 1">
-            <a:extLst>
-              <a:ext uri="{FF2B5EF4-FFF2-40B4-BE49-F238E27FC236}">
-                <a16:creationId xmlns:a16="http://schemas.microsoft.com/office/drawing/2014/main" id="{B3DE27F2-3685-217F-F3EF-E022EB526D76}"/>
-              </a:ext>
-            </a:extLst>
-          </p:cNvPr>
-          <p:cNvSpPr>
-            <a:spLocks noGrp="1"/>
-          </p:cNvSpPr>
-          <p:nvPr>
-            <p:ph type="title"/>
-          </p:nvPr>
-        </p:nvSpPr>
-        <p:spPr/>
-        <p:txBody>
-          <a:bodyPr/>
-          <a:lstStyle/>
-          <a:p>
-            <a:r>
-              <a:rPr lang="en-US" dirty="0"/>
-              <a:t>Data Races in TS vs. Java</a:t>
-            </a:r>
-          </a:p>
-        </p:txBody>
-      </p:sp>
-      <p:sp>
-        <p:nvSpPr>
-          <p:cNvPr id="3" name="Slide Number Placeholder 2">
-            <a:extLst>
-              <a:ext uri="{FF2B5EF4-FFF2-40B4-BE49-F238E27FC236}">
-                <a16:creationId xmlns:a16="http://schemas.microsoft.com/office/drawing/2014/main" id="{0DCBA99B-9B52-6B93-AA38-C5360F2244DE}"/>
-              </a:ext>
-            </a:extLst>
-          </p:cNvPr>
-          <p:cNvSpPr>
-            <a:spLocks noGrp="1"/>
-          </p:cNvSpPr>
-          <p:nvPr>
-            <p:ph type="sldNum" sz="quarter" idx="12"/>
-          </p:nvPr>
-        </p:nvSpPr>
-        <p:spPr/>
-        <p:txBody>
-          <a:bodyPr/>
-          <a:lstStyle/>
-          <a:p>
-            <a:pPr marL="0" marR="0" lvl="0" indent="0" algn="r" defTabSz="914400" rtl="0" eaLnBrk="1" fontAlgn="auto" latinLnBrk="0" hangingPunct="1">
-              <a:lnSpc>
-                <a:spcPct val="100000"/>
-              </a:lnSpc>
-              <a:spcBef>
-                <a:spcPts val="0"/>
-              </a:spcBef>
-              <a:spcAft>
-                <a:spcPts val="0"/>
-              </a:spcAft>
-              <a:buClrTx/>
-              <a:buSzTx/>
-              <a:buFontTx/>
-              <a:buNone/>
-              <a:tabLst/>
-              <a:defRPr/>
-            </a:pPr>
-            <a:fld id="{20F37917-FD3A-4669-9018-DA04BCDD3D75}" type="slidenum">
-              <a:rPr kumimoji="0" lang="en-US" sz="1200" b="0" i="0" u="none" strike="noStrike" kern="1200" cap="none" spc="0" normalizeH="0" baseline="0" noProof="0" smtClean="0">
-                <a:ln>
-                  <a:noFill/>
-                </a:ln>
-                <a:solidFill>
-                  <a:prstClr val="black">
-                    <a:tint val="75000"/>
-                  </a:prstClr>
-                </a:solidFill>
-                <a:effectLst/>
-                <a:uLnTx/>
-                <a:uFillTx/>
-                <a:latin typeface="Calibri" panose="020F0502020204030204"/>
-                <a:ea typeface="+mn-ea"/>
-                <a:cs typeface="+mn-cs"/>
-              </a:rPr>
-              <a:pPr marL="0" marR="0" lvl="0" indent="0" algn="r" defTabSz="914400" rtl="0" eaLnBrk="1" fontAlgn="auto" latinLnBrk="0" hangingPunct="1">
-                <a:lnSpc>
-                  <a:spcPct val="100000"/>
-                </a:lnSpc>
-                <a:spcBef>
-                  <a:spcPts val="0"/>
-                </a:spcBef>
-                <a:spcAft>
-                  <a:spcPts val="0"/>
-                </a:spcAft>
-                <a:buClrTx/>
-                <a:buSzTx/>
-                <a:buFontTx/>
-                <a:buNone/>
-                <a:tabLst/>
-                <a:defRPr/>
-              </a:pPr>
-              <a:t>33</a:t>
-            </a:fld>
-            <a:endParaRPr kumimoji="0" lang="en-US" sz="1200" b="0" i="0" u="none" strike="noStrike" kern="1200" cap="none" spc="0" normalizeH="0" baseline="0" noProof="0">
-              <a:ln>
-                <a:noFill/>
-              </a:ln>
-              <a:solidFill>
-                <a:prstClr val="black">
-                  <a:tint val="75000"/>
-                </a:prstClr>
-              </a:solidFill>
-              <a:effectLst/>
-              <a:uLnTx/>
-              <a:uFillTx/>
-              <a:latin typeface="Calibri" panose="020F0502020204030204"/>
-              <a:ea typeface="+mn-ea"/>
-              <a:cs typeface="+mn-cs"/>
-            </a:endParaRPr>
-          </a:p>
-        </p:txBody>
-      </p:sp>
-    </p:spTree>
-    <p:extLst>
-      <p:ext uri="{BB962C8B-B14F-4D97-AF65-F5344CB8AC3E}">
-        <p14:creationId xmlns:p14="http://schemas.microsoft.com/office/powerpoint/2010/main" val="2752453622"/>
-      </p:ext>
-    </p:extLst>
   </p:cSld>
   <p:clrMapOvr>
     <a:masterClrMapping/>
@@ -38057,6 +38279,157 @@
       </p:sp>
       <p:sp>
         <p:nvSpPr>
+          <p:cNvPr id="3" name="Slide Number Placeholder 2">
+            <a:extLst>
+              <a:ext uri="{FF2B5EF4-FFF2-40B4-BE49-F238E27FC236}">
+                <a16:creationId xmlns:a16="http://schemas.microsoft.com/office/drawing/2014/main" id="{0DCBA99B-9B52-6B93-AA38-C5360F2244DE}"/>
+              </a:ext>
+            </a:extLst>
+          </p:cNvPr>
+          <p:cNvSpPr>
+            <a:spLocks noGrp="1"/>
+          </p:cNvSpPr>
+          <p:nvPr>
+            <p:ph type="sldNum" sz="quarter" idx="12"/>
+          </p:nvPr>
+        </p:nvSpPr>
+        <p:spPr/>
+        <p:txBody>
+          <a:bodyPr/>
+          <a:lstStyle/>
+          <a:p>
+            <a:pPr marL="0" marR="0" lvl="0" indent="0" algn="r" defTabSz="914400" rtl="0" eaLnBrk="1" fontAlgn="auto" latinLnBrk="0" hangingPunct="1">
+              <a:lnSpc>
+                <a:spcPct val="100000"/>
+              </a:lnSpc>
+              <a:spcBef>
+                <a:spcPts val="0"/>
+              </a:spcBef>
+              <a:spcAft>
+                <a:spcPts val="0"/>
+              </a:spcAft>
+              <a:buClrTx/>
+              <a:buSzTx/>
+              <a:buFontTx/>
+              <a:buNone/>
+              <a:tabLst/>
+              <a:defRPr/>
+            </a:pPr>
+            <a:fld id="{20F37917-FD3A-4669-9018-DA04BCDD3D75}" type="slidenum">
+              <a:rPr kumimoji="0" lang="en-US" sz="1200" b="0" i="0" u="none" strike="noStrike" kern="1200" cap="none" spc="0" normalizeH="0" baseline="0" noProof="0" smtClean="0">
+                <a:ln>
+                  <a:noFill/>
+                </a:ln>
+                <a:solidFill>
+                  <a:prstClr val="black">
+                    <a:tint val="75000"/>
+                  </a:prstClr>
+                </a:solidFill>
+                <a:effectLst/>
+                <a:uLnTx/>
+                <a:uFillTx/>
+                <a:latin typeface="Calibri" panose="020F0502020204030204"/>
+                <a:ea typeface="+mn-ea"/>
+                <a:cs typeface="+mn-cs"/>
+              </a:rPr>
+              <a:pPr marL="0" marR="0" lvl="0" indent="0" algn="r" defTabSz="914400" rtl="0" eaLnBrk="1" fontAlgn="auto" latinLnBrk="0" hangingPunct="1">
+                <a:lnSpc>
+                  <a:spcPct val="100000"/>
+                </a:lnSpc>
+                <a:spcBef>
+                  <a:spcPts val="0"/>
+                </a:spcBef>
+                <a:spcAft>
+                  <a:spcPts val="0"/>
+                </a:spcAft>
+                <a:buClrTx/>
+                <a:buSzTx/>
+                <a:buFontTx/>
+                <a:buNone/>
+                <a:tabLst/>
+                <a:defRPr/>
+              </a:pPr>
+              <a:t>34</a:t>
+            </a:fld>
+            <a:endParaRPr kumimoji="0" lang="en-US" sz="1200" b="0" i="0" u="none" strike="noStrike" kern="1200" cap="none" spc="0" normalizeH="0" baseline="0" noProof="0">
+              <a:ln>
+                <a:noFill/>
+              </a:ln>
+              <a:solidFill>
+                <a:prstClr val="black">
+                  <a:tint val="75000"/>
+                </a:prstClr>
+              </a:solidFill>
+              <a:effectLst/>
+              <a:uLnTx/>
+              <a:uFillTx/>
+              <a:latin typeface="Calibri" panose="020F0502020204030204"/>
+              <a:ea typeface="+mn-ea"/>
+              <a:cs typeface="+mn-cs"/>
+            </a:endParaRPr>
+          </a:p>
+        </p:txBody>
+      </p:sp>
+    </p:spTree>
+    <p:extLst>
+      <p:ext uri="{BB962C8B-B14F-4D97-AF65-F5344CB8AC3E}">
+        <p14:creationId xmlns:p14="http://schemas.microsoft.com/office/powerpoint/2010/main" val="2752453622"/>
+      </p:ext>
+    </p:extLst>
+  </p:cSld>
+  <p:clrMapOvr>
+    <a:masterClrMapping/>
+  </p:clrMapOvr>
+</p:sld>
+</file>
+
+<file path=ppt/slides/slide35.xml><?xml version="1.0" encoding="utf-8"?>
+<p:sld xmlns:a="http://schemas.openxmlformats.org/drawingml/2006/main" xmlns:r="http://schemas.openxmlformats.org/officeDocument/2006/relationships" xmlns:p="http://schemas.openxmlformats.org/presentationml/2006/main">
+  <p:cSld>
+    <p:spTree>
+      <p:nvGrpSpPr>
+        <p:cNvPr id="1" name=""/>
+        <p:cNvGrpSpPr/>
+        <p:nvPr/>
+      </p:nvGrpSpPr>
+      <p:grpSpPr>
+        <a:xfrm>
+          <a:off x="0" y="0"/>
+          <a:ext cx="0" cy="0"/>
+          <a:chOff x="0" y="0"/>
+          <a:chExt cx="0" cy="0"/>
+        </a:xfrm>
+      </p:grpSpPr>
+      <p:sp>
+        <p:nvSpPr>
+          <p:cNvPr id="2" name="Title 1">
+            <a:extLst>
+              <a:ext uri="{FF2B5EF4-FFF2-40B4-BE49-F238E27FC236}">
+                <a16:creationId xmlns:a16="http://schemas.microsoft.com/office/drawing/2014/main" id="{B3DE27F2-3685-217F-F3EF-E022EB526D76}"/>
+              </a:ext>
+            </a:extLst>
+          </p:cNvPr>
+          <p:cNvSpPr>
+            <a:spLocks noGrp="1"/>
+          </p:cNvSpPr>
+          <p:nvPr>
+            <p:ph type="title"/>
+          </p:nvPr>
+        </p:nvSpPr>
+        <p:spPr/>
+        <p:txBody>
+          <a:bodyPr/>
+          <a:lstStyle/>
+          <a:p>
+            <a:r>
+              <a:rPr lang="en-US" dirty="0"/>
+              <a:t>Data Races in TS vs. Java</a:t>
+            </a:r>
+          </a:p>
+        </p:txBody>
+      </p:sp>
+      <p:sp>
+        <p:nvSpPr>
           <p:cNvPr id="5" name="Content Placeholder 4">
             <a:extLst>
               <a:ext uri="{FF2B5EF4-FFF2-40B4-BE49-F238E27FC236}">
@@ -38152,7 +38525,7 @@
                 <a:tabLst/>
                 <a:defRPr/>
               </a:pPr>
-              <a:t>34</a:t>
+              <a:t>35</a:t>
             </a:fld>
             <a:endParaRPr kumimoji="0" lang="en-US" sz="1200" b="0" i="0" u="none" strike="noStrike" kern="1200" cap="none" spc="0" normalizeH="0" baseline="0" noProof="0">
               <a:ln>
@@ -39280,7 +39653,7 @@
 </p:sld>
 </file>
 
-<file path=ppt/slides/slide35.xml><?xml version="1.0" encoding="utf-8"?>
+<file path=ppt/slides/slide36.xml><?xml version="1.0" encoding="utf-8"?>
 <p:sld xmlns:a="http://schemas.openxmlformats.org/drawingml/2006/main" xmlns:r="http://schemas.openxmlformats.org/officeDocument/2006/relationships" xmlns:p="http://schemas.openxmlformats.org/presentationml/2006/main">
   <p:cSld>
     <p:spTree>
@@ -39397,7 +39770,7 @@
                 <a:tabLst/>
                 <a:defRPr/>
               </a:pPr>
-              <a:t>35</a:t>
+              <a:t>36</a:t>
             </a:fld>
             <a:endParaRPr kumimoji="0" lang="en-US" sz="1200" b="0" i="0" u="none" strike="noStrike" kern="1200" cap="none" spc="0" normalizeH="0" baseline="0" noProof="0">
               <a:ln>
@@ -39519,7 +39892,7 @@
 </p:sld>
 </file>
 
-<file path=ppt/slides/slide36.xml><?xml version="1.0" encoding="utf-8"?>
+<file path=ppt/slides/slide37.xml><?xml version="1.0" encoding="utf-8"?>
 <p:sld xmlns:a="http://schemas.openxmlformats.org/drawingml/2006/main" xmlns:r="http://schemas.openxmlformats.org/officeDocument/2006/relationships" xmlns:p="http://schemas.openxmlformats.org/presentationml/2006/main">
   <p:cSld>
     <p:spTree>
@@ -39675,7 +40048,7 @@
                 <a:tabLst/>
                 <a:defRPr/>
               </a:pPr>
-              <a:t>36</a:t>
+              <a:t>37</a:t>
             </a:fld>
             <a:endParaRPr kumimoji="0" lang="en-US" sz="1200" b="0" i="0" u="none" strike="noStrike" kern="1200" cap="none" spc="0" normalizeH="0" baseline="0" noProof="0">
               <a:ln>
@@ -39709,7 +40082,7 @@
 </p:sld>
 </file>
 
-<file path=ppt/slides/slide37.xml><?xml version="1.0" encoding="utf-8"?>
+<file path=ppt/slides/slide38.xml><?xml version="1.0" encoding="utf-8"?>
 <p:sld xmlns:a="http://schemas.openxmlformats.org/drawingml/2006/main" xmlns:r="http://schemas.openxmlformats.org/officeDocument/2006/relationships" xmlns:p="http://schemas.openxmlformats.org/presentationml/2006/main">
   <p:cSld>
     <p:spTree>
@@ -39854,7 +40227,7 @@
           <a:p>
             <a:fld id="{20F37917-FD3A-4669-9018-DA04BCDD3D75}" type="slidenum">
               <a:rPr lang="en-US" smtClean="0"/>
-              <a:t>37</a:t>
+              <a:t>38</a:t>
             </a:fld>
             <a:endParaRPr lang="en-US"/>
           </a:p>

</xml_diff>